<commit_message>
Add slides for ADO.NET and ORM brief info
</commit_message>
<xml_diff>
--- a/Databases_and_EntityFrameworkCore.pptx
+++ b/Databases_and_EntityFrameworkCore.pptx
@@ -10,6 +10,9 @@
     <p:sldId id="258" r:id="rId4"/>
     <p:sldId id="259" r:id="rId5"/>
     <p:sldId id="260" r:id="rId6"/>
+    <p:sldId id="261" r:id="rId7"/>
+    <p:sldId id="262" r:id="rId8"/>
+    <p:sldId id="263" r:id="rId9"/>
   </p:sldIdLst>
   <p:sldSz cx="12192000" cy="6858000"/>
   <p:notesSz cx="6858000" cy="9144000"/>
@@ -108,7 +111,54 @@
       </a:defRPr>
     </a:lvl9pPr>
   </p:defaultTextStyle>
+  <p:extLst>
+    <p:ext uri="{521415D9-36F7-43E2-AB2F-B90AF26B5E84}">
+      <p14:sectionLst xmlns:p14="http://schemas.microsoft.com/office/powerpoint/2010/main">
+        <p14:section name="Default Section" id="{C1FD6918-818C-474D-8E85-514B1C44E266}">
+          <p14:sldIdLst>
+            <p14:sldId id="256"/>
+            <p14:sldId id="257"/>
+            <p14:sldId id="258"/>
+            <p14:sldId id="259"/>
+            <p14:sldId id="260"/>
+            <p14:sldId id="261"/>
+            <p14:sldId id="262"/>
+            <p14:sldId id="263"/>
+          </p14:sldIdLst>
+        </p14:section>
+      </p14:sectionLst>
+    </p:ext>
+    <p:ext uri="{EFAFB233-063F-42B5-8137-9DF3F51BA10A}">
+      <p15:sldGuideLst xmlns:p15="http://schemas.microsoft.com/office/powerpoint/2012/main"/>
+    </p:ext>
+  </p:extLst>
 </p:presentation>
+</file>
+
+<file path=ppt/commentAuthors.xml><?xml version="1.0" encoding="utf-8"?>
+<p:cmAuthorLst xmlns:a="http://schemas.openxmlformats.org/drawingml/2006/main" xmlns:r="http://schemas.openxmlformats.org/officeDocument/2006/relationships" xmlns:p="http://schemas.openxmlformats.org/presentationml/2006/main">
+  <p:cmAuthor id="1" name="Велизар Герасимов" initials="ВГ" lastIdx="1" clrIdx="0">
+    <p:extLst>
+      <p:ext uri="{19B8F6BF-5375-455C-9EA6-DF929625EA0E}">
+        <p15:presenceInfo xmlns:p15="http://schemas.microsoft.com/office/powerpoint/2012/main" userId="fc929a4cc2368c0d" providerId="Windows Live"/>
+      </p:ext>
+    </p:extLst>
+  </p:cmAuthor>
+</p:cmAuthorLst>
+</file>
+
+<file path=ppt/comments/comment1.xml><?xml version="1.0" encoding="utf-8"?>
+<p:cmLst xmlns:a="http://schemas.openxmlformats.org/drawingml/2006/main" xmlns:r="http://schemas.openxmlformats.org/officeDocument/2006/relationships" xmlns:p="http://schemas.openxmlformats.org/presentationml/2006/main">
+  <p:cm authorId="1" dt="2021-09-09T18:56:39.664" idx="1">
+    <p:pos x="10" y="10"/>
+    <p:text/>
+    <p:extLst>
+      <p:ext uri="{C676402C-5697-4E1C-873F-D02D1690AC5C}">
+        <p15:threadingInfo xmlns:p15="http://schemas.microsoft.com/office/powerpoint/2012/main" timeZoneBias="-180"/>
+      </p:ext>
+    </p:extLst>
+  </p:cm>
+</p:cmLst>
 </file>
 
 <file path=ppt/slideLayouts/slideLayout1.xml><?xml version="1.0" encoding="utf-8"?>
@@ -13745,6 +13795,13 @@
   <p:clrMapOvr>
     <a:masterClrMapping/>
   </p:clrMapOvr>
+  <p:timing>
+    <p:tnLst>
+      <p:par>
+        <p:cTn id="1" dur="indefinite" restart="never" nodeType="tmRoot"/>
+      </p:par>
+    </p:tnLst>
+  </p:timing>
 </p:sld>
 </file>
 
@@ -13903,6 +13960,427 @@
     <p:extLst>
       <p:ext uri="{BB962C8B-B14F-4D97-AF65-F5344CB8AC3E}">
         <p14:creationId xmlns:p14="http://schemas.microsoft.com/office/powerpoint/2010/main" val="1553230175"/>
+      </p:ext>
+    </p:extLst>
+  </p:cSld>
+  <p:clrMapOvr>
+    <a:masterClrMapping/>
+  </p:clrMapOvr>
+  <p:timing>
+    <p:tnLst>
+      <p:par>
+        <p:cTn id="1" dur="indefinite" restart="never" nodeType="tmRoot"/>
+      </p:par>
+    </p:tnLst>
+  </p:timing>
+</p:sld>
+</file>
+
+<file path=ppt/slides/slide6.xml><?xml version="1.0" encoding="utf-8"?>
+<p:sld xmlns:a="http://schemas.openxmlformats.org/drawingml/2006/main" xmlns:r="http://schemas.openxmlformats.org/officeDocument/2006/relationships" xmlns:p="http://schemas.openxmlformats.org/presentationml/2006/main">
+  <p:cSld>
+    <p:spTree>
+      <p:nvGrpSpPr>
+        <p:cNvPr id="1" name=""/>
+        <p:cNvGrpSpPr/>
+        <p:nvPr/>
+      </p:nvGrpSpPr>
+      <p:grpSpPr>
+        <a:xfrm>
+          <a:off x="0" y="0"/>
+          <a:ext cx="0" cy="0"/>
+          <a:chOff x="0" y="0"/>
+          <a:chExt cx="0" cy="0"/>
+        </a:xfrm>
+      </p:grpSpPr>
+      <p:sp>
+        <p:nvSpPr>
+          <p:cNvPr id="2" name="Title 1"/>
+          <p:cNvSpPr>
+            <a:spLocks noGrp="1"/>
+          </p:cNvSpPr>
+          <p:nvPr>
+            <p:ph type="title"/>
+          </p:nvPr>
+        </p:nvSpPr>
+        <p:spPr/>
+        <p:txBody>
+          <a:bodyPr/>
+          <a:lstStyle/>
+          <a:p>
+            <a:pPr algn="ctr"/>
+            <a:r>
+              <a:rPr lang="en-US" dirty="0" smtClean="0"/>
+              <a:t>MS SQL server profiler is a great tool! </a:t>
+            </a:r>
+            <a:endParaRPr lang="en-US" dirty="0"/>
+          </a:p>
+        </p:txBody>
+      </p:sp>
+      <p:pic>
+        <p:nvPicPr>
+          <p:cNvPr id="5" name="Content Placeholder 4"/>
+          <p:cNvPicPr>
+            <a:picLocks noGrp="1" noChangeAspect="1"/>
+          </p:cNvPicPr>
+          <p:nvPr>
+            <p:ph sz="half" idx="1"/>
+          </p:nvPr>
+        </p:nvPicPr>
+        <p:blipFill>
+          <a:blip r:embed="rId2">
+            <a:extLst>
+              <a:ext uri="{28A0092B-C50C-407E-A947-70E740481C1C}">
+                <a14:useLocalDpi xmlns:a14="http://schemas.microsoft.com/office/drawing/2010/main" val="0"/>
+              </a:ext>
+            </a:extLst>
+          </a:blip>
+          <a:stretch>
+            <a:fillRect/>
+          </a:stretch>
+        </p:blipFill>
+        <p:spPr>
+          <a:xfrm>
+            <a:off x="2139156" y="2882900"/>
+            <a:ext cx="2857500" cy="2857500"/>
+          </a:xfrm>
+        </p:spPr>
+      </p:pic>
+      <p:pic>
+        <p:nvPicPr>
+          <p:cNvPr id="6" name="Content Placeholder 5"/>
+          <p:cNvPicPr>
+            <a:picLocks noGrp="1" noChangeAspect="1"/>
+          </p:cNvPicPr>
+          <p:nvPr>
+            <p:ph sz="half" idx="2"/>
+          </p:nvPr>
+        </p:nvPicPr>
+        <p:blipFill>
+          <a:blip r:embed="rId3">
+            <a:extLst>
+              <a:ext uri="{28A0092B-C50C-407E-A947-70E740481C1C}">
+                <a14:useLocalDpi xmlns:a14="http://schemas.microsoft.com/office/drawing/2010/main" val="0"/>
+              </a:ext>
+            </a:extLst>
+          </a:blip>
+          <a:stretch>
+            <a:fillRect/>
+          </a:stretch>
+        </p:blipFill>
+        <p:spPr>
+          <a:xfrm>
+            <a:off x="6208712" y="3223492"/>
+            <a:ext cx="4914975" cy="1995054"/>
+          </a:xfrm>
+        </p:spPr>
+      </p:pic>
+    </p:spTree>
+    <p:extLst>
+      <p:ext uri="{BB962C8B-B14F-4D97-AF65-F5344CB8AC3E}">
+        <p14:creationId xmlns:p14="http://schemas.microsoft.com/office/powerpoint/2010/main" val="2208641250"/>
+      </p:ext>
+    </p:extLst>
+  </p:cSld>
+  <p:clrMapOvr>
+    <a:masterClrMapping/>
+  </p:clrMapOvr>
+  <p:timing>
+    <p:tnLst>
+      <p:par>
+        <p:cTn id="1" dur="indefinite" restart="never" nodeType="tmRoot"/>
+      </p:par>
+    </p:tnLst>
+  </p:timing>
+</p:sld>
+</file>
+
+<file path=ppt/slides/slide7.xml><?xml version="1.0" encoding="utf-8"?>
+<p:sld xmlns:a="http://schemas.openxmlformats.org/drawingml/2006/main" xmlns:r="http://schemas.openxmlformats.org/officeDocument/2006/relationships" xmlns:p="http://schemas.openxmlformats.org/presentationml/2006/main">
+  <p:cSld>
+    <p:spTree>
+      <p:nvGrpSpPr>
+        <p:cNvPr id="1" name=""/>
+        <p:cNvGrpSpPr/>
+        <p:nvPr/>
+      </p:nvGrpSpPr>
+      <p:grpSpPr>
+        <a:xfrm>
+          <a:off x="0" y="0"/>
+          <a:ext cx="0" cy="0"/>
+          <a:chOff x="0" y="0"/>
+          <a:chExt cx="0" cy="0"/>
+        </a:xfrm>
+      </p:grpSpPr>
+      <p:sp>
+        <p:nvSpPr>
+          <p:cNvPr id="2" name="Title 1"/>
+          <p:cNvSpPr>
+            <a:spLocks noGrp="1"/>
+          </p:cNvSpPr>
+          <p:nvPr>
+            <p:ph type="title"/>
+          </p:nvPr>
+        </p:nvSpPr>
+        <p:spPr>
+          <a:xfrm>
+            <a:off x="1136482" y="1496290"/>
+            <a:ext cx="2940939" cy="577273"/>
+          </a:xfrm>
+        </p:spPr>
+        <p:txBody>
+          <a:bodyPr/>
+          <a:lstStyle/>
+          <a:p>
+            <a:r>
+              <a:rPr lang="en-US" sz="3200" dirty="0" smtClean="0"/>
+              <a:t>ADO.NET</a:t>
+            </a:r>
+            <a:endParaRPr lang="en-US" sz="3200" dirty="0"/>
+          </a:p>
+        </p:txBody>
+      </p:sp>
+      <p:pic>
+        <p:nvPicPr>
+          <p:cNvPr id="5" name="Content Placeholder 4"/>
+          <p:cNvPicPr>
+            <a:picLocks noGrp="1" noChangeAspect="1"/>
+          </p:cNvPicPr>
+          <p:nvPr>
+            <p:ph idx="1"/>
+          </p:nvPr>
+        </p:nvPicPr>
+        <p:blipFill>
+          <a:blip r:embed="rId2">
+            <a:extLst>
+              <a:ext uri="{28A0092B-C50C-407E-A947-70E740481C1C}">
+                <a14:useLocalDpi xmlns:a14="http://schemas.microsoft.com/office/drawing/2010/main" val="0"/>
+              </a:ext>
+            </a:extLst>
+          </a:blip>
+          <a:stretch>
+            <a:fillRect/>
+          </a:stretch>
+        </p:blipFill>
+        <p:spPr>
+          <a:xfrm>
+            <a:off x="5264438" y="2640984"/>
+            <a:ext cx="6366528" cy="1469198"/>
+          </a:xfrm>
+        </p:spPr>
+      </p:pic>
+      <p:sp>
+        <p:nvSpPr>
+          <p:cNvPr id="4" name="Text Placeholder 3"/>
+          <p:cNvSpPr>
+            <a:spLocks noGrp="1"/>
+          </p:cNvSpPr>
+          <p:nvPr>
+            <p:ph type="body" sz="half" idx="2"/>
+          </p:nvPr>
+        </p:nvSpPr>
+        <p:spPr>
+          <a:xfrm>
+            <a:off x="1136482" y="2285999"/>
+            <a:ext cx="3518645" cy="2535383"/>
+          </a:xfrm>
+        </p:spPr>
+        <p:txBody>
+          <a:bodyPr>
+            <a:normAutofit/>
+          </a:bodyPr>
+          <a:lstStyle/>
+          <a:p>
+            <a:r>
+              <a:rPr lang="en-US" sz="1800" dirty="0" smtClean="0">
+                <a:solidFill>
+                  <a:schemeClr val="bg1"/>
+                </a:solidFill>
+              </a:rPr>
+              <a:t>ADO.NET is the latest Microsoft database access technology. It’s a set of classes that expose data access services.</a:t>
+            </a:r>
+            <a:endParaRPr lang="en-US" sz="1800" dirty="0">
+              <a:solidFill>
+                <a:schemeClr val="bg1"/>
+              </a:solidFill>
+            </a:endParaRPr>
+          </a:p>
+        </p:txBody>
+      </p:sp>
+      <p:sp>
+        <p:nvSpPr>
+          <p:cNvPr id="7" name="TextBox 6"/>
+          <p:cNvSpPr txBox="1"/>
+          <p:nvPr/>
+        </p:nvSpPr>
+        <p:spPr>
+          <a:xfrm>
+            <a:off x="5753965" y="1784926"/>
+            <a:ext cx="4904509" cy="369332"/>
+          </a:xfrm>
+          <a:prstGeom prst="rect">
+            <a:avLst/>
+          </a:prstGeom>
+          <a:noFill/>
+        </p:spPr>
+        <p:txBody>
+          <a:bodyPr wrap="square" rtlCol="0" anchor="ctr">
+            <a:spAutoFit/>
+          </a:bodyPr>
+          <a:lstStyle/>
+          <a:p>
+            <a:pPr algn="ctr"/>
+            <a:r>
+              <a:rPr lang="en-US" dirty="0" smtClean="0">
+                <a:solidFill>
+                  <a:schemeClr val="accent6">
+                    <a:lumMod val="50000"/>
+                  </a:schemeClr>
+                </a:solidFill>
+              </a:rPr>
+              <a:t>C# demo source</a:t>
+            </a:r>
+            <a:endParaRPr lang="en-US" dirty="0">
+              <a:solidFill>
+                <a:schemeClr val="accent6">
+                  <a:lumMod val="50000"/>
+                </a:schemeClr>
+              </a:solidFill>
+            </a:endParaRPr>
+          </a:p>
+        </p:txBody>
+      </p:sp>
+    </p:spTree>
+    <p:extLst>
+      <p:ext uri="{BB962C8B-B14F-4D97-AF65-F5344CB8AC3E}">
+        <p14:creationId xmlns:p14="http://schemas.microsoft.com/office/powerpoint/2010/main" val="9675751"/>
+      </p:ext>
+    </p:extLst>
+  </p:cSld>
+  <p:clrMapOvr>
+    <a:masterClrMapping/>
+  </p:clrMapOvr>
+</p:sld>
+</file>
+
+<file path=ppt/slides/slide8.xml><?xml version="1.0" encoding="utf-8"?>
+<p:sld xmlns:a="http://schemas.openxmlformats.org/drawingml/2006/main" xmlns:r="http://schemas.openxmlformats.org/officeDocument/2006/relationships" xmlns:p="http://schemas.openxmlformats.org/presentationml/2006/main">
+  <p:cSld>
+    <p:spTree>
+      <p:nvGrpSpPr>
+        <p:cNvPr id="1" name=""/>
+        <p:cNvGrpSpPr/>
+        <p:nvPr/>
+      </p:nvGrpSpPr>
+      <p:grpSpPr>
+        <a:xfrm>
+          <a:off x="0" y="0"/>
+          <a:ext cx="0" cy="0"/>
+          <a:chOff x="0" y="0"/>
+          <a:chExt cx="0" cy="0"/>
+        </a:xfrm>
+      </p:grpSpPr>
+      <p:sp>
+        <p:nvSpPr>
+          <p:cNvPr id="2" name="Title 1"/>
+          <p:cNvSpPr>
+            <a:spLocks noGrp="1"/>
+          </p:cNvSpPr>
+          <p:nvPr>
+            <p:ph type="title"/>
+          </p:nvPr>
+        </p:nvSpPr>
+        <p:spPr>
+          <a:xfrm>
+            <a:off x="1198231" y="1708728"/>
+            <a:ext cx="3865134" cy="1156855"/>
+          </a:xfrm>
+        </p:spPr>
+        <p:txBody>
+          <a:bodyPr>
+            <a:normAutofit fontScale="90000"/>
+          </a:bodyPr>
+          <a:lstStyle/>
+          <a:p>
+            <a:r>
+              <a:rPr lang="en-US" dirty="0" smtClean="0"/>
+              <a:t>What is ORM and how it works?</a:t>
+            </a:r>
+            <a:endParaRPr lang="en-US" dirty="0"/>
+          </a:p>
+        </p:txBody>
+      </p:sp>
+      <p:pic>
+        <p:nvPicPr>
+          <p:cNvPr id="5" name="Picture Placeholder 4"/>
+          <p:cNvPicPr>
+            <a:picLocks noGrp="1" noChangeAspect="1"/>
+          </p:cNvPicPr>
+          <p:nvPr>
+            <p:ph type="pic" idx="1"/>
+          </p:nvPr>
+        </p:nvPicPr>
+        <p:blipFill>
+          <a:blip r:embed="rId2">
+            <a:extLst>
+              <a:ext uri="{28A0092B-C50C-407E-A947-70E740481C1C}">
+                <a14:useLocalDpi xmlns:a14="http://schemas.microsoft.com/office/drawing/2010/main" val="0"/>
+              </a:ext>
+            </a:extLst>
+          </a:blip>
+          <a:stretch>
+            <a:fillRect/>
+          </a:stretch>
+        </p:blipFill>
+        <p:spPr>
+          <a:xfrm>
+            <a:off x="6070040" y="1823937"/>
+            <a:ext cx="5651790" cy="3233476"/>
+          </a:xfrm>
+        </p:spPr>
+      </p:pic>
+      <p:sp>
+        <p:nvSpPr>
+          <p:cNvPr id="4" name="Text Placeholder 3"/>
+          <p:cNvSpPr>
+            <a:spLocks noGrp="1"/>
+          </p:cNvSpPr>
+          <p:nvPr>
+            <p:ph type="body" sz="half" idx="2"/>
+          </p:nvPr>
+        </p:nvSpPr>
+        <p:spPr>
+          <a:xfrm>
+            <a:off x="1198231" y="2946400"/>
+            <a:ext cx="3859212" cy="2701636"/>
+          </a:xfrm>
+        </p:spPr>
+        <p:txBody>
+          <a:bodyPr>
+            <a:normAutofit/>
+          </a:bodyPr>
+          <a:lstStyle/>
+          <a:p>
+            <a:r>
+              <a:rPr lang="en-US" sz="1800" dirty="0" smtClean="0">
+                <a:solidFill>
+                  <a:schemeClr val="bg1"/>
+                </a:solidFill>
+              </a:rPr>
+              <a:t>ORM stands from Object Relational Mapper and is a library that automates the transfer of data between database tables into objects and vice versa.</a:t>
+            </a:r>
+            <a:endParaRPr lang="en-US" sz="1800" dirty="0">
+              <a:solidFill>
+                <a:schemeClr val="bg1"/>
+              </a:solidFill>
+            </a:endParaRPr>
+          </a:p>
+        </p:txBody>
+      </p:sp>
+    </p:spTree>
+    <p:extLst>
+      <p:ext uri="{BB962C8B-B14F-4D97-AF65-F5344CB8AC3E}">
+        <p14:creationId xmlns:p14="http://schemas.microsoft.com/office/powerpoint/2010/main" val="3976096915"/>
       </p:ext>
     </p:extLst>
   </p:cSld>

</xml_diff>

<commit_message>
Insert new slide "The benefits of ORM systems"
</commit_message>
<xml_diff>
--- a/Databases_and_EntityFrameworkCore.pptx
+++ b/Databases_and_EntityFrameworkCore.pptx
@@ -13,6 +13,7 @@
     <p:sldId id="261" r:id="rId7"/>
     <p:sldId id="262" r:id="rId8"/>
     <p:sldId id="263" r:id="rId9"/>
+    <p:sldId id="264" r:id="rId10"/>
   </p:sldIdLst>
   <p:sldSz cx="12192000" cy="6858000"/>
   <p:notesSz cx="6858000" cy="9144000"/>
@@ -124,6 +125,7 @@
             <p14:sldId id="261"/>
             <p14:sldId id="262"/>
             <p14:sldId id="263"/>
+            <p14:sldId id="264"/>
           </p14:sldIdLst>
         </p14:section>
       </p14:sectionLst>
@@ -13328,17 +13330,28 @@
                 <a:solidFill>
                   <a:schemeClr val="bg1"/>
                 </a:solidFill>
+                <a:latin typeface="Arial" panose="020B0604020202020204" pitchFamily="34" charset="0"/>
+                <a:cs typeface="Arial" panose="020B0604020202020204" pitchFamily="34" charset="0"/>
               </a:rPr>
               <a:t>Entity Framework Core and Databases overview</a:t>
             </a:r>
             <a:r>
-              <a:rPr lang="en-US" dirty="0" smtClean="0"/>
+              <a:rPr lang="en-US" dirty="0" smtClean="0">
+                <a:latin typeface="Arial" panose="020B0604020202020204" pitchFamily="34" charset="0"/>
+                <a:cs typeface="Arial" panose="020B0604020202020204" pitchFamily="34" charset="0"/>
+              </a:rPr>
               <a:t/>
             </a:r>
             <a:br>
-              <a:rPr lang="en-US" dirty="0" smtClean="0"/>
+              <a:rPr lang="en-US" dirty="0" smtClean="0">
+                <a:latin typeface="Arial" panose="020B0604020202020204" pitchFamily="34" charset="0"/>
+                <a:cs typeface="Arial" panose="020B0604020202020204" pitchFamily="34" charset="0"/>
+              </a:rPr>
             </a:br>
-            <a:endParaRPr lang="en-US" dirty="0"/>
+            <a:endParaRPr lang="en-US" dirty="0">
+              <a:latin typeface="Arial" panose="020B0604020202020204" pitchFamily="34" charset="0"/>
+              <a:cs typeface="Arial" panose="020B0604020202020204" pitchFamily="34" charset="0"/>
+            </a:endParaRPr>
           </a:p>
         </p:txBody>
       </p:sp>
@@ -13395,10 +13408,16 @@
           <a:lstStyle/>
           <a:p>
             <a:r>
-              <a:rPr lang="en-US" sz="3200" dirty="0" smtClean="0"/>
+              <a:rPr lang="en-US" sz="3200" dirty="0" smtClean="0">
+                <a:latin typeface="Arial" panose="020B0604020202020204" pitchFamily="34" charset="0"/>
+                <a:cs typeface="Arial" panose="020B0604020202020204" pitchFamily="34" charset="0"/>
+              </a:rPr>
               <a:t>The rise of Internet and storage systems! </a:t>
             </a:r>
-            <a:endParaRPr lang="en-US" sz="3200" dirty="0"/>
+            <a:endParaRPr lang="en-US" sz="3200" dirty="0">
+              <a:latin typeface="Arial" panose="020B0604020202020204" pitchFamily="34" charset="0"/>
+              <a:cs typeface="Arial" panose="020B0604020202020204" pitchFamily="34" charset="0"/>
+            </a:endParaRPr>
           </a:p>
         </p:txBody>
       </p:sp>
@@ -13489,10 +13508,16 @@
           <a:lstStyle/>
           <a:p>
             <a:r>
-              <a:rPr lang="en-US" dirty="0" smtClean="0"/>
+              <a:rPr lang="en-US" dirty="0" smtClean="0">
+                <a:latin typeface="Arial" panose="020B0604020202020204" pitchFamily="34" charset="0"/>
+                <a:cs typeface="Arial" panose="020B0604020202020204" pitchFamily="34" charset="0"/>
+              </a:rPr>
               <a:t>Where to store my data?</a:t>
             </a:r>
-            <a:endParaRPr lang="en-US" dirty="0"/>
+            <a:endParaRPr lang="en-US" dirty="0">
+              <a:latin typeface="Arial" panose="020B0604020202020204" pitchFamily="34" charset="0"/>
+              <a:cs typeface="Arial" panose="020B0604020202020204" pitchFamily="34" charset="0"/>
+            </a:endParaRPr>
           </a:p>
         </p:txBody>
       </p:sp>
@@ -13523,13 +13548,27 @@
                 <a:solidFill>
                   <a:schemeClr val="bg1"/>
                 </a:solidFill>
+                <a:latin typeface="Arial" panose="020B0604020202020204" pitchFamily="34" charset="0"/>
+                <a:cs typeface="Arial" panose="020B0604020202020204" pitchFamily="34" charset="0"/>
               </a:rPr>
-              <a:t>In our Internet era, the database systems grows constantly. The efficiency, durability and the good maintenance are absolutely mandatory for the business!</a:t>
+              <a:t>In our Internet era, the database systems grows constantly. The efficiency, durability and the good maintenance are absolutely mandatory for the </a:t>
+            </a:r>
+            <a:r>
+              <a:rPr lang="en-US" sz="2000" dirty="0" smtClean="0">
+                <a:solidFill>
+                  <a:schemeClr val="bg1"/>
+                </a:solidFill>
+                <a:latin typeface="Arial" panose="020B0604020202020204" pitchFamily="34" charset="0"/>
+                <a:cs typeface="Arial" panose="020B0604020202020204" pitchFamily="34" charset="0"/>
+              </a:rPr>
+              <a:t>business!</a:t>
             </a:r>
             <a:endParaRPr lang="en-US" sz="2000" dirty="0">
               <a:solidFill>
                 <a:schemeClr val="bg1"/>
               </a:solidFill>
+              <a:latin typeface="Arial" panose="020B0604020202020204" pitchFamily="34" charset="0"/>
+              <a:cs typeface="Arial" panose="020B0604020202020204" pitchFamily="34" charset="0"/>
             </a:endParaRPr>
           </a:p>
         </p:txBody>
@@ -13618,10 +13657,16 @@
           <a:p>
             <a:pPr algn="ctr"/>
             <a:r>
-              <a:rPr lang="en-US" dirty="0" smtClean="0"/>
+              <a:rPr lang="en-US" dirty="0" smtClean="0">
+                <a:latin typeface="Arial" panose="020B0604020202020204" pitchFamily="34" charset="0"/>
+                <a:cs typeface="Arial" panose="020B0604020202020204" pitchFamily="34" charset="0"/>
+              </a:rPr>
               <a:t>SQL vs NoSQL databases</a:t>
             </a:r>
-            <a:endParaRPr lang="en-US" dirty="0"/>
+            <a:endParaRPr lang="en-US" dirty="0">
+              <a:latin typeface="Arial" panose="020B0604020202020204" pitchFamily="34" charset="0"/>
+              <a:cs typeface="Arial" panose="020B0604020202020204" pitchFamily="34" charset="0"/>
+            </a:endParaRPr>
           </a:p>
         </p:txBody>
       </p:sp>
@@ -13642,10 +13687,16 @@
           <a:p>
             <a:pPr algn="ctr"/>
             <a:r>
-              <a:rPr lang="en-US" dirty="0" smtClean="0"/>
+              <a:rPr lang="en-US" dirty="0" smtClean="0">
+                <a:latin typeface="Arial" panose="020B0604020202020204" pitchFamily="34" charset="0"/>
+                <a:cs typeface="Arial" panose="020B0604020202020204" pitchFamily="34" charset="0"/>
+              </a:rPr>
               <a:t>SQL Database systems</a:t>
             </a:r>
-            <a:endParaRPr lang="en-US" dirty="0"/>
+            <a:endParaRPr lang="en-US" dirty="0">
+              <a:latin typeface="Arial" panose="020B0604020202020204" pitchFamily="34" charset="0"/>
+              <a:cs typeface="Arial" panose="020B0604020202020204" pitchFamily="34" charset="0"/>
+            </a:endParaRPr>
           </a:p>
         </p:txBody>
       </p:sp>
@@ -13670,31 +13721,46 @@
           <a:lstStyle/>
           <a:p>
             <a:r>
-              <a:rPr lang="en-US" dirty="0" smtClean="0"/>
+              <a:rPr lang="en-US" dirty="0" smtClean="0">
+                <a:latin typeface="Arial" panose="020B0604020202020204" pitchFamily="34" charset="0"/>
+                <a:cs typeface="Arial" panose="020B0604020202020204" pitchFamily="34" charset="0"/>
+              </a:rPr>
               <a:t>MS SQL Server</a:t>
             </a:r>
           </a:p>
           <a:p>
             <a:r>
-              <a:rPr lang="en-US" dirty="0" smtClean="0"/>
+              <a:rPr lang="en-US" dirty="0" smtClean="0">
+                <a:latin typeface="Arial" panose="020B0604020202020204" pitchFamily="34" charset="0"/>
+                <a:cs typeface="Arial" panose="020B0604020202020204" pitchFamily="34" charset="0"/>
+              </a:rPr>
               <a:t>MySQL</a:t>
             </a:r>
           </a:p>
           <a:p>
             <a:r>
-              <a:rPr lang="en-US" dirty="0" smtClean="0"/>
+              <a:rPr lang="en-US" dirty="0" smtClean="0">
+                <a:latin typeface="Arial" panose="020B0604020202020204" pitchFamily="34" charset="0"/>
+                <a:cs typeface="Arial" panose="020B0604020202020204" pitchFamily="34" charset="0"/>
+              </a:rPr>
               <a:t>Oracle Database</a:t>
             </a:r>
           </a:p>
           <a:p>
             <a:r>
-              <a:rPr lang="en-US" dirty="0" smtClean="0"/>
+              <a:rPr lang="en-US" dirty="0" smtClean="0">
+                <a:latin typeface="Arial" panose="020B0604020202020204" pitchFamily="34" charset="0"/>
+                <a:cs typeface="Arial" panose="020B0604020202020204" pitchFamily="34" charset="0"/>
+              </a:rPr>
               <a:t>PostgreSQL</a:t>
             </a:r>
           </a:p>
           <a:p>
             <a:r>
-              <a:rPr lang="en-US" dirty="0" smtClean="0"/>
+              <a:rPr lang="en-US" dirty="0" smtClean="0">
+                <a:latin typeface="Arial" panose="020B0604020202020204" pitchFamily="34" charset="0"/>
+                <a:cs typeface="Arial" panose="020B0604020202020204" pitchFamily="34" charset="0"/>
+              </a:rPr>
               <a:t>IBM DB2</a:t>
             </a:r>
           </a:p>
@@ -13723,10 +13789,16 @@
           <a:p>
             <a:pPr algn="ctr"/>
             <a:r>
-              <a:rPr lang="en-US" dirty="0" smtClean="0"/>
+              <a:rPr lang="en-US" dirty="0" smtClean="0">
+                <a:latin typeface="Arial" panose="020B0604020202020204" pitchFamily="34" charset="0"/>
+                <a:cs typeface="Arial" panose="020B0604020202020204" pitchFamily="34" charset="0"/>
+              </a:rPr>
               <a:t>NoSQL Database systems</a:t>
             </a:r>
-            <a:endParaRPr lang="en-US" dirty="0"/>
+            <a:endParaRPr lang="en-US" dirty="0">
+              <a:latin typeface="Arial" panose="020B0604020202020204" pitchFamily="34" charset="0"/>
+              <a:cs typeface="Arial" panose="020B0604020202020204" pitchFamily="34" charset="0"/>
+            </a:endParaRPr>
           </a:p>
         </p:txBody>
       </p:sp>
@@ -13751,37 +13823,64 @@
           <a:lstStyle/>
           <a:p>
             <a:r>
-              <a:rPr lang="en-US" dirty="0" smtClean="0"/>
+              <a:rPr lang="en-US" dirty="0" smtClean="0">
+                <a:latin typeface="Arial" panose="020B0604020202020204" pitchFamily="34" charset="0"/>
+                <a:cs typeface="Arial" panose="020B0604020202020204" pitchFamily="34" charset="0"/>
+              </a:rPr>
               <a:t>MongoDB</a:t>
             </a:r>
           </a:p>
           <a:p>
             <a:r>
-              <a:rPr lang="en-US" dirty="0" err="1" smtClean="0"/>
+              <a:rPr lang="en-US" dirty="0" err="1" smtClean="0">
+                <a:latin typeface="Arial" panose="020B0604020202020204" pitchFamily="34" charset="0"/>
+                <a:cs typeface="Arial" panose="020B0604020202020204" pitchFamily="34" charset="0"/>
+              </a:rPr>
               <a:t>Redis</a:t>
             </a:r>
-            <a:endParaRPr lang="en-US" dirty="0" smtClean="0"/>
+            <a:endParaRPr lang="en-US" dirty="0" smtClean="0">
+              <a:latin typeface="Arial" panose="020B0604020202020204" pitchFamily="34" charset="0"/>
+              <a:cs typeface="Arial" panose="020B0604020202020204" pitchFamily="34" charset="0"/>
+            </a:endParaRPr>
           </a:p>
           <a:p>
             <a:r>
-              <a:rPr lang="en-US" dirty="0" err="1" smtClean="0"/>
+              <a:rPr lang="en-US" dirty="0" err="1" smtClean="0">
+                <a:latin typeface="Arial" panose="020B0604020202020204" pitchFamily="34" charset="0"/>
+                <a:cs typeface="Arial" panose="020B0604020202020204" pitchFamily="34" charset="0"/>
+              </a:rPr>
               <a:t>Couchbase</a:t>
             </a:r>
-            <a:endParaRPr lang="en-US" dirty="0" smtClean="0"/>
+            <a:endParaRPr lang="en-US" dirty="0" smtClean="0">
+              <a:latin typeface="Arial" panose="020B0604020202020204" pitchFamily="34" charset="0"/>
+              <a:cs typeface="Arial" panose="020B0604020202020204" pitchFamily="34" charset="0"/>
+            </a:endParaRPr>
           </a:p>
           <a:p>
             <a:r>
-              <a:rPr lang="en-US" dirty="0" err="1" smtClean="0"/>
+              <a:rPr lang="en-US" dirty="0" err="1" smtClean="0">
+                <a:latin typeface="Arial" panose="020B0604020202020204" pitchFamily="34" charset="0"/>
+                <a:cs typeface="Arial" panose="020B0604020202020204" pitchFamily="34" charset="0"/>
+              </a:rPr>
               <a:t>RavenDB</a:t>
             </a:r>
-            <a:endParaRPr lang="en-US" dirty="0" smtClean="0"/>
+            <a:endParaRPr lang="en-US" dirty="0" smtClean="0">
+              <a:latin typeface="Arial" panose="020B0604020202020204" pitchFamily="34" charset="0"/>
+              <a:cs typeface="Arial" panose="020B0604020202020204" pitchFamily="34" charset="0"/>
+            </a:endParaRPr>
           </a:p>
           <a:p>
             <a:r>
-              <a:rPr lang="en-US" dirty="0" smtClean="0"/>
+              <a:rPr lang="en-US" dirty="0" smtClean="0">
+                <a:latin typeface="Arial" panose="020B0604020202020204" pitchFamily="34" charset="0"/>
+                <a:cs typeface="Arial" panose="020B0604020202020204" pitchFamily="34" charset="0"/>
+              </a:rPr>
               <a:t>Cassandra</a:t>
             </a:r>
-            <a:endParaRPr lang="en-US" dirty="0"/>
+            <a:endParaRPr lang="en-US" dirty="0">
+              <a:latin typeface="Arial" panose="020B0604020202020204" pitchFamily="34" charset="0"/>
+              <a:cs typeface="Arial" panose="020B0604020202020204" pitchFamily="34" charset="0"/>
+            </a:endParaRPr>
           </a:p>
         </p:txBody>
       </p:sp>
@@ -13843,10 +13942,16 @@
           <a:lstStyle/>
           <a:p>
             <a:r>
-              <a:rPr lang="en-US" sz="3200" dirty="0" smtClean="0"/>
+              <a:rPr lang="en-US" sz="3200" dirty="0" smtClean="0">
+                <a:latin typeface="Arial" panose="020B0604020202020204" pitchFamily="34" charset="0"/>
+                <a:cs typeface="Arial" panose="020B0604020202020204" pitchFamily="34" charset="0"/>
+              </a:rPr>
               <a:t>SQL vs NoSQL (fundamental differences)</a:t>
             </a:r>
-            <a:endParaRPr lang="en-US" sz="3200" dirty="0"/>
+            <a:endParaRPr lang="en-US" sz="3200" dirty="0">
+              <a:latin typeface="Arial" panose="020B0604020202020204" pitchFamily="34" charset="0"/>
+              <a:cs typeface="Arial" panose="020B0604020202020204" pitchFamily="34" charset="0"/>
+            </a:endParaRPr>
           </a:p>
         </p:txBody>
       </p:sp>
@@ -13867,10 +13972,16 @@
           <a:p>
             <a:pPr algn="ctr"/>
             <a:r>
-              <a:rPr lang="en-US" dirty="0" smtClean="0"/>
+              <a:rPr lang="en-US" dirty="0" smtClean="0">
+                <a:latin typeface="Arial" panose="020B0604020202020204" pitchFamily="34" charset="0"/>
+                <a:cs typeface="Arial" panose="020B0604020202020204" pitchFamily="34" charset="0"/>
+              </a:rPr>
               <a:t>Table relations</a:t>
             </a:r>
-            <a:endParaRPr lang="en-US" dirty="0"/>
+            <a:endParaRPr lang="en-US" dirty="0">
+              <a:latin typeface="Arial" panose="020B0604020202020204" pitchFamily="34" charset="0"/>
+              <a:cs typeface="Arial" panose="020B0604020202020204" pitchFamily="34" charset="0"/>
+            </a:endParaRPr>
           </a:p>
         </p:txBody>
       </p:sp>
@@ -13920,10 +14031,16 @@
           <a:p>
             <a:pPr algn="ctr"/>
             <a:r>
-              <a:rPr lang="en-US" dirty="0" smtClean="0"/>
+              <a:rPr lang="en-US" dirty="0" smtClean="0">
+                <a:latin typeface="Arial" panose="020B0604020202020204" pitchFamily="34" charset="0"/>
+                <a:cs typeface="Arial" panose="020B0604020202020204" pitchFamily="34" charset="0"/>
+              </a:rPr>
               <a:t>Document model</a:t>
             </a:r>
-            <a:endParaRPr lang="en-US" dirty="0"/>
+            <a:endParaRPr lang="en-US" dirty="0">
+              <a:latin typeface="Arial" panose="020B0604020202020204" pitchFamily="34" charset="0"/>
+              <a:cs typeface="Arial" panose="020B0604020202020204" pitchFamily="34" charset="0"/>
+            </a:endParaRPr>
           </a:p>
         </p:txBody>
       </p:sp>
@@ -14010,10 +14127,16 @@
           <a:p>
             <a:pPr algn="ctr"/>
             <a:r>
-              <a:rPr lang="en-US" dirty="0" smtClean="0"/>
+              <a:rPr lang="en-US" dirty="0" smtClean="0">
+                <a:latin typeface="Arial" panose="020B0604020202020204" pitchFamily="34" charset="0"/>
+                <a:cs typeface="Arial" panose="020B0604020202020204" pitchFamily="34" charset="0"/>
+              </a:rPr>
               <a:t>MS SQL server profiler is a great tool! </a:t>
             </a:r>
-            <a:endParaRPr lang="en-US" dirty="0"/>
+            <a:endParaRPr lang="en-US" dirty="0">
+              <a:latin typeface="Arial" panose="020B0604020202020204" pitchFamily="34" charset="0"/>
+              <a:cs typeface="Arial" panose="020B0604020202020204" pitchFamily="34" charset="0"/>
+            </a:endParaRPr>
           </a:p>
         </p:txBody>
       </p:sp>
@@ -14124,7 +14247,7 @@
         </p:nvSpPr>
         <p:spPr>
           <a:xfrm>
-            <a:off x="1136482" y="1496290"/>
+            <a:off x="1240606" y="2063711"/>
             <a:ext cx="2940939" cy="577273"/>
           </a:xfrm>
         </p:spPr>
@@ -14133,10 +14256,16 @@
           <a:lstStyle/>
           <a:p>
             <a:r>
-              <a:rPr lang="en-US" sz="3200" dirty="0" smtClean="0"/>
+              <a:rPr lang="en-US" sz="3200" dirty="0" smtClean="0">
+                <a:latin typeface="Arial" panose="020B0604020202020204" pitchFamily="34" charset="0"/>
+                <a:cs typeface="Arial" panose="020B0604020202020204" pitchFamily="34" charset="0"/>
+              </a:rPr>
               <a:t>ADO.NET</a:t>
             </a:r>
-            <a:endParaRPr lang="en-US" sz="3200" dirty="0"/>
+            <a:endParaRPr lang="en-US" sz="3200" dirty="0">
+              <a:latin typeface="Arial" panose="020B0604020202020204" pitchFamily="34" charset="0"/>
+              <a:cs typeface="Arial" panose="020B0604020202020204" pitchFamily="34" charset="0"/>
+            </a:endParaRPr>
           </a:p>
         </p:txBody>
       </p:sp>
@@ -14181,8 +14310,8 @@
         </p:nvSpPr>
         <p:spPr>
           <a:xfrm>
-            <a:off x="1136482" y="2285999"/>
-            <a:ext cx="3518645" cy="2535383"/>
+            <a:off x="840918" y="2842491"/>
+            <a:ext cx="3832682" cy="1517074"/>
           </a:xfrm>
         </p:spPr>
         <p:txBody>
@@ -14196,6 +14325,8 @@
                 <a:solidFill>
                   <a:schemeClr val="bg1"/>
                 </a:solidFill>
+                <a:latin typeface="Arial" panose="020B0604020202020204" pitchFamily="34" charset="0"/>
+                <a:cs typeface="Arial" panose="020B0604020202020204" pitchFamily="34" charset="0"/>
               </a:rPr>
               <a:t>ADO.NET is the latest Microsoft database access technology. It’s a set of classes that expose data access services.</a:t>
             </a:r>
@@ -14203,6 +14334,8 @@
               <a:solidFill>
                 <a:schemeClr val="bg1"/>
               </a:solidFill>
+              <a:latin typeface="Arial" panose="020B0604020202020204" pitchFamily="34" charset="0"/>
+              <a:cs typeface="Arial" panose="020B0604020202020204" pitchFamily="34" charset="0"/>
             </a:endParaRPr>
           </a:p>
         </p:txBody>
@@ -14260,6 +14393,13 @@
   <p:clrMapOvr>
     <a:masterClrMapping/>
   </p:clrMapOvr>
+  <p:timing>
+    <p:tnLst>
+      <p:par>
+        <p:cTn id="1" dur="indefinite" restart="never" nodeType="tmRoot"/>
+      </p:par>
+    </p:tnLst>
+  </p:timing>
 </p:sld>
 </file>
 
@@ -14303,10 +14443,16 @@
           <a:lstStyle/>
           <a:p>
             <a:r>
-              <a:rPr lang="en-US" dirty="0" smtClean="0"/>
+              <a:rPr lang="en-US" dirty="0" smtClean="0">
+                <a:latin typeface="Arial" panose="020B0604020202020204" pitchFamily="34" charset="0"/>
+                <a:cs typeface="Arial" panose="020B0604020202020204" pitchFamily="34" charset="0"/>
+              </a:rPr>
               <a:t>What is ORM and how it works?</a:t>
             </a:r>
-            <a:endParaRPr lang="en-US" dirty="0"/>
+            <a:endParaRPr lang="en-US" dirty="0">
+              <a:latin typeface="Arial" panose="020B0604020202020204" pitchFamily="34" charset="0"/>
+              <a:cs typeface="Arial" panose="020B0604020202020204" pitchFamily="34" charset="0"/>
+            </a:endParaRPr>
           </a:p>
         </p:txBody>
       </p:sp>
@@ -14366,6 +14512,8 @@
                 <a:solidFill>
                   <a:schemeClr val="bg1"/>
                 </a:solidFill>
+                <a:latin typeface="Arial" panose="020B0604020202020204" pitchFamily="34" charset="0"/>
+                <a:cs typeface="Arial" panose="020B0604020202020204" pitchFamily="34" charset="0"/>
               </a:rPr>
               <a:t>ORM stands from Object Relational Mapper and is a library that automates the transfer of data between database tables into objects and vice versa.</a:t>
             </a:r>
@@ -14373,6 +14521,8 @@
               <a:solidFill>
                 <a:schemeClr val="bg1"/>
               </a:solidFill>
+              <a:latin typeface="Arial" panose="020B0604020202020204" pitchFamily="34" charset="0"/>
+              <a:cs typeface="Arial" panose="020B0604020202020204" pitchFamily="34" charset="0"/>
             </a:endParaRPr>
           </a:p>
         </p:txBody>
@@ -14387,6 +14537,446 @@
   <p:clrMapOvr>
     <a:masterClrMapping/>
   </p:clrMapOvr>
+  <p:timing>
+    <p:tnLst>
+      <p:par>
+        <p:cTn id="1" dur="indefinite" restart="never" nodeType="tmRoot"/>
+      </p:par>
+    </p:tnLst>
+  </p:timing>
+</p:sld>
+</file>
+
+<file path=ppt/slides/slide9.xml><?xml version="1.0" encoding="utf-8"?>
+<p:sld xmlns:a="http://schemas.openxmlformats.org/drawingml/2006/main" xmlns:r="http://schemas.openxmlformats.org/officeDocument/2006/relationships" xmlns:p="http://schemas.openxmlformats.org/presentationml/2006/main">
+  <p:cSld>
+    <p:spTree>
+      <p:nvGrpSpPr>
+        <p:cNvPr id="1" name=""/>
+        <p:cNvGrpSpPr/>
+        <p:nvPr/>
+      </p:nvGrpSpPr>
+      <p:grpSpPr>
+        <a:xfrm>
+          <a:off x="0" y="0"/>
+          <a:ext cx="0" cy="0"/>
+          <a:chOff x="0" y="0"/>
+          <a:chExt cx="0" cy="0"/>
+        </a:xfrm>
+      </p:grpSpPr>
+      <p:sp>
+        <p:nvSpPr>
+          <p:cNvPr id="2" name="Title 1"/>
+          <p:cNvSpPr>
+            <a:spLocks noGrp="1"/>
+          </p:cNvSpPr>
+          <p:nvPr>
+            <p:ph type="title"/>
+          </p:nvPr>
+        </p:nvSpPr>
+        <p:spPr/>
+        <p:txBody>
+          <a:bodyPr/>
+          <a:lstStyle/>
+          <a:p>
+            <a:pPr algn="ctr"/>
+            <a:r>
+              <a:rPr lang="en-US" dirty="0" smtClean="0">
+                <a:latin typeface="Arial" panose="020B0604020202020204" pitchFamily="34" charset="0"/>
+                <a:cs typeface="Arial" panose="020B0604020202020204" pitchFamily="34" charset="0"/>
+              </a:rPr>
+              <a:t>The benefits of ORM systems?</a:t>
+            </a:r>
+            <a:endParaRPr lang="en-US" dirty="0">
+              <a:latin typeface="Arial" panose="020B0604020202020204" pitchFamily="34" charset="0"/>
+              <a:cs typeface="Arial" panose="020B0604020202020204" pitchFamily="34" charset="0"/>
+            </a:endParaRPr>
+          </a:p>
+        </p:txBody>
+      </p:sp>
+      <p:sp>
+        <p:nvSpPr>
+          <p:cNvPr id="4" name="Content Placeholder 3"/>
+          <p:cNvSpPr txBox="1">
+            <a:spLocks/>
+          </p:cNvSpPr>
+          <p:nvPr/>
+        </p:nvSpPr>
+        <p:spPr>
+          <a:xfrm>
+            <a:off x="1025236" y="3565236"/>
+            <a:ext cx="3980873" cy="1782619"/>
+          </a:xfrm>
+          <a:prstGeom prst="rect">
+            <a:avLst/>
+          </a:prstGeom>
+        </p:spPr>
+        <p:txBody>
+          <a:bodyPr/>
+          <a:lstStyle>
+            <a:lvl1pPr marL="342900" indent="-342900" algn="l" defTabSz="457200" rtl="0" eaLnBrk="1" latinLnBrk="0" hangingPunct="1">
+              <a:spcBef>
+                <a:spcPts val="1000"/>
+              </a:spcBef>
+              <a:spcAft>
+                <a:spcPts val="0"/>
+              </a:spcAft>
+              <a:buClr>
+                <a:schemeClr val="accent1"/>
+              </a:buClr>
+              <a:buSzPct val="80000"/>
+              <a:buFont typeface="Wingdings 3" charset="2"/>
+              <a:buChar char=""/>
+              <a:defRPr sz="1800" b="0" i="0" kern="1200">
+                <a:solidFill>
+                  <a:schemeClr val="tx1">
+                    <a:lumMod val="75000"/>
+                    <a:lumOff val="25000"/>
+                  </a:schemeClr>
+                </a:solidFill>
+                <a:latin typeface="+mn-lt"/>
+                <a:ea typeface="+mn-ea"/>
+                <a:cs typeface="+mn-cs"/>
+              </a:defRPr>
+            </a:lvl1pPr>
+            <a:lvl2pPr marL="742950" indent="-285750" algn="l" defTabSz="457200" rtl="0" eaLnBrk="1" latinLnBrk="0" hangingPunct="1">
+              <a:spcBef>
+                <a:spcPts val="1000"/>
+              </a:spcBef>
+              <a:spcAft>
+                <a:spcPts val="0"/>
+              </a:spcAft>
+              <a:buClr>
+                <a:schemeClr val="accent1"/>
+              </a:buClr>
+              <a:buSzPct val="80000"/>
+              <a:buFont typeface="Wingdings 3" charset="2"/>
+              <a:buChar char=""/>
+              <a:defRPr sz="1600" b="0" i="0" kern="1200">
+                <a:solidFill>
+                  <a:schemeClr val="tx1">
+                    <a:lumMod val="75000"/>
+                    <a:lumOff val="25000"/>
+                  </a:schemeClr>
+                </a:solidFill>
+                <a:latin typeface="+mn-lt"/>
+                <a:ea typeface="+mn-ea"/>
+                <a:cs typeface="+mn-cs"/>
+              </a:defRPr>
+            </a:lvl2pPr>
+            <a:lvl3pPr marL="1143000" indent="-228600" algn="l" defTabSz="457200" rtl="0" eaLnBrk="1" latinLnBrk="0" hangingPunct="1">
+              <a:spcBef>
+                <a:spcPts val="1000"/>
+              </a:spcBef>
+              <a:spcAft>
+                <a:spcPts val="0"/>
+              </a:spcAft>
+              <a:buClr>
+                <a:schemeClr val="accent1"/>
+              </a:buClr>
+              <a:buSzPct val="80000"/>
+              <a:buFont typeface="Wingdings 3" charset="2"/>
+              <a:buChar char=""/>
+              <a:defRPr sz="1400" b="0" i="0" kern="1200">
+                <a:solidFill>
+                  <a:schemeClr val="tx1">
+                    <a:lumMod val="75000"/>
+                    <a:lumOff val="25000"/>
+                  </a:schemeClr>
+                </a:solidFill>
+                <a:latin typeface="+mn-lt"/>
+                <a:ea typeface="+mn-ea"/>
+                <a:cs typeface="+mn-cs"/>
+              </a:defRPr>
+            </a:lvl3pPr>
+            <a:lvl4pPr marL="1600200" indent="-228600" algn="l" defTabSz="457200" rtl="0" eaLnBrk="1" latinLnBrk="0" hangingPunct="1">
+              <a:spcBef>
+                <a:spcPts val="1000"/>
+              </a:spcBef>
+              <a:spcAft>
+                <a:spcPts val="0"/>
+              </a:spcAft>
+              <a:buClr>
+                <a:schemeClr val="accent1"/>
+              </a:buClr>
+              <a:buSzPct val="80000"/>
+              <a:buFont typeface="Wingdings 3" charset="2"/>
+              <a:buChar char=""/>
+              <a:defRPr sz="1200" b="0" i="0" kern="1200">
+                <a:solidFill>
+                  <a:schemeClr val="tx1">
+                    <a:lumMod val="75000"/>
+                    <a:lumOff val="25000"/>
+                  </a:schemeClr>
+                </a:solidFill>
+                <a:latin typeface="+mn-lt"/>
+                <a:ea typeface="+mn-ea"/>
+                <a:cs typeface="+mn-cs"/>
+              </a:defRPr>
+            </a:lvl4pPr>
+            <a:lvl5pPr marL="2057400" indent="-228600" algn="l" defTabSz="457200" rtl="0" eaLnBrk="1" latinLnBrk="0" hangingPunct="1">
+              <a:spcBef>
+                <a:spcPts val="1000"/>
+              </a:spcBef>
+              <a:spcAft>
+                <a:spcPts val="0"/>
+              </a:spcAft>
+              <a:buClr>
+                <a:schemeClr val="accent1"/>
+              </a:buClr>
+              <a:buSzPct val="80000"/>
+              <a:buFont typeface="Wingdings 3" charset="2"/>
+              <a:buChar char=""/>
+              <a:defRPr sz="1200" b="0" i="0" kern="1200">
+                <a:solidFill>
+                  <a:schemeClr val="tx1">
+                    <a:lumMod val="75000"/>
+                    <a:lumOff val="25000"/>
+                  </a:schemeClr>
+                </a:solidFill>
+                <a:latin typeface="+mn-lt"/>
+                <a:ea typeface="+mn-ea"/>
+                <a:cs typeface="+mn-cs"/>
+              </a:defRPr>
+            </a:lvl5pPr>
+            <a:lvl6pPr marL="2514600" indent="-228600" algn="l" defTabSz="457200" rtl="0" eaLnBrk="1" latinLnBrk="0" hangingPunct="1">
+              <a:spcBef>
+                <a:spcPts val="1000"/>
+              </a:spcBef>
+              <a:spcAft>
+                <a:spcPts val="0"/>
+              </a:spcAft>
+              <a:buClr>
+                <a:schemeClr val="accent1"/>
+              </a:buClr>
+              <a:buSzPct val="80000"/>
+              <a:buFont typeface="Wingdings 3" charset="2"/>
+              <a:buChar char=""/>
+              <a:defRPr sz="1200" b="0" i="0" kern="1200">
+                <a:solidFill>
+                  <a:schemeClr val="tx1">
+                    <a:lumMod val="75000"/>
+                    <a:lumOff val="25000"/>
+                  </a:schemeClr>
+                </a:solidFill>
+                <a:latin typeface="+mn-lt"/>
+                <a:ea typeface="+mn-ea"/>
+                <a:cs typeface="+mn-cs"/>
+              </a:defRPr>
+            </a:lvl6pPr>
+            <a:lvl7pPr marL="2971800" indent="-228600" algn="l" defTabSz="457200" rtl="0" eaLnBrk="1" latinLnBrk="0" hangingPunct="1">
+              <a:spcBef>
+                <a:spcPts val="1000"/>
+              </a:spcBef>
+              <a:spcAft>
+                <a:spcPts val="0"/>
+              </a:spcAft>
+              <a:buClr>
+                <a:schemeClr val="accent1"/>
+              </a:buClr>
+              <a:buSzPct val="80000"/>
+              <a:buFont typeface="Wingdings 3" charset="2"/>
+              <a:buChar char=""/>
+              <a:defRPr sz="1200" b="0" i="0" kern="1200">
+                <a:solidFill>
+                  <a:schemeClr val="tx1">
+                    <a:lumMod val="75000"/>
+                    <a:lumOff val="25000"/>
+                  </a:schemeClr>
+                </a:solidFill>
+                <a:latin typeface="+mn-lt"/>
+                <a:ea typeface="+mn-ea"/>
+                <a:cs typeface="+mn-cs"/>
+              </a:defRPr>
+            </a:lvl7pPr>
+            <a:lvl8pPr marL="3429000" indent="-228600" algn="l" defTabSz="457200" rtl="0" eaLnBrk="1" latinLnBrk="0" hangingPunct="1">
+              <a:spcBef>
+                <a:spcPts val="1000"/>
+              </a:spcBef>
+              <a:spcAft>
+                <a:spcPts val="0"/>
+              </a:spcAft>
+              <a:buClr>
+                <a:schemeClr val="accent1"/>
+              </a:buClr>
+              <a:buSzPct val="80000"/>
+              <a:buFont typeface="Wingdings 3" charset="2"/>
+              <a:buChar char=""/>
+              <a:defRPr sz="1200" b="0" i="0" kern="1200">
+                <a:solidFill>
+                  <a:schemeClr val="tx1">
+                    <a:lumMod val="75000"/>
+                    <a:lumOff val="25000"/>
+                  </a:schemeClr>
+                </a:solidFill>
+                <a:latin typeface="+mn-lt"/>
+                <a:ea typeface="+mn-ea"/>
+                <a:cs typeface="+mn-cs"/>
+              </a:defRPr>
+            </a:lvl8pPr>
+            <a:lvl9pPr marL="3886200" indent="-228600" algn="l" defTabSz="457200" rtl="0" eaLnBrk="1" latinLnBrk="0" hangingPunct="1">
+              <a:spcBef>
+                <a:spcPts val="1000"/>
+              </a:spcBef>
+              <a:spcAft>
+                <a:spcPts val="0"/>
+              </a:spcAft>
+              <a:buClr>
+                <a:schemeClr val="accent1"/>
+              </a:buClr>
+              <a:buSzPct val="80000"/>
+              <a:buFont typeface="Wingdings 3" charset="2"/>
+              <a:buChar char=""/>
+              <a:defRPr sz="1200" b="0" i="0" kern="1200">
+                <a:solidFill>
+                  <a:schemeClr val="tx1">
+                    <a:lumMod val="75000"/>
+                    <a:lumOff val="25000"/>
+                  </a:schemeClr>
+                </a:solidFill>
+                <a:latin typeface="+mn-lt"/>
+                <a:ea typeface="+mn-ea"/>
+                <a:cs typeface="+mn-cs"/>
+              </a:defRPr>
+            </a:lvl9pPr>
+          </a:lstStyle>
+          <a:p>
+            <a:r>
+              <a:rPr lang="en-US" dirty="0" smtClean="0">
+                <a:latin typeface="Arial" panose="020B0604020202020204" pitchFamily="34" charset="0"/>
+                <a:cs typeface="Arial" panose="020B0604020202020204" pitchFamily="34" charset="0"/>
+              </a:rPr>
+              <a:t>Productivity</a:t>
+            </a:r>
+          </a:p>
+          <a:p>
+            <a:r>
+              <a:rPr lang="en-US" dirty="0" smtClean="0">
+                <a:latin typeface="Arial" panose="020B0604020202020204" pitchFamily="34" charset="0"/>
+                <a:cs typeface="Arial" panose="020B0604020202020204" pitchFamily="34" charset="0"/>
+              </a:rPr>
+              <a:t>Application Design</a:t>
+            </a:r>
+          </a:p>
+          <a:p>
+            <a:r>
+              <a:rPr lang="en-US" dirty="0" smtClean="0">
+                <a:latin typeface="Arial" panose="020B0604020202020204" pitchFamily="34" charset="0"/>
+                <a:cs typeface="Arial" panose="020B0604020202020204" pitchFamily="34" charset="0"/>
+              </a:rPr>
+              <a:t>Code Reuse</a:t>
+            </a:r>
+          </a:p>
+          <a:p>
+            <a:r>
+              <a:rPr lang="en-US" dirty="0" smtClean="0">
+                <a:latin typeface="Arial" panose="020B0604020202020204" pitchFamily="34" charset="0"/>
+                <a:cs typeface="Arial" panose="020B0604020202020204" pitchFamily="34" charset="0"/>
+              </a:rPr>
+              <a:t>Application Maintainability</a:t>
+            </a:r>
+          </a:p>
+          <a:p>
+            <a:endParaRPr lang="en-US" dirty="0" smtClean="0"/>
+          </a:p>
+          <a:p>
+            <a:endParaRPr lang="en-US" dirty="0"/>
+          </a:p>
+        </p:txBody>
+      </p:sp>
+      <p:pic>
+        <p:nvPicPr>
+          <p:cNvPr id="9" name="Picture 8"/>
+          <p:cNvPicPr>
+            <a:picLocks noChangeAspect="1"/>
+          </p:cNvPicPr>
+          <p:nvPr/>
+        </p:nvPicPr>
+        <p:blipFill>
+          <a:blip r:embed="rId2">
+            <a:extLst>
+              <a:ext uri="{28A0092B-C50C-407E-A947-70E740481C1C}">
+                <a14:useLocalDpi xmlns:a14="http://schemas.microsoft.com/office/drawing/2010/main" val="0"/>
+              </a:ext>
+            </a:extLst>
+          </a:blip>
+          <a:stretch>
+            <a:fillRect/>
+          </a:stretch>
+        </p:blipFill>
+        <p:spPr>
+          <a:xfrm>
+            <a:off x="5163127" y="3719463"/>
+            <a:ext cx="6837063" cy="1474163"/>
+          </a:xfrm>
+          <a:prstGeom prst="rect">
+            <a:avLst/>
+          </a:prstGeom>
+        </p:spPr>
+      </p:pic>
+      <p:sp>
+        <p:nvSpPr>
+          <p:cNvPr id="10" name="TextBox 9"/>
+          <p:cNvSpPr txBox="1"/>
+          <p:nvPr/>
+        </p:nvSpPr>
+        <p:spPr>
+          <a:xfrm>
+            <a:off x="5818911" y="3195904"/>
+            <a:ext cx="5098472" cy="369332"/>
+          </a:xfrm>
+          <a:prstGeom prst="rect">
+            <a:avLst/>
+          </a:prstGeom>
+          <a:noFill/>
+        </p:spPr>
+        <p:txBody>
+          <a:bodyPr wrap="square" rtlCol="0">
+            <a:spAutoFit/>
+          </a:bodyPr>
+          <a:lstStyle/>
+          <a:p>
+            <a:r>
+              <a:rPr lang="en-US" dirty="0" smtClean="0">
+                <a:solidFill>
+                  <a:schemeClr val="accent6">
+                    <a:lumMod val="50000"/>
+                  </a:schemeClr>
+                </a:solidFill>
+                <a:latin typeface="Arial" panose="020B0604020202020204" pitchFamily="34" charset="0"/>
+                <a:cs typeface="Arial" panose="020B0604020202020204" pitchFamily="34" charset="0"/>
+              </a:rPr>
+              <a:t>We work with C# but not with SQL anymore!</a:t>
+            </a:r>
+            <a:endParaRPr lang="en-US" dirty="0">
+              <a:solidFill>
+                <a:schemeClr val="accent6">
+                  <a:lumMod val="50000"/>
+                </a:schemeClr>
+              </a:solidFill>
+              <a:latin typeface="Arial" panose="020B0604020202020204" pitchFamily="34" charset="0"/>
+              <a:cs typeface="Arial" panose="020B0604020202020204" pitchFamily="34" charset="0"/>
+            </a:endParaRPr>
+          </a:p>
+        </p:txBody>
+      </p:sp>
+    </p:spTree>
+    <p:extLst>
+      <p:ext uri="{BB962C8B-B14F-4D97-AF65-F5344CB8AC3E}">
+        <p14:creationId xmlns:p14="http://schemas.microsoft.com/office/powerpoint/2010/main" val="1202831630"/>
+      </p:ext>
+    </p:extLst>
+  </p:cSld>
+  <p:clrMapOvr>
+    <a:masterClrMapping/>
+  </p:clrMapOvr>
+  <p:timing>
+    <p:tnLst>
+      <p:par>
+        <p:cTn id="1" dur="indefinite" restart="never" nodeType="tmRoot"/>
+      </p:par>
+    </p:tnLst>
+  </p:timing>
 </p:sld>
 </file>
 

</xml_diff>

<commit_message>
Ready EF Core presentation
</commit_message>
<xml_diff>
--- a/Databases_and_EntityFrameworkCore.pptx
+++ b/Databases_and_EntityFrameworkCore.pptx
@@ -14,6 +14,13 @@
     <p:sldId id="262" r:id="rId8"/>
     <p:sldId id="263" r:id="rId9"/>
     <p:sldId id="264" r:id="rId10"/>
+    <p:sldId id="265" r:id="rId11"/>
+    <p:sldId id="266" r:id="rId12"/>
+    <p:sldId id="267" r:id="rId13"/>
+    <p:sldId id="268" r:id="rId14"/>
+    <p:sldId id="269" r:id="rId15"/>
+    <p:sldId id="270" r:id="rId16"/>
+    <p:sldId id="271" r:id="rId17"/>
   </p:sldIdLst>
   <p:sldSz cx="12192000" cy="6858000"/>
   <p:notesSz cx="6858000" cy="9144000"/>
@@ -126,6 +133,13 @@
             <p14:sldId id="262"/>
             <p14:sldId id="263"/>
             <p14:sldId id="264"/>
+            <p14:sldId id="265"/>
+            <p14:sldId id="266"/>
+            <p14:sldId id="267"/>
+            <p14:sldId id="268"/>
+            <p14:sldId id="269"/>
+            <p14:sldId id="270"/>
+            <p14:sldId id="271"/>
           </p14:sldIdLst>
         </p14:section>
       </p14:sectionLst>
@@ -498,9 +512,9 @@
           <a:p>
             <a:fld id="{87DD66F1-7FC0-403D-82FE-3DDCE4AD2CCB}" type="datetimeFigureOut">
               <a:rPr lang="en-US" smtClean="0"/>
-              <a:t>9/9/2021</a:t>
+              <a:t>9/10/2021</a:t>
             </a:fld>
-            <a:endParaRPr lang="en-US"/>
+            <a:endParaRPr lang="en-US" dirty="0"/>
           </a:p>
         </p:txBody>
       </p:sp>
@@ -534,7 +548,7 @@
             </a:lvl1pPr>
           </a:lstStyle>
           <a:p>
-            <a:endParaRPr lang="en-US"/>
+            <a:endParaRPr lang="en-US" dirty="0"/>
           </a:p>
         </p:txBody>
       </p:sp>
@@ -598,7 +612,7 @@
               <a:rPr lang="en-US" smtClean="0"/>
               <a:t>‹#›</a:t>
             </a:fld>
-            <a:endParaRPr lang="en-US"/>
+            <a:endParaRPr lang="en-US" dirty="0"/>
           </a:p>
         </p:txBody>
       </p:sp>
@@ -1488,7 +1502,7 @@
           </a:lstStyle>
           <a:p>
             <a:r>
-              <a:rPr lang="en-US" smtClean="0"/>
+              <a:rPr lang="en-US" dirty="0" smtClean="0"/>
               <a:t>Click icon to add picture</a:t>
             </a:r>
             <a:endParaRPr lang="en-US" dirty="0"/>
@@ -1586,9 +1600,9 @@
           <a:p>
             <a:fld id="{87DD66F1-7FC0-403D-82FE-3DDCE4AD2CCB}" type="datetimeFigureOut">
               <a:rPr lang="en-US" smtClean="0"/>
-              <a:t>9/9/2021</a:t>
+              <a:t>9/10/2021</a:t>
             </a:fld>
-            <a:endParaRPr lang="en-US"/>
+            <a:endParaRPr lang="en-US" dirty="0"/>
           </a:p>
         </p:txBody>
       </p:sp>
@@ -1607,7 +1621,7 @@
           <a:bodyPr/>
           <a:lstStyle/>
           <a:p>
-            <a:endParaRPr lang="en-US"/>
+            <a:endParaRPr lang="en-US" dirty="0"/>
           </a:p>
         </p:txBody>
       </p:sp>
@@ -1666,7 +1680,7 @@
               <a:rPr lang="en-US" smtClean="0"/>
               <a:t>‹#›</a:t>
             </a:fld>
-            <a:endParaRPr lang="en-US"/>
+            <a:endParaRPr lang="en-US" dirty="0"/>
           </a:p>
         </p:txBody>
       </p:sp>
@@ -2566,9 +2580,9 @@
           <a:p>
             <a:fld id="{87DD66F1-7FC0-403D-82FE-3DDCE4AD2CCB}" type="datetimeFigureOut">
               <a:rPr lang="en-US" smtClean="0"/>
-              <a:t>9/9/2021</a:t>
+              <a:t>9/10/2021</a:t>
             </a:fld>
-            <a:endParaRPr lang="en-US"/>
+            <a:endParaRPr lang="en-US" dirty="0"/>
           </a:p>
         </p:txBody>
       </p:sp>
@@ -2587,7 +2601,7 @@
           <a:bodyPr/>
           <a:lstStyle/>
           <a:p>
-            <a:endParaRPr lang="en-US"/>
+            <a:endParaRPr lang="en-US" dirty="0"/>
           </a:p>
         </p:txBody>
       </p:sp>
@@ -2646,7 +2660,7 @@
               <a:rPr lang="en-US" smtClean="0"/>
               <a:t>‹#›</a:t>
             </a:fld>
-            <a:endParaRPr lang="en-US"/>
+            <a:endParaRPr lang="en-US" dirty="0"/>
           </a:p>
         </p:txBody>
       </p:sp>
@@ -3700,9 +3714,9 @@
           <a:p>
             <a:fld id="{87DD66F1-7FC0-403D-82FE-3DDCE4AD2CCB}" type="datetimeFigureOut">
               <a:rPr lang="en-US" smtClean="0"/>
-              <a:t>9/9/2021</a:t>
+              <a:t>9/10/2021</a:t>
             </a:fld>
-            <a:endParaRPr lang="en-US"/>
+            <a:endParaRPr lang="en-US" dirty="0"/>
           </a:p>
         </p:txBody>
       </p:sp>
@@ -3721,7 +3735,7 @@
           <a:bodyPr/>
           <a:lstStyle/>
           <a:p>
-            <a:endParaRPr lang="en-US"/>
+            <a:endParaRPr lang="en-US" dirty="0"/>
           </a:p>
         </p:txBody>
       </p:sp>
@@ -3780,7 +3794,7 @@
               <a:rPr lang="en-US" smtClean="0"/>
               <a:t>‹#›</a:t>
             </a:fld>
-            <a:endParaRPr lang="en-US"/>
+            <a:endParaRPr lang="en-US" dirty="0"/>
           </a:p>
         </p:txBody>
       </p:sp>
@@ -4733,9 +4747,9 @@
           <a:p>
             <a:fld id="{87DD66F1-7FC0-403D-82FE-3DDCE4AD2CCB}" type="datetimeFigureOut">
               <a:rPr lang="en-US" smtClean="0"/>
-              <a:t>9/9/2021</a:t>
+              <a:t>9/10/2021</a:t>
             </a:fld>
-            <a:endParaRPr lang="en-US"/>
+            <a:endParaRPr lang="en-US" dirty="0"/>
           </a:p>
         </p:txBody>
       </p:sp>
@@ -4754,7 +4768,7 @@
           <a:bodyPr/>
           <a:lstStyle/>
           <a:p>
-            <a:endParaRPr lang="en-US"/>
+            <a:endParaRPr lang="en-US" dirty="0"/>
           </a:p>
         </p:txBody>
       </p:sp>
@@ -4813,7 +4827,7 @@
               <a:rPr lang="en-US" smtClean="0"/>
               <a:t>‹#›</a:t>
             </a:fld>
-            <a:endParaRPr lang="en-US"/>
+            <a:endParaRPr lang="en-US" dirty="0"/>
           </a:p>
         </p:txBody>
       </p:sp>
@@ -5393,9 +5407,9 @@
           <a:p>
             <a:fld id="{87DD66F1-7FC0-403D-82FE-3DDCE4AD2CCB}" type="datetimeFigureOut">
               <a:rPr lang="en-US" smtClean="0"/>
-              <a:t>9/9/2021</a:t>
+              <a:t>9/10/2021</a:t>
             </a:fld>
-            <a:endParaRPr lang="en-US"/>
+            <a:endParaRPr lang="en-US" dirty="0"/>
           </a:p>
         </p:txBody>
       </p:sp>
@@ -5414,7 +5428,7 @@
           <a:bodyPr/>
           <a:lstStyle/>
           <a:p>
-            <a:endParaRPr lang="en-US"/>
+            <a:endParaRPr lang="en-US" dirty="0"/>
           </a:p>
         </p:txBody>
       </p:sp>
@@ -5437,7 +5451,7 @@
               <a:rPr lang="en-US" smtClean="0"/>
               <a:t>‹#›</a:t>
             </a:fld>
-            <a:endParaRPr lang="en-US"/>
+            <a:endParaRPr lang="en-US" dirty="0"/>
           </a:p>
         </p:txBody>
       </p:sp>
@@ -5649,7 +5663,7 @@
           </a:lstStyle>
           <a:p>
             <a:r>
-              <a:rPr lang="en-US" smtClean="0"/>
+              <a:rPr lang="en-US" dirty="0" smtClean="0"/>
               <a:t>Click icon to add picture</a:t>
             </a:r>
             <a:endParaRPr lang="en-US" dirty="0"/>
@@ -5869,7 +5883,7 @@
           </a:lstStyle>
           <a:p>
             <a:r>
-              <a:rPr lang="en-US" smtClean="0"/>
+              <a:rPr lang="en-US" dirty="0" smtClean="0"/>
               <a:t>Click icon to add picture</a:t>
             </a:r>
             <a:endParaRPr lang="en-US" dirty="0"/>
@@ -6089,7 +6103,7 @@
           </a:lstStyle>
           <a:p>
             <a:r>
-              <a:rPr lang="en-US" smtClean="0"/>
+              <a:rPr lang="en-US" dirty="0" smtClean="0"/>
               <a:t>Click icon to add picture</a:t>
             </a:r>
             <a:endParaRPr lang="en-US" dirty="0"/>
@@ -6254,9 +6268,9 @@
           <a:p>
             <a:fld id="{87DD66F1-7FC0-403D-82FE-3DDCE4AD2CCB}" type="datetimeFigureOut">
               <a:rPr lang="en-US" smtClean="0"/>
-              <a:t>9/9/2021</a:t>
+              <a:t>9/10/2021</a:t>
             </a:fld>
-            <a:endParaRPr lang="en-US"/>
+            <a:endParaRPr lang="en-US" dirty="0"/>
           </a:p>
         </p:txBody>
       </p:sp>
@@ -6280,7 +6294,7 @@
           <a:bodyPr/>
           <a:lstStyle/>
           <a:p>
-            <a:endParaRPr lang="en-US"/>
+            <a:endParaRPr lang="en-US" dirty="0"/>
           </a:p>
         </p:txBody>
       </p:sp>
@@ -6303,7 +6317,7 @@
               <a:rPr lang="en-US" smtClean="0"/>
               <a:t>‹#›</a:t>
             </a:fld>
-            <a:endParaRPr lang="en-US"/>
+            <a:endParaRPr lang="en-US" dirty="0"/>
           </a:p>
         </p:txBody>
       </p:sp>
@@ -6444,9 +6458,9 @@
           <a:p>
             <a:fld id="{87DD66F1-7FC0-403D-82FE-3DDCE4AD2CCB}" type="datetimeFigureOut">
               <a:rPr lang="en-US" smtClean="0"/>
-              <a:t>9/9/2021</a:t>
+              <a:t>9/10/2021</a:t>
             </a:fld>
-            <a:endParaRPr lang="en-US"/>
+            <a:endParaRPr lang="en-US" dirty="0"/>
           </a:p>
         </p:txBody>
       </p:sp>
@@ -6465,7 +6479,7 @@
           <a:bodyPr/>
           <a:lstStyle/>
           <a:p>
-            <a:endParaRPr lang="en-US"/>
+            <a:endParaRPr lang="en-US" dirty="0"/>
           </a:p>
         </p:txBody>
       </p:sp>
@@ -6488,7 +6502,7 @@
               <a:rPr lang="en-US" smtClean="0"/>
               <a:t>‹#›</a:t>
             </a:fld>
-            <a:endParaRPr lang="en-US"/>
+            <a:endParaRPr lang="en-US" dirty="0"/>
           </a:p>
         </p:txBody>
       </p:sp>
@@ -7416,9 +7430,9 @@
           <a:p>
             <a:fld id="{87DD66F1-7FC0-403D-82FE-3DDCE4AD2CCB}" type="datetimeFigureOut">
               <a:rPr lang="en-US" smtClean="0"/>
-              <a:t>9/9/2021</a:t>
+              <a:t>9/10/2021</a:t>
             </a:fld>
-            <a:endParaRPr lang="en-US"/>
+            <a:endParaRPr lang="en-US" dirty="0"/>
           </a:p>
         </p:txBody>
       </p:sp>
@@ -7437,7 +7451,7 @@
           <a:bodyPr/>
           <a:lstStyle/>
           <a:p>
-            <a:endParaRPr lang="en-US"/>
+            <a:endParaRPr lang="en-US" dirty="0"/>
           </a:p>
         </p:txBody>
       </p:sp>
@@ -7496,7 +7510,7 @@
               <a:rPr lang="en-US" smtClean="0"/>
               <a:t>‹#›</a:t>
             </a:fld>
-            <a:endParaRPr lang="en-US"/>
+            <a:endParaRPr lang="en-US" dirty="0"/>
           </a:p>
         </p:txBody>
       </p:sp>
@@ -7627,9 +7641,9 @@
           <a:p>
             <a:fld id="{87DD66F1-7FC0-403D-82FE-3DDCE4AD2CCB}" type="datetimeFigureOut">
               <a:rPr lang="en-US" smtClean="0"/>
-              <a:t>9/9/2021</a:t>
+              <a:t>9/10/2021</a:t>
             </a:fld>
-            <a:endParaRPr lang="en-US"/>
+            <a:endParaRPr lang="en-US" dirty="0"/>
           </a:p>
         </p:txBody>
       </p:sp>
@@ -7648,7 +7662,7 @@
           <a:bodyPr/>
           <a:lstStyle/>
           <a:p>
-            <a:endParaRPr lang="en-US"/>
+            <a:endParaRPr lang="en-US" dirty="0"/>
           </a:p>
         </p:txBody>
       </p:sp>
@@ -7671,7 +7685,7 @@
               <a:rPr lang="en-US" smtClean="0"/>
               <a:t>‹#›</a:t>
             </a:fld>
-            <a:endParaRPr lang="en-US"/>
+            <a:endParaRPr lang="en-US" dirty="0"/>
           </a:p>
         </p:txBody>
       </p:sp>
@@ -8661,9 +8675,9 @@
           <a:p>
             <a:fld id="{87DD66F1-7FC0-403D-82FE-3DDCE4AD2CCB}" type="datetimeFigureOut">
               <a:rPr lang="en-US" smtClean="0"/>
-              <a:t>9/9/2021</a:t>
+              <a:t>9/10/2021</a:t>
             </a:fld>
-            <a:endParaRPr lang="en-US"/>
+            <a:endParaRPr lang="en-US" dirty="0"/>
           </a:p>
         </p:txBody>
       </p:sp>
@@ -8682,7 +8696,7 @@
           <a:bodyPr/>
           <a:lstStyle/>
           <a:p>
-            <a:endParaRPr lang="en-US"/>
+            <a:endParaRPr lang="en-US" dirty="0"/>
           </a:p>
         </p:txBody>
       </p:sp>
@@ -8741,7 +8755,7 @@
               <a:rPr lang="en-US" smtClean="0"/>
               <a:t>‹#›</a:t>
             </a:fld>
-            <a:endParaRPr lang="en-US"/>
+            <a:endParaRPr lang="en-US" dirty="0"/>
           </a:p>
         </p:txBody>
       </p:sp>
@@ -8933,9 +8947,9 @@
           <a:p>
             <a:fld id="{87DD66F1-7FC0-403D-82FE-3DDCE4AD2CCB}" type="datetimeFigureOut">
               <a:rPr lang="en-US" smtClean="0"/>
-              <a:t>9/9/2021</a:t>
+              <a:t>9/10/2021</a:t>
             </a:fld>
-            <a:endParaRPr lang="en-US"/>
+            <a:endParaRPr lang="en-US" dirty="0"/>
           </a:p>
         </p:txBody>
       </p:sp>
@@ -8954,7 +8968,7 @@
           <a:bodyPr/>
           <a:lstStyle/>
           <a:p>
-            <a:endParaRPr lang="en-US"/>
+            <a:endParaRPr lang="en-US" dirty="0"/>
           </a:p>
         </p:txBody>
       </p:sp>
@@ -8977,7 +8991,7 @@
               <a:rPr lang="en-US" smtClean="0"/>
               <a:t>‹#›</a:t>
             </a:fld>
-            <a:endParaRPr lang="en-US"/>
+            <a:endParaRPr lang="en-US" dirty="0"/>
           </a:p>
         </p:txBody>
       </p:sp>
@@ -9343,9 +9357,9 @@
           <a:p>
             <a:fld id="{87DD66F1-7FC0-403D-82FE-3DDCE4AD2CCB}" type="datetimeFigureOut">
               <a:rPr lang="en-US" smtClean="0"/>
-              <a:t>9/9/2021</a:t>
+              <a:t>9/10/2021</a:t>
             </a:fld>
-            <a:endParaRPr lang="en-US"/>
+            <a:endParaRPr lang="en-US" dirty="0"/>
           </a:p>
         </p:txBody>
       </p:sp>
@@ -9364,7 +9378,7 @@
           <a:bodyPr/>
           <a:lstStyle/>
           <a:p>
-            <a:endParaRPr lang="en-US"/>
+            <a:endParaRPr lang="en-US" dirty="0"/>
           </a:p>
         </p:txBody>
       </p:sp>
@@ -9387,7 +9401,7 @@
               <a:rPr lang="en-US" smtClean="0"/>
               <a:t>‹#›</a:t>
             </a:fld>
-            <a:endParaRPr lang="en-US"/>
+            <a:endParaRPr lang="en-US" dirty="0"/>
           </a:p>
         </p:txBody>
       </p:sp>
@@ -9470,9 +9484,9 @@
           <a:p>
             <a:fld id="{87DD66F1-7FC0-403D-82FE-3DDCE4AD2CCB}" type="datetimeFigureOut">
               <a:rPr lang="en-US" smtClean="0"/>
-              <a:t>9/9/2021</a:t>
+              <a:t>9/10/2021</a:t>
             </a:fld>
-            <a:endParaRPr lang="en-US"/>
+            <a:endParaRPr lang="en-US" dirty="0"/>
           </a:p>
         </p:txBody>
       </p:sp>
@@ -9491,7 +9505,7 @@
           <a:bodyPr/>
           <a:lstStyle/>
           <a:p>
-            <a:endParaRPr lang="en-US"/>
+            <a:endParaRPr lang="en-US" dirty="0"/>
           </a:p>
         </p:txBody>
       </p:sp>
@@ -9514,7 +9528,7 @@
               <a:rPr lang="en-US" smtClean="0"/>
               <a:t>‹#›</a:t>
             </a:fld>
-            <a:endParaRPr lang="en-US"/>
+            <a:endParaRPr lang="en-US" dirty="0"/>
           </a:p>
         </p:txBody>
       </p:sp>
@@ -9565,9 +9579,9 @@
           <a:p>
             <a:fld id="{87DD66F1-7FC0-403D-82FE-3DDCE4AD2CCB}" type="datetimeFigureOut">
               <a:rPr lang="en-US" smtClean="0"/>
-              <a:t>9/9/2021</a:t>
+              <a:t>9/10/2021</a:t>
             </a:fld>
-            <a:endParaRPr lang="en-US"/>
+            <a:endParaRPr lang="en-US" dirty="0"/>
           </a:p>
         </p:txBody>
       </p:sp>
@@ -9586,7 +9600,7 @@
           <a:bodyPr/>
           <a:lstStyle/>
           <a:p>
-            <a:endParaRPr lang="en-US"/>
+            <a:endParaRPr lang="en-US" dirty="0"/>
           </a:p>
         </p:txBody>
       </p:sp>
@@ -9645,7 +9659,7 @@
               <a:rPr lang="en-US" smtClean="0"/>
               <a:t>‹#›</a:t>
             </a:fld>
-            <a:endParaRPr lang="en-US"/>
+            <a:endParaRPr lang="en-US" dirty="0"/>
           </a:p>
         </p:txBody>
       </p:sp>
@@ -10646,9 +10660,9 @@
           <a:p>
             <a:fld id="{87DD66F1-7FC0-403D-82FE-3DDCE4AD2CCB}" type="datetimeFigureOut">
               <a:rPr lang="en-US" smtClean="0"/>
-              <a:t>9/9/2021</a:t>
+              <a:t>9/10/2021</a:t>
             </a:fld>
-            <a:endParaRPr lang="en-US"/>
+            <a:endParaRPr lang="en-US" dirty="0"/>
           </a:p>
         </p:txBody>
       </p:sp>
@@ -10667,7 +10681,7 @@
           <a:bodyPr/>
           <a:lstStyle/>
           <a:p>
-            <a:endParaRPr lang="en-US"/>
+            <a:endParaRPr lang="en-US" dirty="0"/>
           </a:p>
         </p:txBody>
       </p:sp>
@@ -10726,7 +10740,7 @@
               <a:rPr lang="en-US" smtClean="0"/>
               <a:t>‹#›</a:t>
             </a:fld>
-            <a:endParaRPr lang="en-US"/>
+            <a:endParaRPr lang="en-US" dirty="0"/>
           </a:p>
         </p:txBody>
       </p:sp>
@@ -11656,7 +11670,7 @@
               <a:buNone/>
             </a:pPr>
             <a:r>
-              <a:rPr lang="en-US" smtClean="0"/>
+              <a:rPr lang="en-US" dirty="0" smtClean="0"/>
               <a:t>Click icon to add picture</a:t>
             </a:r>
             <a:endParaRPr lang="en-US" dirty="0"/>
@@ -11754,9 +11768,9 @@
           <a:p>
             <a:fld id="{87DD66F1-7FC0-403D-82FE-3DDCE4AD2CCB}" type="datetimeFigureOut">
               <a:rPr lang="en-US" smtClean="0"/>
-              <a:t>9/9/2021</a:t>
+              <a:t>9/10/2021</a:t>
             </a:fld>
-            <a:endParaRPr lang="en-US"/>
+            <a:endParaRPr lang="en-US" dirty="0"/>
           </a:p>
         </p:txBody>
       </p:sp>
@@ -11775,7 +11789,7 @@
           <a:bodyPr/>
           <a:lstStyle/>
           <a:p>
-            <a:endParaRPr lang="en-US"/>
+            <a:endParaRPr lang="en-US" dirty="0"/>
           </a:p>
         </p:txBody>
       </p:sp>
@@ -11834,7 +11848,7 @@
               <a:rPr lang="en-US" smtClean="0"/>
               <a:t>‹#›</a:t>
             </a:fld>
-            <a:endParaRPr lang="en-US"/>
+            <a:endParaRPr lang="en-US" dirty="0"/>
           </a:p>
         </p:txBody>
       </p:sp>
@@ -12751,9 +12765,9 @@
           <a:p>
             <a:fld id="{87DD66F1-7FC0-403D-82FE-3DDCE4AD2CCB}" type="datetimeFigureOut">
               <a:rPr lang="en-US" smtClean="0"/>
-              <a:t>9/9/2021</a:t>
+              <a:t>9/10/2021</a:t>
             </a:fld>
-            <a:endParaRPr lang="en-US"/>
+            <a:endParaRPr lang="en-US" dirty="0"/>
           </a:p>
         </p:txBody>
       </p:sp>
@@ -12788,7 +12802,7 @@
             </a:lvl1pPr>
           </a:lstStyle>
           <a:p>
-            <a:endParaRPr lang="en-US"/>
+            <a:endParaRPr lang="en-US" dirty="0"/>
           </a:p>
         </p:txBody>
       </p:sp>
@@ -12863,7 +12877,7 @@
               <a:rPr lang="en-US" smtClean="0"/>
               <a:t>‹#›</a:t>
             </a:fld>
-            <a:endParaRPr lang="en-US"/>
+            <a:endParaRPr lang="en-US" dirty="0"/>
           </a:p>
         </p:txBody>
       </p:sp>
@@ -13375,6 +13389,1164 @@
 </p:sld>
 </file>
 
+<file path=ppt/slides/slide10.xml><?xml version="1.0" encoding="utf-8"?>
+<p:sld xmlns:a="http://schemas.openxmlformats.org/drawingml/2006/main" xmlns:r="http://schemas.openxmlformats.org/officeDocument/2006/relationships" xmlns:p="http://schemas.openxmlformats.org/presentationml/2006/main">
+  <p:cSld>
+    <p:spTree>
+      <p:nvGrpSpPr>
+        <p:cNvPr id="1" name=""/>
+        <p:cNvGrpSpPr/>
+        <p:nvPr/>
+      </p:nvGrpSpPr>
+      <p:grpSpPr>
+        <a:xfrm>
+          <a:off x="0" y="0"/>
+          <a:ext cx="0" cy="0"/>
+          <a:chOff x="0" y="0"/>
+          <a:chExt cx="0" cy="0"/>
+        </a:xfrm>
+      </p:grpSpPr>
+      <p:sp>
+        <p:nvSpPr>
+          <p:cNvPr id="2" name="Title 1"/>
+          <p:cNvSpPr>
+            <a:spLocks noGrp="1"/>
+          </p:cNvSpPr>
+          <p:nvPr>
+            <p:ph type="title"/>
+          </p:nvPr>
+        </p:nvSpPr>
+        <p:spPr/>
+        <p:txBody>
+          <a:bodyPr/>
+          <a:lstStyle/>
+          <a:p>
+            <a:pPr algn="ctr"/>
+            <a:r>
+              <a:rPr lang="en-US" dirty="0" smtClean="0"/>
+              <a:t>Entity Framework Core</a:t>
+            </a:r>
+            <a:endParaRPr lang="en-US" dirty="0"/>
+          </a:p>
+        </p:txBody>
+      </p:sp>
+      <p:sp>
+        <p:nvSpPr>
+          <p:cNvPr id="3" name="Content Placeholder 2"/>
+          <p:cNvSpPr>
+            <a:spLocks noGrp="1"/>
+          </p:cNvSpPr>
+          <p:nvPr>
+            <p:ph sz="half" idx="1"/>
+          </p:nvPr>
+        </p:nvSpPr>
+        <p:spPr>
+          <a:xfrm>
+            <a:off x="1154954" y="2741468"/>
+            <a:ext cx="4825158" cy="3416301"/>
+          </a:xfrm>
+        </p:spPr>
+        <p:txBody>
+          <a:bodyPr/>
+          <a:lstStyle/>
+          <a:p>
+            <a:r>
+              <a:rPr lang="en-US" dirty="0" smtClean="0">
+                <a:latin typeface="Arial" panose="020B0604020202020204" pitchFamily="34" charset="0"/>
+                <a:cs typeface="Arial" panose="020B0604020202020204" pitchFamily="34" charset="0"/>
+              </a:rPr>
+              <a:t>EF Core is open source and cross-platform object-relational mapper</a:t>
+            </a:r>
+          </a:p>
+          <a:p>
+            <a:r>
+              <a:rPr lang="en-US" dirty="0" smtClean="0">
+                <a:latin typeface="Arial" panose="020B0604020202020204" pitchFamily="34" charset="0"/>
+                <a:cs typeface="Arial" panose="020B0604020202020204" pitchFamily="34" charset="0"/>
+              </a:rPr>
+              <a:t>Enables developers to work with a database using .NET objects</a:t>
+            </a:r>
+          </a:p>
+          <a:p>
+            <a:r>
+              <a:rPr lang="en-US" dirty="0" smtClean="0">
+                <a:latin typeface="Arial" panose="020B0604020202020204" pitchFamily="34" charset="0"/>
+                <a:cs typeface="Arial" panose="020B0604020202020204" pitchFamily="34" charset="0"/>
+              </a:rPr>
+              <a:t>Eliminates the need for most of the data-access code that typically needs to be written</a:t>
+            </a:r>
+          </a:p>
+          <a:p>
+            <a:r>
+              <a:rPr lang="en-US" dirty="0" smtClean="0">
+                <a:latin typeface="Arial" panose="020B0604020202020204" pitchFamily="34" charset="0"/>
+                <a:cs typeface="Arial" panose="020B0604020202020204" pitchFamily="34" charset="0"/>
+              </a:rPr>
+              <a:t>Supports many database providers</a:t>
+            </a:r>
+            <a:endParaRPr lang="en-US" dirty="0">
+              <a:latin typeface="Arial" panose="020B0604020202020204" pitchFamily="34" charset="0"/>
+              <a:cs typeface="Arial" panose="020B0604020202020204" pitchFamily="34" charset="0"/>
+            </a:endParaRPr>
+          </a:p>
+        </p:txBody>
+      </p:sp>
+      <p:pic>
+        <p:nvPicPr>
+          <p:cNvPr id="5" name="Content Placeholder 4"/>
+          <p:cNvPicPr>
+            <a:picLocks noGrp="1" noChangeAspect="1"/>
+          </p:cNvPicPr>
+          <p:nvPr>
+            <p:ph sz="half" idx="2"/>
+          </p:nvPr>
+        </p:nvPicPr>
+        <p:blipFill>
+          <a:blip r:embed="rId2" cstate="print">
+            <a:extLst>
+              <a:ext uri="{28A0092B-C50C-407E-A947-70E740481C1C}">
+                <a14:useLocalDpi xmlns:a14="http://schemas.microsoft.com/office/drawing/2010/main" val="0"/>
+              </a:ext>
+            </a:extLst>
+          </a:blip>
+          <a:stretch>
+            <a:fillRect/>
+          </a:stretch>
+        </p:blipFill>
+        <p:spPr>
+          <a:xfrm>
+            <a:off x="6325682" y="2741468"/>
+            <a:ext cx="5365607" cy="2384714"/>
+          </a:xfrm>
+        </p:spPr>
+      </p:pic>
+    </p:spTree>
+    <p:extLst>
+      <p:ext uri="{BB962C8B-B14F-4D97-AF65-F5344CB8AC3E}">
+        <p14:creationId xmlns:p14="http://schemas.microsoft.com/office/powerpoint/2010/main" val="3944881648"/>
+      </p:ext>
+    </p:extLst>
+  </p:cSld>
+  <p:clrMapOvr>
+    <a:masterClrMapping/>
+  </p:clrMapOvr>
+  <p:timing>
+    <p:tnLst>
+      <p:par>
+        <p:cTn id="1" dur="indefinite" restart="never" nodeType="tmRoot"/>
+      </p:par>
+    </p:tnLst>
+  </p:timing>
+</p:sld>
+</file>
+
+<file path=ppt/slides/slide11.xml><?xml version="1.0" encoding="utf-8"?>
+<p:sld xmlns:a="http://schemas.openxmlformats.org/drawingml/2006/main" xmlns:r="http://schemas.openxmlformats.org/officeDocument/2006/relationships" xmlns:p="http://schemas.openxmlformats.org/presentationml/2006/main">
+  <p:cSld>
+    <p:spTree>
+      <p:nvGrpSpPr>
+        <p:cNvPr id="1" name=""/>
+        <p:cNvGrpSpPr/>
+        <p:nvPr/>
+      </p:nvGrpSpPr>
+      <p:grpSpPr>
+        <a:xfrm>
+          <a:off x="0" y="0"/>
+          <a:ext cx="0" cy="0"/>
+          <a:chOff x="0" y="0"/>
+          <a:chExt cx="0" cy="0"/>
+        </a:xfrm>
+      </p:grpSpPr>
+      <p:sp>
+        <p:nvSpPr>
+          <p:cNvPr id="2" name="Title 1"/>
+          <p:cNvSpPr>
+            <a:spLocks noGrp="1"/>
+          </p:cNvSpPr>
+          <p:nvPr>
+            <p:ph type="title"/>
+          </p:nvPr>
+        </p:nvSpPr>
+        <p:spPr>
+          <a:xfrm>
+            <a:off x="1154955" y="1288915"/>
+            <a:ext cx="3865134" cy="1010941"/>
+          </a:xfrm>
+        </p:spPr>
+        <p:txBody>
+          <a:bodyPr>
+            <a:noAutofit/>
+          </a:bodyPr>
+          <a:lstStyle/>
+          <a:p>
+            <a:r>
+              <a:rPr lang="en-US" sz="2800" dirty="0" smtClean="0">
+                <a:latin typeface="Arial" panose="020B0604020202020204" pitchFamily="34" charset="0"/>
+                <a:cs typeface="Arial" panose="020B0604020202020204" pitchFamily="34" charset="0"/>
+              </a:rPr>
+              <a:t>The Model </a:t>
+            </a:r>
+            <a:br>
+              <a:rPr lang="en-US" sz="2800" dirty="0" smtClean="0">
+                <a:latin typeface="Arial" panose="020B0604020202020204" pitchFamily="34" charset="0"/>
+                <a:cs typeface="Arial" panose="020B0604020202020204" pitchFamily="34" charset="0"/>
+              </a:rPr>
+            </a:br>
+            <a:r>
+              <a:rPr lang="en-US" sz="2800" dirty="0" smtClean="0">
+                <a:latin typeface="Arial" panose="020B0604020202020204" pitchFamily="34" charset="0"/>
+                <a:cs typeface="Arial" panose="020B0604020202020204" pitchFamily="34" charset="0"/>
+              </a:rPr>
+              <a:t>(code first approach)</a:t>
+            </a:r>
+            <a:endParaRPr lang="en-US" sz="2800" dirty="0">
+              <a:latin typeface="Arial" panose="020B0604020202020204" pitchFamily="34" charset="0"/>
+              <a:cs typeface="Arial" panose="020B0604020202020204" pitchFamily="34" charset="0"/>
+            </a:endParaRPr>
+          </a:p>
+        </p:txBody>
+      </p:sp>
+      <p:sp>
+        <p:nvSpPr>
+          <p:cNvPr id="4" name="Text Placeholder 3"/>
+          <p:cNvSpPr>
+            <a:spLocks noGrp="1"/>
+          </p:cNvSpPr>
+          <p:nvPr>
+            <p:ph type="body" sz="half" idx="2"/>
+          </p:nvPr>
+        </p:nvSpPr>
+        <p:spPr>
+          <a:xfrm>
+            <a:off x="1154953" y="2503054"/>
+            <a:ext cx="3865135" cy="2526145"/>
+          </a:xfrm>
+        </p:spPr>
+        <p:txBody>
+          <a:bodyPr>
+            <a:normAutofit lnSpcReduction="10000"/>
+          </a:bodyPr>
+          <a:lstStyle/>
+          <a:p>
+            <a:pPr marL="342900" indent="-342900">
+              <a:buClr>
+                <a:schemeClr val="bg1"/>
+              </a:buClr>
+              <a:buFont typeface="Wingdings" panose="05000000000000000000" pitchFamily="2" charset="2"/>
+              <a:buChar char="Ø"/>
+            </a:pPr>
+            <a:r>
+              <a:rPr lang="en-US" sz="2000" dirty="0">
+                <a:solidFill>
+                  <a:schemeClr val="bg1"/>
+                </a:solidFill>
+                <a:latin typeface="Arial" panose="020B0604020202020204" pitchFamily="34" charset="0"/>
+                <a:cs typeface="Arial" panose="020B0604020202020204" pitchFamily="34" charset="0"/>
+              </a:rPr>
+              <a:t>A model is made up of entity classes and a context object that represents a session with the database. The context object allows querying and saving data</a:t>
+            </a:r>
+            <a:r>
+              <a:rPr lang="en-US" sz="2000" dirty="0" smtClean="0">
+                <a:solidFill>
+                  <a:schemeClr val="bg1"/>
+                </a:solidFill>
+                <a:latin typeface="Arial" panose="020B0604020202020204" pitchFamily="34" charset="0"/>
+                <a:cs typeface="Arial" panose="020B0604020202020204" pitchFamily="34" charset="0"/>
+              </a:rPr>
+              <a:t>.</a:t>
+            </a:r>
+          </a:p>
+          <a:p>
+            <a:pPr marL="342900" indent="-342900">
+              <a:buClr>
+                <a:schemeClr val="bg1"/>
+              </a:buClr>
+              <a:buFont typeface="Wingdings" panose="05000000000000000000" pitchFamily="2" charset="2"/>
+              <a:buChar char="Ø"/>
+            </a:pPr>
+            <a:r>
+              <a:rPr lang="en-US" sz="2000" dirty="0" smtClean="0">
+                <a:solidFill>
+                  <a:schemeClr val="bg1"/>
+                </a:solidFill>
+                <a:latin typeface="Arial" panose="020B0604020202020204" pitchFamily="34" charset="0"/>
+                <a:cs typeface="Arial" panose="020B0604020202020204" pitchFamily="34" charset="0"/>
+              </a:rPr>
+              <a:t>Database structure is updated using migrations</a:t>
+            </a:r>
+            <a:endParaRPr lang="en-US" sz="2000" dirty="0">
+              <a:solidFill>
+                <a:schemeClr val="bg1"/>
+              </a:solidFill>
+              <a:latin typeface="Arial" panose="020B0604020202020204" pitchFamily="34" charset="0"/>
+              <a:cs typeface="Arial" panose="020B0604020202020204" pitchFamily="34" charset="0"/>
+            </a:endParaRPr>
+          </a:p>
+          <a:p>
+            <a:endParaRPr lang="en-US" sz="2000" dirty="0">
+              <a:solidFill>
+                <a:schemeClr val="bg1"/>
+              </a:solidFill>
+              <a:latin typeface="Arial" panose="020B0604020202020204" pitchFamily="34" charset="0"/>
+              <a:cs typeface="Arial" panose="020B0604020202020204" pitchFamily="34" charset="0"/>
+            </a:endParaRPr>
+          </a:p>
+        </p:txBody>
+      </p:sp>
+      <p:pic>
+        <p:nvPicPr>
+          <p:cNvPr id="9" name="Picture Placeholder 8"/>
+          <p:cNvPicPr>
+            <a:picLocks noGrp="1" noChangeAspect="1"/>
+          </p:cNvPicPr>
+          <p:nvPr>
+            <p:ph type="pic" idx="1"/>
+          </p:nvPr>
+        </p:nvPicPr>
+        <p:blipFill>
+          <a:blip r:embed="rId2">
+            <a:extLst>
+              <a:ext uri="{28A0092B-C50C-407E-A947-70E740481C1C}">
+                <a14:useLocalDpi xmlns:a14="http://schemas.microsoft.com/office/drawing/2010/main" val="0"/>
+              </a:ext>
+            </a:extLst>
+          </a:blip>
+          <a:stretch>
+            <a:fillRect/>
+          </a:stretch>
+        </p:blipFill>
+        <p:spPr>
+          <a:xfrm>
+            <a:off x="6350874" y="1181911"/>
+            <a:ext cx="4612198" cy="4950947"/>
+          </a:xfrm>
+        </p:spPr>
+      </p:pic>
+    </p:spTree>
+    <p:extLst>
+      <p:ext uri="{BB962C8B-B14F-4D97-AF65-F5344CB8AC3E}">
+        <p14:creationId xmlns:p14="http://schemas.microsoft.com/office/powerpoint/2010/main" val="2827704250"/>
+      </p:ext>
+    </p:extLst>
+  </p:cSld>
+  <p:clrMapOvr>
+    <a:masterClrMapping/>
+  </p:clrMapOvr>
+  <p:timing>
+    <p:tnLst>
+      <p:par>
+        <p:cTn id="1" dur="indefinite" restart="never" nodeType="tmRoot"/>
+      </p:par>
+    </p:tnLst>
+  </p:timing>
+</p:sld>
+</file>
+
+<file path=ppt/slides/slide12.xml><?xml version="1.0" encoding="utf-8"?>
+<p:sld xmlns:a="http://schemas.openxmlformats.org/drawingml/2006/main" xmlns:r="http://schemas.openxmlformats.org/officeDocument/2006/relationships" xmlns:p="http://schemas.openxmlformats.org/presentationml/2006/main">
+  <p:cSld>
+    <p:spTree>
+      <p:nvGrpSpPr>
+        <p:cNvPr id="1" name=""/>
+        <p:cNvGrpSpPr/>
+        <p:nvPr/>
+      </p:nvGrpSpPr>
+      <p:grpSpPr>
+        <a:xfrm>
+          <a:off x="0" y="0"/>
+          <a:ext cx="0" cy="0"/>
+          <a:chOff x="0" y="0"/>
+          <a:chExt cx="0" cy="0"/>
+        </a:xfrm>
+      </p:grpSpPr>
+      <p:sp>
+        <p:nvSpPr>
+          <p:cNvPr id="4" name="Text Placeholder 3"/>
+          <p:cNvSpPr>
+            <a:spLocks noGrp="1"/>
+          </p:cNvSpPr>
+          <p:nvPr>
+            <p:ph type="body" sz="half" idx="2"/>
+          </p:nvPr>
+        </p:nvSpPr>
+        <p:spPr>
+          <a:xfrm>
+            <a:off x="1154954" y="2595418"/>
+            <a:ext cx="3859212" cy="2433782"/>
+          </a:xfrm>
+        </p:spPr>
+        <p:txBody>
+          <a:bodyPr>
+            <a:normAutofit/>
+          </a:bodyPr>
+          <a:lstStyle/>
+          <a:p>
+            <a:pPr marL="342900" indent="-342900">
+              <a:buClr>
+                <a:schemeClr val="bg1"/>
+              </a:buClr>
+              <a:buFont typeface="Wingdings" panose="05000000000000000000" pitchFamily="2" charset="2"/>
+              <a:buChar char="Ø"/>
+            </a:pPr>
+            <a:r>
+              <a:rPr lang="en-US" sz="2000" dirty="0">
+                <a:solidFill>
+                  <a:schemeClr val="bg1"/>
+                </a:solidFill>
+                <a:latin typeface="Arial" panose="020B0604020202020204" pitchFamily="34" charset="0"/>
+                <a:cs typeface="Arial" panose="020B0604020202020204" pitchFamily="34" charset="0"/>
+              </a:rPr>
+              <a:t>A model is made up </a:t>
+            </a:r>
+            <a:r>
+              <a:rPr lang="en-US" sz="2000" dirty="0" smtClean="0">
+                <a:solidFill>
+                  <a:schemeClr val="bg1"/>
+                </a:solidFill>
+                <a:latin typeface="Arial" panose="020B0604020202020204" pitchFamily="34" charset="0"/>
+                <a:cs typeface="Arial" panose="020B0604020202020204" pitchFamily="34" charset="0"/>
+              </a:rPr>
+              <a:t>from previously build MS SQL tables. </a:t>
+            </a:r>
+          </a:p>
+          <a:p>
+            <a:pPr marL="342900" indent="-342900">
+              <a:buClr>
+                <a:schemeClr val="bg1"/>
+              </a:buClr>
+              <a:buFont typeface="Wingdings" panose="05000000000000000000" pitchFamily="2" charset="2"/>
+              <a:buChar char="Ø"/>
+            </a:pPr>
+            <a:r>
+              <a:rPr lang="en-US" sz="2000" dirty="0" smtClean="0">
+                <a:solidFill>
+                  <a:schemeClr val="bg1"/>
+                </a:solidFill>
+                <a:latin typeface="Arial" panose="020B0604020202020204" pitchFamily="34" charset="0"/>
+                <a:cs typeface="Arial" panose="020B0604020202020204" pitchFamily="34" charset="0"/>
+              </a:rPr>
+              <a:t>In “database first approach” we scaffold our C# classes from these tables using command line.</a:t>
+            </a:r>
+            <a:endParaRPr lang="en-US" sz="2000" dirty="0"/>
+          </a:p>
+        </p:txBody>
+      </p:sp>
+      <p:sp>
+        <p:nvSpPr>
+          <p:cNvPr id="5" name="Title 1"/>
+          <p:cNvSpPr>
+            <a:spLocks noGrp="1"/>
+          </p:cNvSpPr>
+          <p:nvPr>
+            <p:ph type="title"/>
+          </p:nvPr>
+        </p:nvSpPr>
+        <p:spPr>
+          <a:xfrm>
+            <a:off x="1149032" y="1403928"/>
+            <a:ext cx="3865134" cy="1073727"/>
+          </a:xfrm>
+        </p:spPr>
+        <p:txBody>
+          <a:bodyPr>
+            <a:noAutofit/>
+          </a:bodyPr>
+          <a:lstStyle/>
+          <a:p>
+            <a:r>
+              <a:rPr lang="en-US" dirty="0" smtClean="0">
+                <a:latin typeface="Arial" panose="020B0604020202020204" pitchFamily="34" charset="0"/>
+                <a:cs typeface="Arial" panose="020B0604020202020204" pitchFamily="34" charset="0"/>
+              </a:rPr>
+              <a:t>The Model </a:t>
+            </a:r>
+            <a:r>
+              <a:rPr lang="en-US" b="1" dirty="0" smtClean="0">
+                <a:latin typeface="Arial" panose="020B0604020202020204" pitchFamily="34" charset="0"/>
+                <a:cs typeface="Arial" panose="020B0604020202020204" pitchFamily="34" charset="0"/>
+              </a:rPr>
+              <a:t/>
+            </a:r>
+            <a:br>
+              <a:rPr lang="en-US" b="1" dirty="0" smtClean="0">
+                <a:latin typeface="Arial" panose="020B0604020202020204" pitchFamily="34" charset="0"/>
+                <a:cs typeface="Arial" panose="020B0604020202020204" pitchFamily="34" charset="0"/>
+              </a:rPr>
+            </a:br>
+            <a:r>
+              <a:rPr lang="en-US" sz="2400" b="1" dirty="0" smtClean="0">
+                <a:latin typeface="Arial" panose="020B0604020202020204" pitchFamily="34" charset="0"/>
+                <a:cs typeface="Arial" panose="020B0604020202020204" pitchFamily="34" charset="0"/>
+              </a:rPr>
+              <a:t>(database first approach)</a:t>
+            </a:r>
+            <a:endParaRPr lang="en-US" sz="2400" b="1" dirty="0">
+              <a:latin typeface="Arial" panose="020B0604020202020204" pitchFamily="34" charset="0"/>
+              <a:cs typeface="Arial" panose="020B0604020202020204" pitchFamily="34" charset="0"/>
+            </a:endParaRPr>
+          </a:p>
+        </p:txBody>
+      </p:sp>
+      <p:pic>
+        <p:nvPicPr>
+          <p:cNvPr id="8" name="Picture Placeholder 7"/>
+          <p:cNvPicPr>
+            <a:picLocks noGrp="1" noChangeAspect="1"/>
+          </p:cNvPicPr>
+          <p:nvPr>
+            <p:ph type="pic" idx="1"/>
+          </p:nvPr>
+        </p:nvPicPr>
+        <p:blipFill>
+          <a:blip r:embed="rId2">
+            <a:extLst>
+              <a:ext uri="{28A0092B-C50C-407E-A947-70E740481C1C}">
+                <a14:useLocalDpi xmlns:a14="http://schemas.microsoft.com/office/drawing/2010/main" val="0"/>
+              </a:ext>
+            </a:extLst>
+          </a:blip>
+          <a:stretch>
+            <a:fillRect/>
+          </a:stretch>
+        </p:blipFill>
+        <p:spPr>
+          <a:xfrm>
+            <a:off x="6126447" y="1532106"/>
+            <a:ext cx="5792887" cy="3857017"/>
+          </a:xfrm>
+        </p:spPr>
+      </p:pic>
+    </p:spTree>
+    <p:extLst>
+      <p:ext uri="{BB962C8B-B14F-4D97-AF65-F5344CB8AC3E}">
+        <p14:creationId xmlns:p14="http://schemas.microsoft.com/office/powerpoint/2010/main" val="2018877743"/>
+      </p:ext>
+    </p:extLst>
+  </p:cSld>
+  <p:clrMapOvr>
+    <a:masterClrMapping/>
+  </p:clrMapOvr>
+</p:sld>
+</file>
+
+<file path=ppt/slides/slide13.xml><?xml version="1.0" encoding="utf-8"?>
+<p:sld xmlns:a="http://schemas.openxmlformats.org/drawingml/2006/main" xmlns:r="http://schemas.openxmlformats.org/officeDocument/2006/relationships" xmlns:p="http://schemas.openxmlformats.org/presentationml/2006/main">
+  <p:cSld>
+    <p:spTree>
+      <p:nvGrpSpPr>
+        <p:cNvPr id="1" name=""/>
+        <p:cNvGrpSpPr/>
+        <p:nvPr/>
+      </p:nvGrpSpPr>
+      <p:grpSpPr>
+        <a:xfrm>
+          <a:off x="0" y="0"/>
+          <a:ext cx="0" cy="0"/>
+          <a:chOff x="0" y="0"/>
+          <a:chExt cx="0" cy="0"/>
+        </a:xfrm>
+      </p:grpSpPr>
+      <p:sp>
+        <p:nvSpPr>
+          <p:cNvPr id="2" name="Title 1"/>
+          <p:cNvSpPr>
+            <a:spLocks noGrp="1"/>
+          </p:cNvSpPr>
+          <p:nvPr>
+            <p:ph type="title"/>
+          </p:nvPr>
+        </p:nvSpPr>
+        <p:spPr>
+          <a:xfrm>
+            <a:off x="1075142" y="1909618"/>
+            <a:ext cx="4051040" cy="1027545"/>
+          </a:xfrm>
+        </p:spPr>
+        <p:txBody>
+          <a:bodyPr>
+            <a:noAutofit/>
+          </a:bodyPr>
+          <a:lstStyle/>
+          <a:p>
+            <a:r>
+              <a:rPr lang="en-US" sz="2800" dirty="0" smtClean="0">
+                <a:latin typeface="Arial" panose="020B0604020202020204" pitchFamily="34" charset="0"/>
+                <a:cs typeface="Arial" panose="020B0604020202020204" pitchFamily="34" charset="0"/>
+              </a:rPr>
+              <a:t>What is LINQ and how we use it with EF Core?</a:t>
+            </a:r>
+            <a:endParaRPr lang="en-US" sz="2800" dirty="0">
+              <a:latin typeface="Arial" panose="020B0604020202020204" pitchFamily="34" charset="0"/>
+              <a:cs typeface="Arial" panose="020B0604020202020204" pitchFamily="34" charset="0"/>
+            </a:endParaRPr>
+          </a:p>
+        </p:txBody>
+      </p:sp>
+      <p:pic>
+        <p:nvPicPr>
+          <p:cNvPr id="5" name="Picture Placeholder 4"/>
+          <p:cNvPicPr>
+            <a:picLocks noGrp="1" noChangeAspect="1"/>
+          </p:cNvPicPr>
+          <p:nvPr>
+            <p:ph type="pic" idx="1"/>
+          </p:nvPr>
+        </p:nvPicPr>
+        <p:blipFill>
+          <a:blip r:embed="rId2">
+            <a:extLst>
+              <a:ext uri="{28A0092B-C50C-407E-A947-70E740481C1C}">
+                <a14:useLocalDpi xmlns:a14="http://schemas.microsoft.com/office/drawing/2010/main" val="0"/>
+              </a:ext>
+            </a:extLst>
+          </a:blip>
+          <a:stretch>
+            <a:fillRect/>
+          </a:stretch>
+        </p:blipFill>
+        <p:spPr>
+          <a:xfrm>
+            <a:off x="6232947" y="2894775"/>
+            <a:ext cx="5547986" cy="2991255"/>
+          </a:xfrm>
+        </p:spPr>
+      </p:pic>
+      <p:sp>
+        <p:nvSpPr>
+          <p:cNvPr id="4" name="Text Placeholder 3"/>
+          <p:cNvSpPr>
+            <a:spLocks noGrp="1"/>
+          </p:cNvSpPr>
+          <p:nvPr>
+            <p:ph type="body" sz="half" idx="2"/>
+          </p:nvPr>
+        </p:nvSpPr>
+        <p:spPr>
+          <a:xfrm>
+            <a:off x="1171056" y="3242785"/>
+            <a:ext cx="3859212" cy="1776354"/>
+          </a:xfrm>
+        </p:spPr>
+        <p:txBody>
+          <a:bodyPr>
+            <a:normAutofit/>
+          </a:bodyPr>
+          <a:lstStyle/>
+          <a:p>
+            <a:r>
+              <a:rPr lang="en-US" sz="2000" dirty="0" smtClean="0">
+                <a:solidFill>
+                  <a:schemeClr val="bg1"/>
+                </a:solidFill>
+                <a:latin typeface="Arial" panose="020B0604020202020204" pitchFamily="34" charset="0"/>
+                <a:cs typeface="Arial" panose="020B0604020202020204" pitchFamily="34" charset="0"/>
+              </a:rPr>
+              <a:t>Language-Integrated-Query</a:t>
+            </a:r>
+            <a:r>
+              <a:rPr lang="en-US" sz="2000" dirty="0">
+                <a:solidFill>
+                  <a:schemeClr val="bg1"/>
+                </a:solidFill>
+                <a:latin typeface="Arial" panose="020B0604020202020204" pitchFamily="34" charset="0"/>
+                <a:cs typeface="Arial" panose="020B0604020202020204" pitchFamily="34" charset="0"/>
+              </a:rPr>
+              <a:t> </a:t>
+            </a:r>
+            <a:r>
+              <a:rPr lang="en-US" sz="2000" dirty="0" smtClean="0">
+                <a:solidFill>
+                  <a:schemeClr val="bg1"/>
+                </a:solidFill>
+                <a:latin typeface="Arial" panose="020B0604020202020204" pitchFamily="34" charset="0"/>
+                <a:cs typeface="Arial" panose="020B0604020202020204" pitchFamily="34" charset="0"/>
+              </a:rPr>
+              <a:t>(LINQ) is the name for set of technologies based on the integration </a:t>
+            </a:r>
+            <a:r>
+              <a:rPr lang="en-US" sz="2000" dirty="0">
+                <a:solidFill>
+                  <a:schemeClr val="bg1"/>
+                </a:solidFill>
+                <a:latin typeface="Arial" panose="020B0604020202020204" pitchFamily="34" charset="0"/>
+                <a:cs typeface="Arial" panose="020B0604020202020204" pitchFamily="34" charset="0"/>
+              </a:rPr>
+              <a:t>of query capabilities </a:t>
+            </a:r>
+            <a:r>
+              <a:rPr lang="en-US" sz="2000" dirty="0" smtClean="0">
+                <a:solidFill>
+                  <a:schemeClr val="bg1"/>
+                </a:solidFill>
+                <a:latin typeface="Arial" panose="020B0604020202020204" pitchFamily="34" charset="0"/>
+                <a:cs typeface="Arial" panose="020B0604020202020204" pitchFamily="34" charset="0"/>
+              </a:rPr>
+              <a:t> directly into C#</a:t>
+            </a:r>
+            <a:r>
+              <a:rPr lang="bg-BG" sz="2000" dirty="0" smtClean="0">
+                <a:solidFill>
+                  <a:schemeClr val="bg1"/>
+                </a:solidFill>
+                <a:latin typeface="Arial" panose="020B0604020202020204" pitchFamily="34" charset="0"/>
+                <a:cs typeface="Arial" panose="020B0604020202020204" pitchFamily="34" charset="0"/>
+              </a:rPr>
+              <a:t>.</a:t>
+            </a:r>
+            <a:endParaRPr lang="en-US" sz="2000" dirty="0">
+              <a:solidFill>
+                <a:schemeClr val="bg1"/>
+              </a:solidFill>
+              <a:latin typeface="Arial" panose="020B0604020202020204" pitchFamily="34" charset="0"/>
+              <a:cs typeface="Arial" panose="020B0604020202020204" pitchFamily="34" charset="0"/>
+            </a:endParaRPr>
+          </a:p>
+        </p:txBody>
+      </p:sp>
+      <p:pic>
+        <p:nvPicPr>
+          <p:cNvPr id="6" name="Picture 5"/>
+          <p:cNvPicPr>
+            <a:picLocks noChangeAspect="1"/>
+          </p:cNvPicPr>
+          <p:nvPr/>
+        </p:nvPicPr>
+        <p:blipFill>
+          <a:blip r:embed="rId3">
+            <a:extLst>
+              <a:ext uri="{28A0092B-C50C-407E-A947-70E740481C1C}">
+                <a14:useLocalDpi xmlns:a14="http://schemas.microsoft.com/office/drawing/2010/main" val="0"/>
+              </a:ext>
+            </a:extLst>
+          </a:blip>
+          <a:stretch>
+            <a:fillRect/>
+          </a:stretch>
+        </p:blipFill>
+        <p:spPr>
+          <a:xfrm>
+            <a:off x="6232947" y="1682295"/>
+            <a:ext cx="5416809" cy="900970"/>
+          </a:xfrm>
+          <a:prstGeom prst="rect">
+            <a:avLst/>
+          </a:prstGeom>
+        </p:spPr>
+      </p:pic>
+      <p:sp>
+        <p:nvSpPr>
+          <p:cNvPr id="7" name="TextBox 6"/>
+          <p:cNvSpPr txBox="1"/>
+          <p:nvPr/>
+        </p:nvSpPr>
+        <p:spPr>
+          <a:xfrm>
+            <a:off x="6232947" y="1260893"/>
+            <a:ext cx="5033133" cy="369332"/>
+          </a:xfrm>
+          <a:prstGeom prst="rect">
+            <a:avLst/>
+          </a:prstGeom>
+          <a:noFill/>
+        </p:spPr>
+        <p:txBody>
+          <a:bodyPr wrap="square" rtlCol="0">
+            <a:spAutoFit/>
+          </a:bodyPr>
+          <a:lstStyle/>
+          <a:p>
+            <a:pPr algn="ctr"/>
+            <a:r>
+              <a:rPr lang="en-US" dirty="0" smtClean="0"/>
+              <a:t>Sample C# LINQ query:</a:t>
+            </a:r>
+            <a:endParaRPr lang="en-US" dirty="0"/>
+          </a:p>
+        </p:txBody>
+      </p:sp>
+    </p:spTree>
+    <p:extLst>
+      <p:ext uri="{BB962C8B-B14F-4D97-AF65-F5344CB8AC3E}">
+        <p14:creationId xmlns:p14="http://schemas.microsoft.com/office/powerpoint/2010/main" val="3710999225"/>
+      </p:ext>
+    </p:extLst>
+  </p:cSld>
+  <p:clrMapOvr>
+    <a:masterClrMapping/>
+  </p:clrMapOvr>
+</p:sld>
+</file>
+
+<file path=ppt/slides/slide14.xml><?xml version="1.0" encoding="utf-8"?>
+<p:sld xmlns:a="http://schemas.openxmlformats.org/drawingml/2006/main" xmlns:r="http://schemas.openxmlformats.org/officeDocument/2006/relationships" xmlns:p="http://schemas.openxmlformats.org/presentationml/2006/main">
+  <p:cSld>
+    <p:spTree>
+      <p:nvGrpSpPr>
+        <p:cNvPr id="1" name=""/>
+        <p:cNvGrpSpPr/>
+        <p:nvPr/>
+      </p:nvGrpSpPr>
+      <p:grpSpPr>
+        <a:xfrm>
+          <a:off x="0" y="0"/>
+          <a:ext cx="0" cy="0"/>
+          <a:chOff x="0" y="0"/>
+          <a:chExt cx="0" cy="0"/>
+        </a:xfrm>
+      </p:grpSpPr>
+      <p:sp>
+        <p:nvSpPr>
+          <p:cNvPr id="2" name="Title 1"/>
+          <p:cNvSpPr>
+            <a:spLocks noGrp="1"/>
+          </p:cNvSpPr>
+          <p:nvPr>
+            <p:ph type="title"/>
+          </p:nvPr>
+        </p:nvSpPr>
+        <p:spPr>
+          <a:xfrm>
+            <a:off x="1154955" y="1800338"/>
+            <a:ext cx="3865134" cy="708122"/>
+          </a:xfrm>
+        </p:spPr>
+        <p:txBody>
+          <a:bodyPr/>
+          <a:lstStyle/>
+          <a:p>
+            <a:r>
+              <a:rPr lang="en-US" dirty="0" smtClean="0"/>
+              <a:t>Entity relations</a:t>
+            </a:r>
+            <a:endParaRPr lang="en-US" dirty="0"/>
+          </a:p>
+        </p:txBody>
+      </p:sp>
+      <p:pic>
+        <p:nvPicPr>
+          <p:cNvPr id="5" name="Picture Placeholder 4"/>
+          <p:cNvPicPr>
+            <a:picLocks noGrp="1" noChangeAspect="1"/>
+          </p:cNvPicPr>
+          <p:nvPr>
+            <p:ph type="pic" idx="1"/>
+          </p:nvPr>
+        </p:nvPicPr>
+        <p:blipFill>
+          <a:blip r:embed="rId2">
+            <a:extLst>
+              <a:ext uri="{28A0092B-C50C-407E-A947-70E740481C1C}">
+                <a14:useLocalDpi xmlns:a14="http://schemas.microsoft.com/office/drawing/2010/main" val="0"/>
+              </a:ext>
+            </a:extLst>
+          </a:blip>
+          <a:stretch>
+            <a:fillRect/>
+          </a:stretch>
+        </p:blipFill>
+        <p:spPr>
+          <a:xfrm>
+            <a:off x="6233439" y="1220822"/>
+            <a:ext cx="4854361" cy="5159187"/>
+          </a:xfrm>
+        </p:spPr>
+      </p:pic>
+      <p:sp>
+        <p:nvSpPr>
+          <p:cNvPr id="4" name="Text Placeholder 3"/>
+          <p:cNvSpPr>
+            <a:spLocks noGrp="1"/>
+          </p:cNvSpPr>
+          <p:nvPr>
+            <p:ph type="body" sz="half" idx="2"/>
+          </p:nvPr>
+        </p:nvSpPr>
+        <p:spPr>
+          <a:xfrm>
+            <a:off x="1154954" y="2918297"/>
+            <a:ext cx="3757513" cy="1566155"/>
+          </a:xfrm>
+        </p:spPr>
+        <p:txBody>
+          <a:bodyPr>
+            <a:normAutofit/>
+          </a:bodyPr>
+          <a:lstStyle/>
+          <a:p>
+            <a:pPr marL="285750" indent="-285750">
+              <a:buClr>
+                <a:schemeClr val="bg1"/>
+              </a:buClr>
+              <a:buFont typeface="Wingdings" panose="05000000000000000000" pitchFamily="2" charset="2"/>
+              <a:buChar char="Ø"/>
+            </a:pPr>
+            <a:r>
+              <a:rPr lang="en-US" sz="2000" dirty="0" smtClean="0">
+                <a:solidFill>
+                  <a:schemeClr val="bg1"/>
+                </a:solidFill>
+              </a:rPr>
+              <a:t>One to One</a:t>
+            </a:r>
+          </a:p>
+          <a:p>
+            <a:pPr marL="285750" indent="-285750">
+              <a:buClr>
+                <a:schemeClr val="bg1"/>
+              </a:buClr>
+              <a:buFont typeface="Wingdings" panose="05000000000000000000" pitchFamily="2" charset="2"/>
+              <a:buChar char="Ø"/>
+            </a:pPr>
+            <a:r>
+              <a:rPr lang="en-US" sz="2000" dirty="0" smtClean="0">
+                <a:solidFill>
+                  <a:srgbClr val="92D050"/>
+                </a:solidFill>
+              </a:rPr>
+              <a:t>One to Many /most used/</a:t>
+            </a:r>
+          </a:p>
+          <a:p>
+            <a:pPr marL="285750" indent="-285750">
+              <a:buClr>
+                <a:schemeClr val="bg1"/>
+              </a:buClr>
+              <a:buFont typeface="Wingdings" panose="05000000000000000000" pitchFamily="2" charset="2"/>
+              <a:buChar char="Ø"/>
+            </a:pPr>
+            <a:r>
+              <a:rPr lang="en-US" sz="2000" dirty="0" smtClean="0">
+                <a:solidFill>
+                  <a:schemeClr val="bg1"/>
+                </a:solidFill>
+              </a:rPr>
+              <a:t>Many to Manu</a:t>
+            </a:r>
+            <a:endParaRPr lang="en-US" sz="2000" dirty="0">
+              <a:solidFill>
+                <a:schemeClr val="bg1"/>
+              </a:solidFill>
+            </a:endParaRPr>
+          </a:p>
+        </p:txBody>
+      </p:sp>
+    </p:spTree>
+    <p:extLst>
+      <p:ext uri="{BB962C8B-B14F-4D97-AF65-F5344CB8AC3E}">
+        <p14:creationId xmlns:p14="http://schemas.microsoft.com/office/powerpoint/2010/main" val="893005991"/>
+      </p:ext>
+    </p:extLst>
+  </p:cSld>
+  <p:clrMapOvr>
+    <a:masterClrMapping/>
+  </p:clrMapOvr>
+</p:sld>
+</file>
+
+<file path=ppt/slides/slide15.xml><?xml version="1.0" encoding="utf-8"?>
+<p:sld xmlns:a="http://schemas.openxmlformats.org/drawingml/2006/main" xmlns:r="http://schemas.openxmlformats.org/officeDocument/2006/relationships" xmlns:p="http://schemas.openxmlformats.org/presentationml/2006/main">
+  <p:cSld>
+    <p:spTree>
+      <p:nvGrpSpPr>
+        <p:cNvPr id="1" name=""/>
+        <p:cNvGrpSpPr/>
+        <p:nvPr/>
+      </p:nvGrpSpPr>
+      <p:grpSpPr>
+        <a:xfrm>
+          <a:off x="0" y="0"/>
+          <a:ext cx="0" cy="0"/>
+          <a:chOff x="0" y="0"/>
+          <a:chExt cx="0" cy="0"/>
+        </a:xfrm>
+      </p:grpSpPr>
+      <p:sp>
+        <p:nvSpPr>
+          <p:cNvPr id="2" name="Title 1"/>
+          <p:cNvSpPr>
+            <a:spLocks noGrp="1"/>
+          </p:cNvSpPr>
+          <p:nvPr>
+            <p:ph type="title"/>
+          </p:nvPr>
+        </p:nvSpPr>
+        <p:spPr/>
+        <p:txBody>
+          <a:bodyPr/>
+          <a:lstStyle/>
+          <a:p>
+            <a:pPr algn="ctr"/>
+            <a:r>
+              <a:rPr lang="en-US" dirty="0" smtClean="0"/>
+              <a:t>General Overview of EF Core</a:t>
+            </a:r>
+            <a:endParaRPr lang="en-US" dirty="0"/>
+          </a:p>
+        </p:txBody>
+      </p:sp>
+      <p:sp>
+        <p:nvSpPr>
+          <p:cNvPr id="3" name="Text Placeholder 2"/>
+          <p:cNvSpPr>
+            <a:spLocks noGrp="1"/>
+          </p:cNvSpPr>
+          <p:nvPr>
+            <p:ph type="body" sz="half" idx="2"/>
+          </p:nvPr>
+        </p:nvSpPr>
+        <p:spPr>
+          <a:xfrm>
+            <a:off x="1154954" y="3543300"/>
+            <a:ext cx="8825659" cy="3171536"/>
+          </a:xfrm>
+        </p:spPr>
+        <p:txBody>
+          <a:bodyPr/>
+          <a:lstStyle/>
+          <a:p>
+            <a:pPr marL="285750" indent="-285750">
+              <a:buFont typeface="Wingdings" panose="05000000000000000000" pitchFamily="2" charset="2"/>
+              <a:buChar char="Ø"/>
+            </a:pPr>
+            <a:r>
+              <a:rPr lang="en-US" dirty="0" smtClean="0"/>
+              <a:t>EF Core is Object Relation Mapper</a:t>
+            </a:r>
+          </a:p>
+          <a:p>
+            <a:pPr marL="285750" indent="-285750">
+              <a:buFont typeface="Wingdings" panose="05000000000000000000" pitchFamily="2" charset="2"/>
+              <a:buChar char="Ø"/>
+            </a:pPr>
+            <a:r>
+              <a:rPr lang="en-US" dirty="0" smtClean="0"/>
+              <a:t>Increase the productivity of programmers</a:t>
+            </a:r>
+          </a:p>
+          <a:p>
+            <a:pPr marL="285750" indent="-285750">
+              <a:buFont typeface="Wingdings" panose="05000000000000000000" pitchFamily="2" charset="2"/>
+              <a:buChar char="Ø"/>
+            </a:pPr>
+            <a:r>
+              <a:rPr lang="en-US" dirty="0" smtClean="0"/>
+              <a:t>Use C# LINQ instead of SQL direct queries</a:t>
+            </a:r>
+          </a:p>
+          <a:p>
+            <a:pPr marL="285750" indent="-285750">
+              <a:buFont typeface="Wingdings" panose="05000000000000000000" pitchFamily="2" charset="2"/>
+              <a:buChar char="Ø"/>
+            </a:pPr>
+            <a:r>
+              <a:rPr lang="en-US" dirty="0" smtClean="0"/>
+              <a:t>There are “Code First” and “Database First” approaches in creating of our database model system</a:t>
+            </a:r>
+          </a:p>
+          <a:p>
+            <a:pPr marL="285750" indent="-285750">
+              <a:buFont typeface="Wingdings" panose="05000000000000000000" pitchFamily="2" charset="2"/>
+              <a:buChar char="Ø"/>
+            </a:pPr>
+            <a:r>
+              <a:rPr lang="en-US" dirty="0" smtClean="0"/>
+              <a:t>Supports many database providers</a:t>
+            </a:r>
+          </a:p>
+          <a:p>
+            <a:pPr marL="285750" indent="-285750">
+              <a:buFont typeface="Wingdings" panose="05000000000000000000" pitchFamily="2" charset="2"/>
+              <a:buChar char="Ø"/>
+            </a:pPr>
+            <a:endParaRPr lang="en-US" dirty="0" smtClean="0"/>
+          </a:p>
+          <a:p>
+            <a:pPr marL="285750" indent="-285750">
+              <a:buFont typeface="Wingdings" panose="05000000000000000000" pitchFamily="2" charset="2"/>
+              <a:buChar char="Ø"/>
+            </a:pPr>
+            <a:endParaRPr lang="en-US" dirty="0"/>
+          </a:p>
+        </p:txBody>
+      </p:sp>
+    </p:spTree>
+    <p:extLst>
+      <p:ext uri="{BB962C8B-B14F-4D97-AF65-F5344CB8AC3E}">
+        <p14:creationId xmlns:p14="http://schemas.microsoft.com/office/powerpoint/2010/main" val="1253989669"/>
+      </p:ext>
+    </p:extLst>
+  </p:cSld>
+  <p:clrMapOvr>
+    <a:masterClrMapping/>
+  </p:clrMapOvr>
+</p:sld>
+</file>
+
+<file path=ppt/slides/slide16.xml><?xml version="1.0" encoding="utf-8"?>
+<p:sld xmlns:a="http://schemas.openxmlformats.org/drawingml/2006/main" xmlns:r="http://schemas.openxmlformats.org/officeDocument/2006/relationships" xmlns:p="http://schemas.openxmlformats.org/presentationml/2006/main">
+  <p:cSld>
+    <p:spTree>
+      <p:nvGrpSpPr>
+        <p:cNvPr id="1" name=""/>
+        <p:cNvGrpSpPr/>
+        <p:nvPr/>
+      </p:nvGrpSpPr>
+      <p:grpSpPr>
+        <a:xfrm>
+          <a:off x="0" y="0"/>
+          <a:ext cx="0" cy="0"/>
+          <a:chOff x="0" y="0"/>
+          <a:chExt cx="0" cy="0"/>
+        </a:xfrm>
+      </p:grpSpPr>
+      <p:sp>
+        <p:nvSpPr>
+          <p:cNvPr id="2" name="Title 1"/>
+          <p:cNvSpPr>
+            <a:spLocks noGrp="1"/>
+          </p:cNvSpPr>
+          <p:nvPr>
+            <p:ph type="ctrTitle"/>
+          </p:nvPr>
+        </p:nvSpPr>
+        <p:spPr>
+          <a:xfrm>
+            <a:off x="1311973" y="2752435"/>
+            <a:ext cx="8825658" cy="870399"/>
+          </a:xfrm>
+        </p:spPr>
+        <p:txBody>
+          <a:bodyPr/>
+          <a:lstStyle/>
+          <a:p>
+            <a:pPr algn="ctr"/>
+            <a:r>
+              <a:rPr lang="en-US" sz="8000" dirty="0" smtClean="0">
+                <a:latin typeface="Arial" panose="020B0604020202020204" pitchFamily="34" charset="0"/>
+                <a:cs typeface="Arial" panose="020B0604020202020204" pitchFamily="34" charset="0"/>
+              </a:rPr>
+              <a:t>Thank you!</a:t>
+            </a:r>
+            <a:endParaRPr lang="en-US" sz="8000" dirty="0">
+              <a:latin typeface="Arial" panose="020B0604020202020204" pitchFamily="34" charset="0"/>
+              <a:cs typeface="Arial" panose="020B0604020202020204" pitchFamily="34" charset="0"/>
+            </a:endParaRPr>
+          </a:p>
+        </p:txBody>
+      </p:sp>
+    </p:spTree>
+    <p:extLst>
+      <p:ext uri="{BB962C8B-B14F-4D97-AF65-F5344CB8AC3E}">
+        <p14:creationId xmlns:p14="http://schemas.microsoft.com/office/powerpoint/2010/main" val="3005036843"/>
+      </p:ext>
+    </p:extLst>
+  </p:cSld>
+  <p:clrMapOvr>
+    <a:masterClrMapping/>
+  </p:clrMapOvr>
+</p:sld>
+</file>
+
 <file path=ppt/slides/slide2.xml><?xml version="1.0" encoding="utf-8"?>
 <p:sld xmlns:a="http://schemas.openxmlformats.org/drawingml/2006/main" xmlns:r="http://schemas.openxmlformats.org/officeDocument/2006/relationships" xmlns:p="http://schemas.openxmlformats.org/presentationml/2006/main">
   <p:cSld>
@@ -13551,17 +14723,7 @@
                 <a:latin typeface="Arial" panose="020B0604020202020204" pitchFamily="34" charset="0"/>
                 <a:cs typeface="Arial" panose="020B0604020202020204" pitchFamily="34" charset="0"/>
               </a:rPr>
-              <a:t>In our Internet era, the database systems grows constantly. The efficiency, durability and the good maintenance are absolutely mandatory for the </a:t>
-            </a:r>
-            <a:r>
-              <a:rPr lang="en-US" sz="2000" dirty="0" smtClean="0">
-                <a:solidFill>
-                  <a:schemeClr val="bg1"/>
-                </a:solidFill>
-                <a:latin typeface="Arial" panose="020B0604020202020204" pitchFamily="34" charset="0"/>
-                <a:cs typeface="Arial" panose="020B0604020202020204" pitchFamily="34" charset="0"/>
-              </a:rPr>
-              <a:t>business!</a:t>
+              <a:t>In our Internet era, the database systems grows constantly. The efficiency, durability and the good maintenance are absolutely mandatory for the business!</a:t>
             </a:r>
             <a:endParaRPr lang="en-US" sz="2000" dirty="0">
               <a:solidFill>

</xml_diff>

<commit_message>
Add slide for nuget installation of EF Core
</commit_message>
<xml_diff>
--- a/Databases_and_EntityFrameworkCore.pptx
+++ b/Databases_and_EntityFrameworkCore.pptx
@@ -19,8 +19,9 @@
     <p:sldId id="267" r:id="rId13"/>
     <p:sldId id="268" r:id="rId14"/>
     <p:sldId id="269" r:id="rId15"/>
-    <p:sldId id="270" r:id="rId16"/>
-    <p:sldId id="271" r:id="rId17"/>
+    <p:sldId id="272" r:id="rId16"/>
+    <p:sldId id="270" r:id="rId17"/>
+    <p:sldId id="271" r:id="rId18"/>
   </p:sldIdLst>
   <p:sldSz cx="12192000" cy="6858000"/>
   <p:notesSz cx="6858000" cy="9144000"/>
@@ -138,6 +139,7 @@
             <p14:sldId id="267"/>
             <p14:sldId id="268"/>
             <p14:sldId id="269"/>
+            <p14:sldId id="272"/>
             <p14:sldId id="270"/>
             <p14:sldId id="271"/>
           </p14:sldIdLst>
@@ -14328,15 +14330,7 @@
                   <a:schemeClr val="bg1"/>
                 </a:solidFill>
               </a:rPr>
-              <a:t>to </a:t>
-            </a:r>
-            <a:r>
-              <a:rPr lang="en-US" sz="2000" smtClean="0">
-                <a:solidFill>
-                  <a:schemeClr val="bg1"/>
-                </a:solidFill>
-              </a:rPr>
-              <a:t>Many</a:t>
+              <a:t>to Many</a:t>
             </a:r>
             <a:endParaRPr lang="en-US" sz="2000" dirty="0">
               <a:solidFill>
@@ -14391,6 +14385,94 @@
           <a:bodyPr/>
           <a:lstStyle/>
           <a:p>
+            <a:r>
+              <a:rPr lang="en-US" dirty="0" smtClean="0">
+                <a:latin typeface="Arial" panose="020B0604020202020204" pitchFamily="34" charset="0"/>
+                <a:cs typeface="Arial" panose="020B0604020202020204" pitchFamily="34" charset="0"/>
+              </a:rPr>
+              <a:t>How to include EF Core in our project?</a:t>
+            </a:r>
+            <a:endParaRPr lang="en-US" dirty="0">
+              <a:latin typeface="Arial" panose="020B0604020202020204" pitchFamily="34" charset="0"/>
+              <a:cs typeface="Arial" panose="020B0604020202020204" pitchFamily="34" charset="0"/>
+            </a:endParaRPr>
+          </a:p>
+        </p:txBody>
+      </p:sp>
+      <p:pic>
+        <p:nvPicPr>
+          <p:cNvPr id="4" name="Content Placeholder 3"/>
+          <p:cNvPicPr>
+            <a:picLocks noGrp="1" noChangeAspect="1"/>
+          </p:cNvPicPr>
+          <p:nvPr>
+            <p:ph idx="1"/>
+          </p:nvPr>
+        </p:nvPicPr>
+        <p:blipFill>
+          <a:blip r:embed="rId2">
+            <a:extLst>
+              <a:ext uri="{28A0092B-C50C-407E-A947-70E740481C1C}">
+                <a14:useLocalDpi xmlns:a14="http://schemas.microsoft.com/office/drawing/2010/main" val="0"/>
+              </a:ext>
+            </a:extLst>
+          </a:blip>
+          <a:stretch>
+            <a:fillRect/>
+          </a:stretch>
+        </p:blipFill>
+        <p:spPr>
+          <a:xfrm>
+            <a:off x="573809" y="3406543"/>
+            <a:ext cx="10895641" cy="1710404"/>
+          </a:xfrm>
+        </p:spPr>
+      </p:pic>
+    </p:spTree>
+    <p:extLst>
+      <p:ext uri="{BB962C8B-B14F-4D97-AF65-F5344CB8AC3E}">
+        <p14:creationId xmlns:p14="http://schemas.microsoft.com/office/powerpoint/2010/main" val="2458569947"/>
+      </p:ext>
+    </p:extLst>
+  </p:cSld>
+  <p:clrMapOvr>
+    <a:masterClrMapping/>
+  </p:clrMapOvr>
+</p:sld>
+</file>
+
+<file path=ppt/slides/slide16.xml><?xml version="1.0" encoding="utf-8"?>
+<p:sld xmlns:a="http://schemas.openxmlformats.org/drawingml/2006/main" xmlns:r="http://schemas.openxmlformats.org/officeDocument/2006/relationships" xmlns:p="http://schemas.openxmlformats.org/presentationml/2006/main">
+  <p:cSld>
+    <p:spTree>
+      <p:nvGrpSpPr>
+        <p:cNvPr id="1" name=""/>
+        <p:cNvGrpSpPr/>
+        <p:nvPr/>
+      </p:nvGrpSpPr>
+      <p:grpSpPr>
+        <a:xfrm>
+          <a:off x="0" y="0"/>
+          <a:ext cx="0" cy="0"/>
+          <a:chOff x="0" y="0"/>
+          <a:chExt cx="0" cy="0"/>
+        </a:xfrm>
+      </p:grpSpPr>
+      <p:sp>
+        <p:nvSpPr>
+          <p:cNvPr id="2" name="Title 1"/>
+          <p:cNvSpPr>
+            <a:spLocks noGrp="1"/>
+          </p:cNvSpPr>
+          <p:nvPr>
+            <p:ph type="title"/>
+          </p:nvPr>
+        </p:nvSpPr>
+        <p:spPr/>
+        <p:txBody>
+          <a:bodyPr/>
+          <a:lstStyle/>
+          <a:p>
             <a:pPr algn="ctr"/>
             <a:r>
               <a:rPr lang="en-US" dirty="0" smtClean="0"/>
@@ -14498,7 +14580,7 @@
 </p:sld>
 </file>
 
-<file path=ppt/slides/slide16.xml><?xml version="1.0" encoding="utf-8"?>
+<file path=ppt/slides/slide17.xml><?xml version="1.0" encoding="utf-8"?>
 <p:sld xmlns:a="http://schemas.openxmlformats.org/drawingml/2006/main" xmlns:r="http://schemas.openxmlformats.org/officeDocument/2006/relationships" xmlns:p="http://schemas.openxmlformats.org/presentationml/2006/main">
   <p:cSld>
     <p:spTree>

</xml_diff>

<commit_message>
Add right font (Arial)
</commit_message>
<xml_diff>
--- a/Databases_and_EntityFrameworkCore.pptx
+++ b/Databases_and_EntityFrameworkCore.pptx
@@ -14217,10 +14217,16 @@
           <a:lstStyle/>
           <a:p>
             <a:r>
-              <a:rPr lang="en-US" dirty="0" smtClean="0"/>
+              <a:rPr lang="en-US" dirty="0" smtClean="0">
+                <a:latin typeface="Arial" panose="020B0604020202020204" pitchFamily="34" charset="0"/>
+                <a:cs typeface="Arial" panose="020B0604020202020204" pitchFamily="34" charset="0"/>
+              </a:rPr>
               <a:t>Entity relations</a:t>
             </a:r>
-            <a:endParaRPr lang="en-US" dirty="0"/>
+            <a:endParaRPr lang="en-US" dirty="0">
+              <a:latin typeface="Arial" panose="020B0604020202020204" pitchFamily="34" charset="0"/>
+              <a:cs typeface="Arial" panose="020B0604020202020204" pitchFamily="34" charset="0"/>
+            </a:endParaRPr>
           </a:p>
         </p:txBody>
       </p:sp>
@@ -14287,6 +14293,8 @@
                 <a:solidFill>
                   <a:schemeClr val="bg1"/>
                 </a:solidFill>
+                <a:latin typeface="Arial" panose="020B0604020202020204" pitchFamily="34" charset="0"/>
+                <a:cs typeface="Arial" panose="020B0604020202020204" pitchFamily="34" charset="0"/>
               </a:rPr>
               <a:t>One to One</a:t>
             </a:r>
@@ -14304,6 +14312,8 @@
                 <a:solidFill>
                   <a:srgbClr val="92D050"/>
                 </a:solidFill>
+                <a:latin typeface="Arial" panose="020B0604020202020204" pitchFamily="34" charset="0"/>
+                <a:cs typeface="Arial" panose="020B0604020202020204" pitchFamily="34" charset="0"/>
               </a:rPr>
               <a:t>One to Many /most used/</a:t>
             </a:r>
@@ -14321,21 +14331,17 @@
                 <a:solidFill>
                   <a:schemeClr val="bg1"/>
                 </a:solidFill>
+                <a:latin typeface="Arial" panose="020B0604020202020204" pitchFamily="34" charset="0"/>
+                <a:cs typeface="Arial" panose="020B0604020202020204" pitchFamily="34" charset="0"/>
               </a:rPr>
-              <a:t>Many </a:t>
-            </a:r>
-            <a:r>
-              <a:rPr lang="en-US" sz="2000" smtClean="0">
-                <a:solidFill>
-                  <a:schemeClr val="bg1"/>
-                </a:solidFill>
-              </a:rPr>
-              <a:t>to Many</a:t>
+              <a:t>Many to Many</a:t>
             </a:r>
             <a:endParaRPr lang="en-US" sz="2000" dirty="0">
               <a:solidFill>
                 <a:schemeClr val="bg1"/>
               </a:solidFill>
+              <a:latin typeface="Arial" panose="020B0604020202020204" pitchFamily="34" charset="0"/>
+              <a:cs typeface="Arial" panose="020B0604020202020204" pitchFamily="34" charset="0"/>
             </a:endParaRPr>
           </a:p>
         </p:txBody>
@@ -14475,10 +14481,16 @@
           <a:p>
             <a:pPr algn="ctr"/>
             <a:r>
-              <a:rPr lang="en-US" dirty="0" smtClean="0"/>
+              <a:rPr lang="en-US" dirty="0" smtClean="0">
+                <a:latin typeface="Arial" panose="020B0604020202020204" pitchFamily="34" charset="0"/>
+                <a:cs typeface="Arial" panose="020B0604020202020204" pitchFamily="34" charset="0"/>
+              </a:rPr>
               <a:t>General Overview of EF Core</a:t>
             </a:r>
-            <a:endParaRPr lang="en-US" dirty="0"/>
+            <a:endParaRPr lang="en-US" dirty="0">
+              <a:latin typeface="Arial" panose="020B0604020202020204" pitchFamily="34" charset="0"/>
+              <a:cs typeface="Arial" panose="020B0604020202020204" pitchFamily="34" charset="0"/>
+            </a:endParaRPr>
           </a:p>
         </p:txBody>
       </p:sp>
@@ -14507,7 +14519,10 @@
               <a:buChar char="Ø"/>
             </a:pPr>
             <a:r>
-              <a:rPr lang="en-US" dirty="0" smtClean="0"/>
+              <a:rPr lang="en-US" dirty="0" smtClean="0">
+                <a:latin typeface="Arial" panose="020B0604020202020204" pitchFamily="34" charset="0"/>
+                <a:cs typeface="Arial" panose="020B0604020202020204" pitchFamily="34" charset="0"/>
+              </a:rPr>
               <a:t>EF Core is Object Relation Mapper</a:t>
             </a:r>
           </a:p>
@@ -14517,7 +14532,10 @@
               <a:buChar char="Ø"/>
             </a:pPr>
             <a:r>
-              <a:rPr lang="en-US" dirty="0" smtClean="0"/>
+              <a:rPr lang="en-US" dirty="0" smtClean="0">
+                <a:latin typeface="Arial" panose="020B0604020202020204" pitchFamily="34" charset="0"/>
+                <a:cs typeface="Arial" panose="020B0604020202020204" pitchFamily="34" charset="0"/>
+              </a:rPr>
               <a:t>Increase the productivity of programmers</a:t>
             </a:r>
           </a:p>
@@ -14527,7 +14545,10 @@
               <a:buChar char="Ø"/>
             </a:pPr>
             <a:r>
-              <a:rPr lang="en-US" dirty="0" smtClean="0"/>
+              <a:rPr lang="en-US" dirty="0" smtClean="0">
+                <a:latin typeface="Arial" panose="020B0604020202020204" pitchFamily="34" charset="0"/>
+                <a:cs typeface="Arial" panose="020B0604020202020204" pitchFamily="34" charset="0"/>
+              </a:rPr>
               <a:t>Use C# LINQ instead of SQL direct queries</a:t>
             </a:r>
           </a:p>
@@ -14537,7 +14558,10 @@
               <a:buChar char="Ø"/>
             </a:pPr>
             <a:r>
-              <a:rPr lang="en-US" dirty="0" smtClean="0"/>
+              <a:rPr lang="en-US" dirty="0" smtClean="0">
+                <a:latin typeface="Arial" panose="020B0604020202020204" pitchFamily="34" charset="0"/>
+                <a:cs typeface="Arial" panose="020B0604020202020204" pitchFamily="34" charset="0"/>
+              </a:rPr>
               <a:t>There are “Code First” and “Database First” approaches in creating of our database model system</a:t>
             </a:r>
           </a:p>
@@ -14547,7 +14571,10 @@
               <a:buChar char="Ø"/>
             </a:pPr>
             <a:r>
-              <a:rPr lang="en-US" dirty="0" smtClean="0"/>
+              <a:rPr lang="en-US" dirty="0" smtClean="0">
+                <a:latin typeface="Arial" panose="020B0604020202020204" pitchFamily="34" charset="0"/>
+                <a:cs typeface="Arial" panose="020B0604020202020204" pitchFamily="34" charset="0"/>
+              </a:rPr>
               <a:t>Supports many database providers</a:t>
             </a:r>
           </a:p>

</xml_diff>

<commit_message>
Add slide for MS SQL server
</commit_message>
<xml_diff>
--- a/Databases_and_EntityFrameworkCore.pptx
+++ b/Databases_and_EntityFrameworkCore.pptx
@@ -10,18 +10,19 @@
     <p:sldId id="258" r:id="rId4"/>
     <p:sldId id="259" r:id="rId5"/>
     <p:sldId id="260" r:id="rId6"/>
-    <p:sldId id="261" r:id="rId7"/>
-    <p:sldId id="262" r:id="rId8"/>
-    <p:sldId id="263" r:id="rId9"/>
-    <p:sldId id="264" r:id="rId10"/>
-    <p:sldId id="265" r:id="rId11"/>
-    <p:sldId id="266" r:id="rId12"/>
-    <p:sldId id="267" r:id="rId13"/>
-    <p:sldId id="268" r:id="rId14"/>
-    <p:sldId id="269" r:id="rId15"/>
-    <p:sldId id="272" r:id="rId16"/>
-    <p:sldId id="270" r:id="rId17"/>
-    <p:sldId id="271" r:id="rId18"/>
+    <p:sldId id="273" r:id="rId7"/>
+    <p:sldId id="261" r:id="rId8"/>
+    <p:sldId id="262" r:id="rId9"/>
+    <p:sldId id="263" r:id="rId10"/>
+    <p:sldId id="264" r:id="rId11"/>
+    <p:sldId id="265" r:id="rId12"/>
+    <p:sldId id="266" r:id="rId13"/>
+    <p:sldId id="267" r:id="rId14"/>
+    <p:sldId id="268" r:id="rId15"/>
+    <p:sldId id="269" r:id="rId16"/>
+    <p:sldId id="272" r:id="rId17"/>
+    <p:sldId id="270" r:id="rId18"/>
+    <p:sldId id="271" r:id="rId19"/>
   </p:sldIdLst>
   <p:sldSz cx="12192000" cy="6858000"/>
   <p:notesSz cx="6858000" cy="9144000"/>
@@ -130,6 +131,7 @@
             <p14:sldId id="258"/>
             <p14:sldId id="259"/>
             <p14:sldId id="260"/>
+            <p14:sldId id="273"/>
             <p14:sldId id="261"/>
             <p14:sldId id="262"/>
             <p14:sldId id="263"/>
@@ -13425,6 +13427,439 @@
           <a:p>
             <a:pPr algn="ctr"/>
             <a:r>
+              <a:rPr lang="en-US" dirty="0" smtClean="0">
+                <a:latin typeface="Arial" panose="020B0604020202020204" pitchFamily="34" charset="0"/>
+                <a:cs typeface="Arial" panose="020B0604020202020204" pitchFamily="34" charset="0"/>
+              </a:rPr>
+              <a:t>The benefits of ORM systems?</a:t>
+            </a:r>
+            <a:endParaRPr lang="en-US" dirty="0">
+              <a:latin typeface="Arial" panose="020B0604020202020204" pitchFamily="34" charset="0"/>
+              <a:cs typeface="Arial" panose="020B0604020202020204" pitchFamily="34" charset="0"/>
+            </a:endParaRPr>
+          </a:p>
+        </p:txBody>
+      </p:sp>
+      <p:sp>
+        <p:nvSpPr>
+          <p:cNvPr id="4" name="Content Placeholder 3"/>
+          <p:cNvSpPr txBox="1">
+            <a:spLocks/>
+          </p:cNvSpPr>
+          <p:nvPr/>
+        </p:nvSpPr>
+        <p:spPr>
+          <a:xfrm>
+            <a:off x="1025236" y="3565236"/>
+            <a:ext cx="3980873" cy="1782619"/>
+          </a:xfrm>
+          <a:prstGeom prst="rect">
+            <a:avLst/>
+          </a:prstGeom>
+        </p:spPr>
+        <p:txBody>
+          <a:bodyPr/>
+          <a:lstStyle>
+            <a:lvl1pPr marL="342900" indent="-342900" algn="l" defTabSz="457200" rtl="0" eaLnBrk="1" latinLnBrk="0" hangingPunct="1">
+              <a:spcBef>
+                <a:spcPts val="1000"/>
+              </a:spcBef>
+              <a:spcAft>
+                <a:spcPts val="0"/>
+              </a:spcAft>
+              <a:buClr>
+                <a:schemeClr val="accent1"/>
+              </a:buClr>
+              <a:buSzPct val="80000"/>
+              <a:buFont typeface="Wingdings 3" charset="2"/>
+              <a:buChar char=""/>
+              <a:defRPr sz="1800" b="0" i="0" kern="1200">
+                <a:solidFill>
+                  <a:schemeClr val="tx1">
+                    <a:lumMod val="75000"/>
+                    <a:lumOff val="25000"/>
+                  </a:schemeClr>
+                </a:solidFill>
+                <a:latin typeface="+mn-lt"/>
+                <a:ea typeface="+mn-ea"/>
+                <a:cs typeface="+mn-cs"/>
+              </a:defRPr>
+            </a:lvl1pPr>
+            <a:lvl2pPr marL="742950" indent="-285750" algn="l" defTabSz="457200" rtl="0" eaLnBrk="1" latinLnBrk="0" hangingPunct="1">
+              <a:spcBef>
+                <a:spcPts val="1000"/>
+              </a:spcBef>
+              <a:spcAft>
+                <a:spcPts val="0"/>
+              </a:spcAft>
+              <a:buClr>
+                <a:schemeClr val="accent1"/>
+              </a:buClr>
+              <a:buSzPct val="80000"/>
+              <a:buFont typeface="Wingdings 3" charset="2"/>
+              <a:buChar char=""/>
+              <a:defRPr sz="1600" b="0" i="0" kern="1200">
+                <a:solidFill>
+                  <a:schemeClr val="tx1">
+                    <a:lumMod val="75000"/>
+                    <a:lumOff val="25000"/>
+                  </a:schemeClr>
+                </a:solidFill>
+                <a:latin typeface="+mn-lt"/>
+                <a:ea typeface="+mn-ea"/>
+                <a:cs typeface="+mn-cs"/>
+              </a:defRPr>
+            </a:lvl2pPr>
+            <a:lvl3pPr marL="1143000" indent="-228600" algn="l" defTabSz="457200" rtl="0" eaLnBrk="1" latinLnBrk="0" hangingPunct="1">
+              <a:spcBef>
+                <a:spcPts val="1000"/>
+              </a:spcBef>
+              <a:spcAft>
+                <a:spcPts val="0"/>
+              </a:spcAft>
+              <a:buClr>
+                <a:schemeClr val="accent1"/>
+              </a:buClr>
+              <a:buSzPct val="80000"/>
+              <a:buFont typeface="Wingdings 3" charset="2"/>
+              <a:buChar char=""/>
+              <a:defRPr sz="1400" b="0" i="0" kern="1200">
+                <a:solidFill>
+                  <a:schemeClr val="tx1">
+                    <a:lumMod val="75000"/>
+                    <a:lumOff val="25000"/>
+                  </a:schemeClr>
+                </a:solidFill>
+                <a:latin typeface="+mn-lt"/>
+                <a:ea typeface="+mn-ea"/>
+                <a:cs typeface="+mn-cs"/>
+              </a:defRPr>
+            </a:lvl3pPr>
+            <a:lvl4pPr marL="1600200" indent="-228600" algn="l" defTabSz="457200" rtl="0" eaLnBrk="1" latinLnBrk="0" hangingPunct="1">
+              <a:spcBef>
+                <a:spcPts val="1000"/>
+              </a:spcBef>
+              <a:spcAft>
+                <a:spcPts val="0"/>
+              </a:spcAft>
+              <a:buClr>
+                <a:schemeClr val="accent1"/>
+              </a:buClr>
+              <a:buSzPct val="80000"/>
+              <a:buFont typeface="Wingdings 3" charset="2"/>
+              <a:buChar char=""/>
+              <a:defRPr sz="1200" b="0" i="0" kern="1200">
+                <a:solidFill>
+                  <a:schemeClr val="tx1">
+                    <a:lumMod val="75000"/>
+                    <a:lumOff val="25000"/>
+                  </a:schemeClr>
+                </a:solidFill>
+                <a:latin typeface="+mn-lt"/>
+                <a:ea typeface="+mn-ea"/>
+                <a:cs typeface="+mn-cs"/>
+              </a:defRPr>
+            </a:lvl4pPr>
+            <a:lvl5pPr marL="2057400" indent="-228600" algn="l" defTabSz="457200" rtl="0" eaLnBrk="1" latinLnBrk="0" hangingPunct="1">
+              <a:spcBef>
+                <a:spcPts val="1000"/>
+              </a:spcBef>
+              <a:spcAft>
+                <a:spcPts val="0"/>
+              </a:spcAft>
+              <a:buClr>
+                <a:schemeClr val="accent1"/>
+              </a:buClr>
+              <a:buSzPct val="80000"/>
+              <a:buFont typeface="Wingdings 3" charset="2"/>
+              <a:buChar char=""/>
+              <a:defRPr sz="1200" b="0" i="0" kern="1200">
+                <a:solidFill>
+                  <a:schemeClr val="tx1">
+                    <a:lumMod val="75000"/>
+                    <a:lumOff val="25000"/>
+                  </a:schemeClr>
+                </a:solidFill>
+                <a:latin typeface="+mn-lt"/>
+                <a:ea typeface="+mn-ea"/>
+                <a:cs typeface="+mn-cs"/>
+              </a:defRPr>
+            </a:lvl5pPr>
+            <a:lvl6pPr marL="2514600" indent="-228600" algn="l" defTabSz="457200" rtl="0" eaLnBrk="1" latinLnBrk="0" hangingPunct="1">
+              <a:spcBef>
+                <a:spcPts val="1000"/>
+              </a:spcBef>
+              <a:spcAft>
+                <a:spcPts val="0"/>
+              </a:spcAft>
+              <a:buClr>
+                <a:schemeClr val="accent1"/>
+              </a:buClr>
+              <a:buSzPct val="80000"/>
+              <a:buFont typeface="Wingdings 3" charset="2"/>
+              <a:buChar char=""/>
+              <a:defRPr sz="1200" b="0" i="0" kern="1200">
+                <a:solidFill>
+                  <a:schemeClr val="tx1">
+                    <a:lumMod val="75000"/>
+                    <a:lumOff val="25000"/>
+                  </a:schemeClr>
+                </a:solidFill>
+                <a:latin typeface="+mn-lt"/>
+                <a:ea typeface="+mn-ea"/>
+                <a:cs typeface="+mn-cs"/>
+              </a:defRPr>
+            </a:lvl6pPr>
+            <a:lvl7pPr marL="2971800" indent="-228600" algn="l" defTabSz="457200" rtl="0" eaLnBrk="1" latinLnBrk="0" hangingPunct="1">
+              <a:spcBef>
+                <a:spcPts val="1000"/>
+              </a:spcBef>
+              <a:spcAft>
+                <a:spcPts val="0"/>
+              </a:spcAft>
+              <a:buClr>
+                <a:schemeClr val="accent1"/>
+              </a:buClr>
+              <a:buSzPct val="80000"/>
+              <a:buFont typeface="Wingdings 3" charset="2"/>
+              <a:buChar char=""/>
+              <a:defRPr sz="1200" b="0" i="0" kern="1200">
+                <a:solidFill>
+                  <a:schemeClr val="tx1">
+                    <a:lumMod val="75000"/>
+                    <a:lumOff val="25000"/>
+                  </a:schemeClr>
+                </a:solidFill>
+                <a:latin typeface="+mn-lt"/>
+                <a:ea typeface="+mn-ea"/>
+                <a:cs typeface="+mn-cs"/>
+              </a:defRPr>
+            </a:lvl7pPr>
+            <a:lvl8pPr marL="3429000" indent="-228600" algn="l" defTabSz="457200" rtl="0" eaLnBrk="1" latinLnBrk="0" hangingPunct="1">
+              <a:spcBef>
+                <a:spcPts val="1000"/>
+              </a:spcBef>
+              <a:spcAft>
+                <a:spcPts val="0"/>
+              </a:spcAft>
+              <a:buClr>
+                <a:schemeClr val="accent1"/>
+              </a:buClr>
+              <a:buSzPct val="80000"/>
+              <a:buFont typeface="Wingdings 3" charset="2"/>
+              <a:buChar char=""/>
+              <a:defRPr sz="1200" b="0" i="0" kern="1200">
+                <a:solidFill>
+                  <a:schemeClr val="tx1">
+                    <a:lumMod val="75000"/>
+                    <a:lumOff val="25000"/>
+                  </a:schemeClr>
+                </a:solidFill>
+                <a:latin typeface="+mn-lt"/>
+                <a:ea typeface="+mn-ea"/>
+                <a:cs typeface="+mn-cs"/>
+              </a:defRPr>
+            </a:lvl8pPr>
+            <a:lvl9pPr marL="3886200" indent="-228600" algn="l" defTabSz="457200" rtl="0" eaLnBrk="1" latinLnBrk="0" hangingPunct="1">
+              <a:spcBef>
+                <a:spcPts val="1000"/>
+              </a:spcBef>
+              <a:spcAft>
+                <a:spcPts val="0"/>
+              </a:spcAft>
+              <a:buClr>
+                <a:schemeClr val="accent1"/>
+              </a:buClr>
+              <a:buSzPct val="80000"/>
+              <a:buFont typeface="Wingdings 3" charset="2"/>
+              <a:buChar char=""/>
+              <a:defRPr sz="1200" b="0" i="0" kern="1200">
+                <a:solidFill>
+                  <a:schemeClr val="tx1">
+                    <a:lumMod val="75000"/>
+                    <a:lumOff val="25000"/>
+                  </a:schemeClr>
+                </a:solidFill>
+                <a:latin typeface="+mn-lt"/>
+                <a:ea typeface="+mn-ea"/>
+                <a:cs typeface="+mn-cs"/>
+              </a:defRPr>
+            </a:lvl9pPr>
+          </a:lstStyle>
+          <a:p>
+            <a:r>
+              <a:rPr lang="en-US" dirty="0" smtClean="0">
+                <a:latin typeface="Arial" panose="020B0604020202020204" pitchFamily="34" charset="0"/>
+                <a:cs typeface="Arial" panose="020B0604020202020204" pitchFamily="34" charset="0"/>
+              </a:rPr>
+              <a:t>Productivity</a:t>
+            </a:r>
+          </a:p>
+          <a:p>
+            <a:r>
+              <a:rPr lang="en-US" dirty="0" smtClean="0">
+                <a:latin typeface="Arial" panose="020B0604020202020204" pitchFamily="34" charset="0"/>
+                <a:cs typeface="Arial" panose="020B0604020202020204" pitchFamily="34" charset="0"/>
+              </a:rPr>
+              <a:t>Application Design</a:t>
+            </a:r>
+          </a:p>
+          <a:p>
+            <a:r>
+              <a:rPr lang="en-US" dirty="0" smtClean="0">
+                <a:latin typeface="Arial" panose="020B0604020202020204" pitchFamily="34" charset="0"/>
+                <a:cs typeface="Arial" panose="020B0604020202020204" pitchFamily="34" charset="0"/>
+              </a:rPr>
+              <a:t>Code Reuse</a:t>
+            </a:r>
+          </a:p>
+          <a:p>
+            <a:r>
+              <a:rPr lang="en-US" dirty="0" smtClean="0">
+                <a:latin typeface="Arial" panose="020B0604020202020204" pitchFamily="34" charset="0"/>
+                <a:cs typeface="Arial" panose="020B0604020202020204" pitchFamily="34" charset="0"/>
+              </a:rPr>
+              <a:t>Application Maintainability</a:t>
+            </a:r>
+          </a:p>
+          <a:p>
+            <a:endParaRPr lang="en-US" dirty="0" smtClean="0"/>
+          </a:p>
+          <a:p>
+            <a:endParaRPr lang="en-US" dirty="0"/>
+          </a:p>
+        </p:txBody>
+      </p:sp>
+      <p:pic>
+        <p:nvPicPr>
+          <p:cNvPr id="9" name="Picture 8"/>
+          <p:cNvPicPr>
+            <a:picLocks noChangeAspect="1"/>
+          </p:cNvPicPr>
+          <p:nvPr/>
+        </p:nvPicPr>
+        <p:blipFill>
+          <a:blip r:embed="rId2">
+            <a:extLst>
+              <a:ext uri="{28A0092B-C50C-407E-A947-70E740481C1C}">
+                <a14:useLocalDpi xmlns:a14="http://schemas.microsoft.com/office/drawing/2010/main" val="0"/>
+              </a:ext>
+            </a:extLst>
+          </a:blip>
+          <a:stretch>
+            <a:fillRect/>
+          </a:stretch>
+        </p:blipFill>
+        <p:spPr>
+          <a:xfrm>
+            <a:off x="5163127" y="3719463"/>
+            <a:ext cx="6837063" cy="1474163"/>
+          </a:xfrm>
+          <a:prstGeom prst="rect">
+            <a:avLst/>
+          </a:prstGeom>
+        </p:spPr>
+      </p:pic>
+      <p:sp>
+        <p:nvSpPr>
+          <p:cNvPr id="10" name="TextBox 9"/>
+          <p:cNvSpPr txBox="1"/>
+          <p:nvPr/>
+        </p:nvSpPr>
+        <p:spPr>
+          <a:xfrm>
+            <a:off x="5818911" y="3195904"/>
+            <a:ext cx="5098472" cy="369332"/>
+          </a:xfrm>
+          <a:prstGeom prst="rect">
+            <a:avLst/>
+          </a:prstGeom>
+          <a:noFill/>
+        </p:spPr>
+        <p:txBody>
+          <a:bodyPr wrap="square" rtlCol="0">
+            <a:spAutoFit/>
+          </a:bodyPr>
+          <a:lstStyle/>
+          <a:p>
+            <a:r>
+              <a:rPr lang="en-US" dirty="0" smtClean="0">
+                <a:solidFill>
+                  <a:schemeClr val="accent6">
+                    <a:lumMod val="50000"/>
+                  </a:schemeClr>
+                </a:solidFill>
+                <a:latin typeface="Arial" panose="020B0604020202020204" pitchFamily="34" charset="0"/>
+                <a:cs typeface="Arial" panose="020B0604020202020204" pitchFamily="34" charset="0"/>
+              </a:rPr>
+              <a:t>We work with C# but not with SQL anymore!</a:t>
+            </a:r>
+            <a:endParaRPr lang="en-US" dirty="0">
+              <a:solidFill>
+                <a:schemeClr val="accent6">
+                  <a:lumMod val="50000"/>
+                </a:schemeClr>
+              </a:solidFill>
+              <a:latin typeface="Arial" panose="020B0604020202020204" pitchFamily="34" charset="0"/>
+              <a:cs typeface="Arial" panose="020B0604020202020204" pitchFamily="34" charset="0"/>
+            </a:endParaRPr>
+          </a:p>
+        </p:txBody>
+      </p:sp>
+    </p:spTree>
+    <p:extLst>
+      <p:ext uri="{BB962C8B-B14F-4D97-AF65-F5344CB8AC3E}">
+        <p14:creationId xmlns:p14="http://schemas.microsoft.com/office/powerpoint/2010/main" val="1202831630"/>
+      </p:ext>
+    </p:extLst>
+  </p:cSld>
+  <p:clrMapOvr>
+    <a:masterClrMapping/>
+  </p:clrMapOvr>
+  <p:timing>
+    <p:tnLst>
+      <p:par>
+        <p:cTn id="1" dur="indefinite" restart="never" nodeType="tmRoot"/>
+      </p:par>
+    </p:tnLst>
+  </p:timing>
+</p:sld>
+</file>
+
+<file path=ppt/slides/slide11.xml><?xml version="1.0" encoding="utf-8"?>
+<p:sld xmlns:a="http://schemas.openxmlformats.org/drawingml/2006/main" xmlns:r="http://schemas.openxmlformats.org/officeDocument/2006/relationships" xmlns:p="http://schemas.openxmlformats.org/presentationml/2006/main">
+  <p:cSld>
+    <p:spTree>
+      <p:nvGrpSpPr>
+        <p:cNvPr id="1" name=""/>
+        <p:cNvGrpSpPr/>
+        <p:nvPr/>
+      </p:nvGrpSpPr>
+      <p:grpSpPr>
+        <a:xfrm>
+          <a:off x="0" y="0"/>
+          <a:ext cx="0" cy="0"/>
+          <a:chOff x="0" y="0"/>
+          <a:chExt cx="0" cy="0"/>
+        </a:xfrm>
+      </p:grpSpPr>
+      <p:sp>
+        <p:nvSpPr>
+          <p:cNvPr id="2" name="Title 1"/>
+          <p:cNvSpPr>
+            <a:spLocks noGrp="1"/>
+          </p:cNvSpPr>
+          <p:nvPr>
+            <p:ph type="title"/>
+          </p:nvPr>
+        </p:nvSpPr>
+        <p:spPr/>
+        <p:txBody>
+          <a:bodyPr/>
+          <a:lstStyle/>
+          <a:p>
+            <a:pPr algn="ctr"/>
+            <a:r>
               <a:rPr lang="en-US" dirty="0" smtClean="0"/>
               <a:t>Entity Framework Core</a:t>
             </a:r>
@@ -13542,7 +13977,7 @@
 </p:sld>
 </file>
 
-<file path=ppt/slides/slide11.xml><?xml version="1.0" encoding="utf-8"?>
+<file path=ppt/slides/slide12.xml><?xml version="1.0" encoding="utf-8"?>
 <p:sld xmlns:a="http://schemas.openxmlformats.org/drawingml/2006/main" xmlns:r="http://schemas.openxmlformats.org/officeDocument/2006/relationships" xmlns:p="http://schemas.openxmlformats.org/presentationml/2006/main">
   <p:cSld>
     <p:spTree>
@@ -13744,7 +14179,7 @@
 </p:sld>
 </file>
 
-<file path=ppt/slides/slide12.xml><?xml version="1.0" encoding="utf-8"?>
+<file path=ppt/slides/slide13.xml><?xml version="1.0" encoding="utf-8"?>
 <p:sld xmlns:a="http://schemas.openxmlformats.org/drawingml/2006/main" xmlns:r="http://schemas.openxmlformats.org/officeDocument/2006/relationships" xmlns:p="http://schemas.openxmlformats.org/presentationml/2006/main">
   <p:cSld>
     <p:spTree>
@@ -13931,7 +14366,7 @@
 </p:sld>
 </file>
 
-<file path=ppt/slides/slide13.xml><?xml version="1.0" encoding="utf-8"?>
+<file path=ppt/slides/slide14.xml><?xml version="1.0" encoding="utf-8"?>
 <p:sld xmlns:a="http://schemas.openxmlformats.org/drawingml/2006/main" xmlns:r="http://schemas.openxmlformats.org/officeDocument/2006/relationships" xmlns:p="http://schemas.openxmlformats.org/presentationml/2006/main">
   <p:cSld>
     <p:spTree>
@@ -14179,7 +14614,7 @@
 </p:sld>
 </file>
 
-<file path=ppt/slides/slide14.xml><?xml version="1.0" encoding="utf-8"?>
+<file path=ppt/slides/slide15.xml><?xml version="1.0" encoding="utf-8"?>
 <p:sld xmlns:a="http://schemas.openxmlformats.org/drawingml/2006/main" xmlns:r="http://schemas.openxmlformats.org/officeDocument/2006/relationships" xmlns:p="http://schemas.openxmlformats.org/presentationml/2006/main">
   <p:cSld>
     <p:spTree>
@@ -14359,7 +14794,7 @@
 </p:sld>
 </file>
 
-<file path=ppt/slides/slide15.xml><?xml version="1.0" encoding="utf-8"?>
+<file path=ppt/slides/slide16.xml><?xml version="1.0" encoding="utf-8"?>
 <p:sld xmlns:a="http://schemas.openxmlformats.org/drawingml/2006/main" xmlns:r="http://schemas.openxmlformats.org/officeDocument/2006/relationships" xmlns:p="http://schemas.openxmlformats.org/presentationml/2006/main">
   <p:cSld>
     <p:spTree>
@@ -14447,7 +14882,7 @@
 </p:sld>
 </file>
 
-<file path=ppt/slides/slide16.xml><?xml version="1.0" encoding="utf-8"?>
+<file path=ppt/slides/slide17.xml><?xml version="1.0" encoding="utf-8"?>
 <p:sld xmlns:a="http://schemas.openxmlformats.org/drawingml/2006/main" xmlns:r="http://schemas.openxmlformats.org/officeDocument/2006/relationships" xmlns:p="http://schemas.openxmlformats.org/presentationml/2006/main">
   <p:cSld>
     <p:spTree>
@@ -14607,7 +15042,7 @@
 </p:sld>
 </file>
 
-<file path=ppt/slides/slide17.xml><?xml version="1.0" encoding="utf-8"?>
+<file path=ppt/slides/slide18.xml><?xml version="1.0" encoding="utf-8"?>
 <p:sld xmlns:a="http://schemas.openxmlformats.org/drawingml/2006/main" xmlns:r="http://schemas.openxmlformats.org/officeDocument/2006/relationships" xmlns:p="http://schemas.openxmlformats.org/presentationml/2006/main">
   <p:cSld>
     <p:spTree>
@@ -15418,7 +15853,7 @@
                 <a:latin typeface="Arial" panose="020B0604020202020204" pitchFamily="34" charset="0"/>
                 <a:cs typeface="Arial" panose="020B0604020202020204" pitchFamily="34" charset="0"/>
               </a:rPr>
-              <a:t>MS SQL server profiler is a great tool! </a:t>
+              <a:t>MS SQL server (overview)</a:t>
             </a:r>
             <a:endParaRPr lang="en-US" dirty="0">
               <a:latin typeface="Arial" panose="020B0604020202020204" pitchFamily="34" charset="0"/>
@@ -15429,12 +15864,12 @@
       </p:sp>
       <p:pic>
         <p:nvPicPr>
-          <p:cNvPr id="5" name="Content Placeholder 4"/>
+          <p:cNvPr id="7" name="Content Placeholder 6"/>
           <p:cNvPicPr>
             <a:picLocks noGrp="1" noChangeAspect="1"/>
           </p:cNvPicPr>
           <p:nvPr>
-            <p:ph sz="half" idx="1"/>
+            <p:ph sz="half" idx="2"/>
           </p:nvPr>
         </p:nvPicPr>
         <p:blipFill>
@@ -15451,11 +15886,117 @@
         </p:blipFill>
         <p:spPr>
           <a:xfrm>
-            <a:off x="2139156" y="2882900"/>
-            <a:ext cx="2857500" cy="2857500"/>
+            <a:off x="1695811" y="2505508"/>
+            <a:ext cx="3485789" cy="3485789"/>
           </a:xfrm>
         </p:spPr>
       </p:pic>
+      <p:sp>
+        <p:nvSpPr>
+          <p:cNvPr id="6" name="Content Placeholder 5"/>
+          <p:cNvSpPr>
+            <a:spLocks noGrp="1"/>
+          </p:cNvSpPr>
+          <p:nvPr>
+            <p:ph sz="quarter" idx="4"/>
+          </p:nvPr>
+        </p:nvSpPr>
+        <p:spPr>
+          <a:xfrm>
+            <a:off x="6134821" y="2976164"/>
+            <a:ext cx="4825159" cy="2840039"/>
+          </a:xfrm>
+        </p:spPr>
+        <p:txBody>
+          <a:bodyPr/>
+          <a:lstStyle/>
+          <a:p>
+            <a:r>
+              <a:rPr lang="en-US" dirty="0" smtClean="0"/>
+              <a:t>Data definition – describe the structure of our data</a:t>
+            </a:r>
+          </a:p>
+          <a:p>
+            <a:r>
+              <a:rPr lang="en-US" dirty="0" smtClean="0"/>
+              <a:t>Data manipulation – store and retrieve data</a:t>
+            </a:r>
+          </a:p>
+          <a:p>
+            <a:r>
+              <a:rPr lang="en-US" dirty="0" smtClean="0"/>
+              <a:t>Data control – define who can access the data</a:t>
+            </a:r>
+          </a:p>
+          <a:p>
+            <a:r>
+              <a:rPr lang="en-US" dirty="0" smtClean="0"/>
+              <a:t>Transaction control – bundle operations and allow rollback</a:t>
+            </a:r>
+            <a:endParaRPr lang="en-US" dirty="0"/>
+          </a:p>
+        </p:txBody>
+      </p:sp>
+    </p:spTree>
+    <p:extLst>
+      <p:ext uri="{BB962C8B-B14F-4D97-AF65-F5344CB8AC3E}">
+        <p14:creationId xmlns:p14="http://schemas.microsoft.com/office/powerpoint/2010/main" val="3243709975"/>
+      </p:ext>
+    </p:extLst>
+  </p:cSld>
+  <p:clrMapOvr>
+    <a:masterClrMapping/>
+  </p:clrMapOvr>
+</p:sld>
+</file>
+
+<file path=ppt/slides/slide7.xml><?xml version="1.0" encoding="utf-8"?>
+<p:sld xmlns:a="http://schemas.openxmlformats.org/drawingml/2006/main" xmlns:r="http://schemas.openxmlformats.org/officeDocument/2006/relationships" xmlns:p="http://schemas.openxmlformats.org/presentationml/2006/main">
+  <p:cSld>
+    <p:spTree>
+      <p:nvGrpSpPr>
+        <p:cNvPr id="1" name=""/>
+        <p:cNvGrpSpPr/>
+        <p:nvPr/>
+      </p:nvGrpSpPr>
+      <p:grpSpPr>
+        <a:xfrm>
+          <a:off x="0" y="0"/>
+          <a:ext cx="0" cy="0"/>
+          <a:chOff x="0" y="0"/>
+          <a:chExt cx="0" cy="0"/>
+        </a:xfrm>
+      </p:grpSpPr>
+      <p:sp>
+        <p:nvSpPr>
+          <p:cNvPr id="2" name="Title 1"/>
+          <p:cNvSpPr>
+            <a:spLocks noGrp="1"/>
+          </p:cNvSpPr>
+          <p:nvPr>
+            <p:ph type="title"/>
+          </p:nvPr>
+        </p:nvSpPr>
+        <p:spPr/>
+        <p:txBody>
+          <a:bodyPr/>
+          <a:lstStyle/>
+          <a:p>
+            <a:pPr algn="ctr"/>
+            <a:r>
+              <a:rPr lang="en-US" dirty="0" smtClean="0">
+                <a:latin typeface="Arial" panose="020B0604020202020204" pitchFamily="34" charset="0"/>
+                <a:cs typeface="Arial" panose="020B0604020202020204" pitchFamily="34" charset="0"/>
+              </a:rPr>
+              <a:t>MS SQL server profiler is a great tool! </a:t>
+            </a:r>
+            <a:endParaRPr lang="en-US" dirty="0">
+              <a:latin typeface="Arial" panose="020B0604020202020204" pitchFamily="34" charset="0"/>
+              <a:cs typeface="Arial" panose="020B0604020202020204" pitchFamily="34" charset="0"/>
+            </a:endParaRPr>
+          </a:p>
+        </p:txBody>
+      </p:sp>
       <p:pic>
         <p:nvPicPr>
           <p:cNvPr id="6" name="Content Placeholder 5"/>
@@ -15467,7 +16008,7 @@
           </p:nvPr>
         </p:nvPicPr>
         <p:blipFill>
-          <a:blip r:embed="rId3">
+          <a:blip r:embed="rId2">
             <a:extLst>
               <a:ext uri="{28A0092B-C50C-407E-A947-70E740481C1C}">
                 <a14:useLocalDpi xmlns:a14="http://schemas.microsoft.com/office/drawing/2010/main" val="0"/>
@@ -15480,8 +16021,8 @@
         </p:blipFill>
         <p:spPr>
           <a:xfrm>
-            <a:off x="6208712" y="3223492"/>
-            <a:ext cx="4914975" cy="1995054"/>
+            <a:off x="1542473" y="2632365"/>
+            <a:ext cx="9322596" cy="3784166"/>
           </a:xfrm>
         </p:spPr>
       </p:pic>
@@ -15505,7 +16046,7 @@
 </p:sld>
 </file>
 
-<file path=ppt/slides/slide7.xml><?xml version="1.0" encoding="utf-8"?>
+<file path=ppt/slides/slide8.xml><?xml version="1.0" encoding="utf-8"?>
 <p:sld xmlns:a="http://schemas.openxmlformats.org/drawingml/2006/main" xmlns:r="http://schemas.openxmlformats.org/officeDocument/2006/relationships" xmlns:p="http://schemas.openxmlformats.org/presentationml/2006/main">
   <p:cSld>
     <p:spTree>
@@ -15690,7 +16231,7 @@
 </p:sld>
 </file>
 
-<file path=ppt/slides/slide8.xml><?xml version="1.0" encoding="utf-8"?>
+<file path=ppt/slides/slide9.xml><?xml version="1.0" encoding="utf-8"?>
 <p:sld xmlns:a="http://schemas.openxmlformats.org/drawingml/2006/main" xmlns:r="http://schemas.openxmlformats.org/officeDocument/2006/relationships" xmlns:p="http://schemas.openxmlformats.org/presentationml/2006/main">
   <p:cSld>
     <p:spTree>
@@ -15818,439 +16359,6 @@
     <p:extLst>
       <p:ext uri="{BB962C8B-B14F-4D97-AF65-F5344CB8AC3E}">
         <p14:creationId xmlns:p14="http://schemas.microsoft.com/office/powerpoint/2010/main" val="3976096915"/>
-      </p:ext>
-    </p:extLst>
-  </p:cSld>
-  <p:clrMapOvr>
-    <a:masterClrMapping/>
-  </p:clrMapOvr>
-  <p:timing>
-    <p:tnLst>
-      <p:par>
-        <p:cTn id="1" dur="indefinite" restart="never" nodeType="tmRoot"/>
-      </p:par>
-    </p:tnLst>
-  </p:timing>
-</p:sld>
-</file>
-
-<file path=ppt/slides/slide9.xml><?xml version="1.0" encoding="utf-8"?>
-<p:sld xmlns:a="http://schemas.openxmlformats.org/drawingml/2006/main" xmlns:r="http://schemas.openxmlformats.org/officeDocument/2006/relationships" xmlns:p="http://schemas.openxmlformats.org/presentationml/2006/main">
-  <p:cSld>
-    <p:spTree>
-      <p:nvGrpSpPr>
-        <p:cNvPr id="1" name=""/>
-        <p:cNvGrpSpPr/>
-        <p:nvPr/>
-      </p:nvGrpSpPr>
-      <p:grpSpPr>
-        <a:xfrm>
-          <a:off x="0" y="0"/>
-          <a:ext cx="0" cy="0"/>
-          <a:chOff x="0" y="0"/>
-          <a:chExt cx="0" cy="0"/>
-        </a:xfrm>
-      </p:grpSpPr>
-      <p:sp>
-        <p:nvSpPr>
-          <p:cNvPr id="2" name="Title 1"/>
-          <p:cNvSpPr>
-            <a:spLocks noGrp="1"/>
-          </p:cNvSpPr>
-          <p:nvPr>
-            <p:ph type="title"/>
-          </p:nvPr>
-        </p:nvSpPr>
-        <p:spPr/>
-        <p:txBody>
-          <a:bodyPr/>
-          <a:lstStyle/>
-          <a:p>
-            <a:pPr algn="ctr"/>
-            <a:r>
-              <a:rPr lang="en-US" dirty="0" smtClean="0">
-                <a:latin typeface="Arial" panose="020B0604020202020204" pitchFamily="34" charset="0"/>
-                <a:cs typeface="Arial" panose="020B0604020202020204" pitchFamily="34" charset="0"/>
-              </a:rPr>
-              <a:t>The benefits of ORM systems?</a:t>
-            </a:r>
-            <a:endParaRPr lang="en-US" dirty="0">
-              <a:latin typeface="Arial" panose="020B0604020202020204" pitchFamily="34" charset="0"/>
-              <a:cs typeface="Arial" panose="020B0604020202020204" pitchFamily="34" charset="0"/>
-            </a:endParaRPr>
-          </a:p>
-        </p:txBody>
-      </p:sp>
-      <p:sp>
-        <p:nvSpPr>
-          <p:cNvPr id="4" name="Content Placeholder 3"/>
-          <p:cNvSpPr txBox="1">
-            <a:spLocks/>
-          </p:cNvSpPr>
-          <p:nvPr/>
-        </p:nvSpPr>
-        <p:spPr>
-          <a:xfrm>
-            <a:off x="1025236" y="3565236"/>
-            <a:ext cx="3980873" cy="1782619"/>
-          </a:xfrm>
-          <a:prstGeom prst="rect">
-            <a:avLst/>
-          </a:prstGeom>
-        </p:spPr>
-        <p:txBody>
-          <a:bodyPr/>
-          <a:lstStyle>
-            <a:lvl1pPr marL="342900" indent="-342900" algn="l" defTabSz="457200" rtl="0" eaLnBrk="1" latinLnBrk="0" hangingPunct="1">
-              <a:spcBef>
-                <a:spcPts val="1000"/>
-              </a:spcBef>
-              <a:spcAft>
-                <a:spcPts val="0"/>
-              </a:spcAft>
-              <a:buClr>
-                <a:schemeClr val="accent1"/>
-              </a:buClr>
-              <a:buSzPct val="80000"/>
-              <a:buFont typeface="Wingdings 3" charset="2"/>
-              <a:buChar char=""/>
-              <a:defRPr sz="1800" b="0" i="0" kern="1200">
-                <a:solidFill>
-                  <a:schemeClr val="tx1">
-                    <a:lumMod val="75000"/>
-                    <a:lumOff val="25000"/>
-                  </a:schemeClr>
-                </a:solidFill>
-                <a:latin typeface="+mn-lt"/>
-                <a:ea typeface="+mn-ea"/>
-                <a:cs typeface="+mn-cs"/>
-              </a:defRPr>
-            </a:lvl1pPr>
-            <a:lvl2pPr marL="742950" indent="-285750" algn="l" defTabSz="457200" rtl="0" eaLnBrk="1" latinLnBrk="0" hangingPunct="1">
-              <a:spcBef>
-                <a:spcPts val="1000"/>
-              </a:spcBef>
-              <a:spcAft>
-                <a:spcPts val="0"/>
-              </a:spcAft>
-              <a:buClr>
-                <a:schemeClr val="accent1"/>
-              </a:buClr>
-              <a:buSzPct val="80000"/>
-              <a:buFont typeface="Wingdings 3" charset="2"/>
-              <a:buChar char=""/>
-              <a:defRPr sz="1600" b="0" i="0" kern="1200">
-                <a:solidFill>
-                  <a:schemeClr val="tx1">
-                    <a:lumMod val="75000"/>
-                    <a:lumOff val="25000"/>
-                  </a:schemeClr>
-                </a:solidFill>
-                <a:latin typeface="+mn-lt"/>
-                <a:ea typeface="+mn-ea"/>
-                <a:cs typeface="+mn-cs"/>
-              </a:defRPr>
-            </a:lvl2pPr>
-            <a:lvl3pPr marL="1143000" indent="-228600" algn="l" defTabSz="457200" rtl="0" eaLnBrk="1" latinLnBrk="0" hangingPunct="1">
-              <a:spcBef>
-                <a:spcPts val="1000"/>
-              </a:spcBef>
-              <a:spcAft>
-                <a:spcPts val="0"/>
-              </a:spcAft>
-              <a:buClr>
-                <a:schemeClr val="accent1"/>
-              </a:buClr>
-              <a:buSzPct val="80000"/>
-              <a:buFont typeface="Wingdings 3" charset="2"/>
-              <a:buChar char=""/>
-              <a:defRPr sz="1400" b="0" i="0" kern="1200">
-                <a:solidFill>
-                  <a:schemeClr val="tx1">
-                    <a:lumMod val="75000"/>
-                    <a:lumOff val="25000"/>
-                  </a:schemeClr>
-                </a:solidFill>
-                <a:latin typeface="+mn-lt"/>
-                <a:ea typeface="+mn-ea"/>
-                <a:cs typeface="+mn-cs"/>
-              </a:defRPr>
-            </a:lvl3pPr>
-            <a:lvl4pPr marL="1600200" indent="-228600" algn="l" defTabSz="457200" rtl="0" eaLnBrk="1" latinLnBrk="0" hangingPunct="1">
-              <a:spcBef>
-                <a:spcPts val="1000"/>
-              </a:spcBef>
-              <a:spcAft>
-                <a:spcPts val="0"/>
-              </a:spcAft>
-              <a:buClr>
-                <a:schemeClr val="accent1"/>
-              </a:buClr>
-              <a:buSzPct val="80000"/>
-              <a:buFont typeface="Wingdings 3" charset="2"/>
-              <a:buChar char=""/>
-              <a:defRPr sz="1200" b="0" i="0" kern="1200">
-                <a:solidFill>
-                  <a:schemeClr val="tx1">
-                    <a:lumMod val="75000"/>
-                    <a:lumOff val="25000"/>
-                  </a:schemeClr>
-                </a:solidFill>
-                <a:latin typeface="+mn-lt"/>
-                <a:ea typeface="+mn-ea"/>
-                <a:cs typeface="+mn-cs"/>
-              </a:defRPr>
-            </a:lvl4pPr>
-            <a:lvl5pPr marL="2057400" indent="-228600" algn="l" defTabSz="457200" rtl="0" eaLnBrk="1" latinLnBrk="0" hangingPunct="1">
-              <a:spcBef>
-                <a:spcPts val="1000"/>
-              </a:spcBef>
-              <a:spcAft>
-                <a:spcPts val="0"/>
-              </a:spcAft>
-              <a:buClr>
-                <a:schemeClr val="accent1"/>
-              </a:buClr>
-              <a:buSzPct val="80000"/>
-              <a:buFont typeface="Wingdings 3" charset="2"/>
-              <a:buChar char=""/>
-              <a:defRPr sz="1200" b="0" i="0" kern="1200">
-                <a:solidFill>
-                  <a:schemeClr val="tx1">
-                    <a:lumMod val="75000"/>
-                    <a:lumOff val="25000"/>
-                  </a:schemeClr>
-                </a:solidFill>
-                <a:latin typeface="+mn-lt"/>
-                <a:ea typeface="+mn-ea"/>
-                <a:cs typeface="+mn-cs"/>
-              </a:defRPr>
-            </a:lvl5pPr>
-            <a:lvl6pPr marL="2514600" indent="-228600" algn="l" defTabSz="457200" rtl="0" eaLnBrk="1" latinLnBrk="0" hangingPunct="1">
-              <a:spcBef>
-                <a:spcPts val="1000"/>
-              </a:spcBef>
-              <a:spcAft>
-                <a:spcPts val="0"/>
-              </a:spcAft>
-              <a:buClr>
-                <a:schemeClr val="accent1"/>
-              </a:buClr>
-              <a:buSzPct val="80000"/>
-              <a:buFont typeface="Wingdings 3" charset="2"/>
-              <a:buChar char=""/>
-              <a:defRPr sz="1200" b="0" i="0" kern="1200">
-                <a:solidFill>
-                  <a:schemeClr val="tx1">
-                    <a:lumMod val="75000"/>
-                    <a:lumOff val="25000"/>
-                  </a:schemeClr>
-                </a:solidFill>
-                <a:latin typeface="+mn-lt"/>
-                <a:ea typeface="+mn-ea"/>
-                <a:cs typeface="+mn-cs"/>
-              </a:defRPr>
-            </a:lvl6pPr>
-            <a:lvl7pPr marL="2971800" indent="-228600" algn="l" defTabSz="457200" rtl="0" eaLnBrk="1" latinLnBrk="0" hangingPunct="1">
-              <a:spcBef>
-                <a:spcPts val="1000"/>
-              </a:spcBef>
-              <a:spcAft>
-                <a:spcPts val="0"/>
-              </a:spcAft>
-              <a:buClr>
-                <a:schemeClr val="accent1"/>
-              </a:buClr>
-              <a:buSzPct val="80000"/>
-              <a:buFont typeface="Wingdings 3" charset="2"/>
-              <a:buChar char=""/>
-              <a:defRPr sz="1200" b="0" i="0" kern="1200">
-                <a:solidFill>
-                  <a:schemeClr val="tx1">
-                    <a:lumMod val="75000"/>
-                    <a:lumOff val="25000"/>
-                  </a:schemeClr>
-                </a:solidFill>
-                <a:latin typeface="+mn-lt"/>
-                <a:ea typeface="+mn-ea"/>
-                <a:cs typeface="+mn-cs"/>
-              </a:defRPr>
-            </a:lvl7pPr>
-            <a:lvl8pPr marL="3429000" indent="-228600" algn="l" defTabSz="457200" rtl="0" eaLnBrk="1" latinLnBrk="0" hangingPunct="1">
-              <a:spcBef>
-                <a:spcPts val="1000"/>
-              </a:spcBef>
-              <a:spcAft>
-                <a:spcPts val="0"/>
-              </a:spcAft>
-              <a:buClr>
-                <a:schemeClr val="accent1"/>
-              </a:buClr>
-              <a:buSzPct val="80000"/>
-              <a:buFont typeface="Wingdings 3" charset="2"/>
-              <a:buChar char=""/>
-              <a:defRPr sz="1200" b="0" i="0" kern="1200">
-                <a:solidFill>
-                  <a:schemeClr val="tx1">
-                    <a:lumMod val="75000"/>
-                    <a:lumOff val="25000"/>
-                  </a:schemeClr>
-                </a:solidFill>
-                <a:latin typeface="+mn-lt"/>
-                <a:ea typeface="+mn-ea"/>
-                <a:cs typeface="+mn-cs"/>
-              </a:defRPr>
-            </a:lvl8pPr>
-            <a:lvl9pPr marL="3886200" indent="-228600" algn="l" defTabSz="457200" rtl="0" eaLnBrk="1" latinLnBrk="0" hangingPunct="1">
-              <a:spcBef>
-                <a:spcPts val="1000"/>
-              </a:spcBef>
-              <a:spcAft>
-                <a:spcPts val="0"/>
-              </a:spcAft>
-              <a:buClr>
-                <a:schemeClr val="accent1"/>
-              </a:buClr>
-              <a:buSzPct val="80000"/>
-              <a:buFont typeface="Wingdings 3" charset="2"/>
-              <a:buChar char=""/>
-              <a:defRPr sz="1200" b="0" i="0" kern="1200">
-                <a:solidFill>
-                  <a:schemeClr val="tx1">
-                    <a:lumMod val="75000"/>
-                    <a:lumOff val="25000"/>
-                  </a:schemeClr>
-                </a:solidFill>
-                <a:latin typeface="+mn-lt"/>
-                <a:ea typeface="+mn-ea"/>
-                <a:cs typeface="+mn-cs"/>
-              </a:defRPr>
-            </a:lvl9pPr>
-          </a:lstStyle>
-          <a:p>
-            <a:r>
-              <a:rPr lang="en-US" dirty="0" smtClean="0">
-                <a:latin typeface="Arial" panose="020B0604020202020204" pitchFamily="34" charset="0"/>
-                <a:cs typeface="Arial" panose="020B0604020202020204" pitchFamily="34" charset="0"/>
-              </a:rPr>
-              <a:t>Productivity</a:t>
-            </a:r>
-          </a:p>
-          <a:p>
-            <a:r>
-              <a:rPr lang="en-US" dirty="0" smtClean="0">
-                <a:latin typeface="Arial" panose="020B0604020202020204" pitchFamily="34" charset="0"/>
-                <a:cs typeface="Arial" panose="020B0604020202020204" pitchFamily="34" charset="0"/>
-              </a:rPr>
-              <a:t>Application Design</a:t>
-            </a:r>
-          </a:p>
-          <a:p>
-            <a:r>
-              <a:rPr lang="en-US" dirty="0" smtClean="0">
-                <a:latin typeface="Arial" panose="020B0604020202020204" pitchFamily="34" charset="0"/>
-                <a:cs typeface="Arial" panose="020B0604020202020204" pitchFamily="34" charset="0"/>
-              </a:rPr>
-              <a:t>Code Reuse</a:t>
-            </a:r>
-          </a:p>
-          <a:p>
-            <a:r>
-              <a:rPr lang="en-US" dirty="0" smtClean="0">
-                <a:latin typeface="Arial" panose="020B0604020202020204" pitchFamily="34" charset="0"/>
-                <a:cs typeface="Arial" panose="020B0604020202020204" pitchFamily="34" charset="0"/>
-              </a:rPr>
-              <a:t>Application Maintainability</a:t>
-            </a:r>
-          </a:p>
-          <a:p>
-            <a:endParaRPr lang="en-US" dirty="0" smtClean="0"/>
-          </a:p>
-          <a:p>
-            <a:endParaRPr lang="en-US" dirty="0"/>
-          </a:p>
-        </p:txBody>
-      </p:sp>
-      <p:pic>
-        <p:nvPicPr>
-          <p:cNvPr id="9" name="Picture 8"/>
-          <p:cNvPicPr>
-            <a:picLocks noChangeAspect="1"/>
-          </p:cNvPicPr>
-          <p:nvPr/>
-        </p:nvPicPr>
-        <p:blipFill>
-          <a:blip r:embed="rId2">
-            <a:extLst>
-              <a:ext uri="{28A0092B-C50C-407E-A947-70E740481C1C}">
-                <a14:useLocalDpi xmlns:a14="http://schemas.microsoft.com/office/drawing/2010/main" val="0"/>
-              </a:ext>
-            </a:extLst>
-          </a:blip>
-          <a:stretch>
-            <a:fillRect/>
-          </a:stretch>
-        </p:blipFill>
-        <p:spPr>
-          <a:xfrm>
-            <a:off x="5163127" y="3719463"/>
-            <a:ext cx="6837063" cy="1474163"/>
-          </a:xfrm>
-          <a:prstGeom prst="rect">
-            <a:avLst/>
-          </a:prstGeom>
-        </p:spPr>
-      </p:pic>
-      <p:sp>
-        <p:nvSpPr>
-          <p:cNvPr id="10" name="TextBox 9"/>
-          <p:cNvSpPr txBox="1"/>
-          <p:nvPr/>
-        </p:nvSpPr>
-        <p:spPr>
-          <a:xfrm>
-            <a:off x="5818911" y="3195904"/>
-            <a:ext cx="5098472" cy="369332"/>
-          </a:xfrm>
-          <a:prstGeom prst="rect">
-            <a:avLst/>
-          </a:prstGeom>
-          <a:noFill/>
-        </p:spPr>
-        <p:txBody>
-          <a:bodyPr wrap="square" rtlCol="0">
-            <a:spAutoFit/>
-          </a:bodyPr>
-          <a:lstStyle/>
-          <a:p>
-            <a:r>
-              <a:rPr lang="en-US" dirty="0" smtClean="0">
-                <a:solidFill>
-                  <a:schemeClr val="accent6">
-                    <a:lumMod val="50000"/>
-                  </a:schemeClr>
-                </a:solidFill>
-                <a:latin typeface="Arial" panose="020B0604020202020204" pitchFamily="34" charset="0"/>
-                <a:cs typeface="Arial" panose="020B0604020202020204" pitchFamily="34" charset="0"/>
-              </a:rPr>
-              <a:t>We work with C# but not with SQL anymore!</a:t>
-            </a:r>
-            <a:endParaRPr lang="en-US" dirty="0">
-              <a:solidFill>
-                <a:schemeClr val="accent6">
-                  <a:lumMod val="50000"/>
-                </a:schemeClr>
-              </a:solidFill>
-              <a:latin typeface="Arial" panose="020B0604020202020204" pitchFamily="34" charset="0"/>
-              <a:cs typeface="Arial" panose="020B0604020202020204" pitchFamily="34" charset="0"/>
-            </a:endParaRPr>
-          </a:p>
-        </p:txBody>
-      </p:sp>
-    </p:spTree>
-    <p:extLst>
-      <p:ext uri="{BB962C8B-B14F-4D97-AF65-F5344CB8AC3E}">
-        <p14:creationId xmlns:p14="http://schemas.microsoft.com/office/powerpoint/2010/main" val="1202831630"/>
       </p:ext>
     </p:extLst>
   </p:cSld>

</xml_diff>

<commit_message>
Add Table of Content
</commit_message>
<xml_diff>
--- a/Databases_and_EntityFrameworkCore.pptx
+++ b/Databases_and_EntityFrameworkCore.pptx
@@ -6,23 +6,24 @@
   </p:sldMasterIdLst>
   <p:sldIdLst>
     <p:sldId id="256" r:id="rId2"/>
-    <p:sldId id="257" r:id="rId3"/>
-    <p:sldId id="258" r:id="rId4"/>
-    <p:sldId id="259" r:id="rId5"/>
-    <p:sldId id="260" r:id="rId6"/>
-    <p:sldId id="273" r:id="rId7"/>
-    <p:sldId id="261" r:id="rId8"/>
-    <p:sldId id="262" r:id="rId9"/>
-    <p:sldId id="263" r:id="rId10"/>
-    <p:sldId id="264" r:id="rId11"/>
-    <p:sldId id="265" r:id="rId12"/>
-    <p:sldId id="266" r:id="rId13"/>
-    <p:sldId id="267" r:id="rId14"/>
-    <p:sldId id="268" r:id="rId15"/>
-    <p:sldId id="269" r:id="rId16"/>
-    <p:sldId id="272" r:id="rId17"/>
-    <p:sldId id="270" r:id="rId18"/>
-    <p:sldId id="271" r:id="rId19"/>
+    <p:sldId id="275" r:id="rId3"/>
+    <p:sldId id="257" r:id="rId4"/>
+    <p:sldId id="258" r:id="rId5"/>
+    <p:sldId id="259" r:id="rId6"/>
+    <p:sldId id="260" r:id="rId7"/>
+    <p:sldId id="273" r:id="rId8"/>
+    <p:sldId id="261" r:id="rId9"/>
+    <p:sldId id="262" r:id="rId10"/>
+    <p:sldId id="263" r:id="rId11"/>
+    <p:sldId id="264" r:id="rId12"/>
+    <p:sldId id="265" r:id="rId13"/>
+    <p:sldId id="266" r:id="rId14"/>
+    <p:sldId id="267" r:id="rId15"/>
+    <p:sldId id="268" r:id="rId16"/>
+    <p:sldId id="269" r:id="rId17"/>
+    <p:sldId id="272" r:id="rId18"/>
+    <p:sldId id="270" r:id="rId19"/>
+    <p:sldId id="271" r:id="rId20"/>
   </p:sldIdLst>
   <p:sldSz cx="12192000" cy="6858000"/>
   <p:notesSz cx="6858000" cy="9144000"/>
@@ -127,6 +128,7 @@
         <p14:section name="Default Section" id="{C1FD6918-818C-474D-8E85-514B1C44E266}">
           <p14:sldIdLst>
             <p14:sldId id="256"/>
+            <p14:sldId id="275"/>
             <p14:sldId id="257"/>
             <p14:sldId id="258"/>
             <p14:sldId id="259"/>
@@ -516,7 +518,7 @@
           <a:p>
             <a:fld id="{87DD66F1-7FC0-403D-82FE-3DDCE4AD2CCB}" type="datetimeFigureOut">
               <a:rPr lang="en-US" smtClean="0"/>
-              <a:t>9/11/2021</a:t>
+              <a:t>9/13/2021</a:t>
             </a:fld>
             <a:endParaRPr lang="en-US" dirty="0"/>
           </a:p>
@@ -1604,7 +1606,7 @@
           <a:p>
             <a:fld id="{87DD66F1-7FC0-403D-82FE-3DDCE4AD2CCB}" type="datetimeFigureOut">
               <a:rPr lang="en-US" smtClean="0"/>
-              <a:t>9/11/2021</a:t>
+              <a:t>9/13/2021</a:t>
             </a:fld>
             <a:endParaRPr lang="en-US" dirty="0"/>
           </a:p>
@@ -2584,7 +2586,7 @@
           <a:p>
             <a:fld id="{87DD66F1-7FC0-403D-82FE-3DDCE4AD2CCB}" type="datetimeFigureOut">
               <a:rPr lang="en-US" smtClean="0"/>
-              <a:t>9/11/2021</a:t>
+              <a:t>9/13/2021</a:t>
             </a:fld>
             <a:endParaRPr lang="en-US" dirty="0"/>
           </a:p>
@@ -3718,7 +3720,7 @@
           <a:p>
             <a:fld id="{87DD66F1-7FC0-403D-82FE-3DDCE4AD2CCB}" type="datetimeFigureOut">
               <a:rPr lang="en-US" smtClean="0"/>
-              <a:t>9/11/2021</a:t>
+              <a:t>9/13/2021</a:t>
             </a:fld>
             <a:endParaRPr lang="en-US" dirty="0"/>
           </a:p>
@@ -4751,7 +4753,7 @@
           <a:p>
             <a:fld id="{87DD66F1-7FC0-403D-82FE-3DDCE4AD2CCB}" type="datetimeFigureOut">
               <a:rPr lang="en-US" smtClean="0"/>
-              <a:t>9/11/2021</a:t>
+              <a:t>9/13/2021</a:t>
             </a:fld>
             <a:endParaRPr lang="en-US" dirty="0"/>
           </a:p>
@@ -5411,7 +5413,7 @@
           <a:p>
             <a:fld id="{87DD66F1-7FC0-403D-82FE-3DDCE4AD2CCB}" type="datetimeFigureOut">
               <a:rPr lang="en-US" smtClean="0"/>
-              <a:t>9/11/2021</a:t>
+              <a:t>9/13/2021</a:t>
             </a:fld>
             <a:endParaRPr lang="en-US" dirty="0"/>
           </a:p>
@@ -6272,7 +6274,7 @@
           <a:p>
             <a:fld id="{87DD66F1-7FC0-403D-82FE-3DDCE4AD2CCB}" type="datetimeFigureOut">
               <a:rPr lang="en-US" smtClean="0"/>
-              <a:t>9/11/2021</a:t>
+              <a:t>9/13/2021</a:t>
             </a:fld>
             <a:endParaRPr lang="en-US" dirty="0"/>
           </a:p>
@@ -6462,7 +6464,7 @@
           <a:p>
             <a:fld id="{87DD66F1-7FC0-403D-82FE-3DDCE4AD2CCB}" type="datetimeFigureOut">
               <a:rPr lang="en-US" smtClean="0"/>
-              <a:t>9/11/2021</a:t>
+              <a:t>9/13/2021</a:t>
             </a:fld>
             <a:endParaRPr lang="en-US" dirty="0"/>
           </a:p>
@@ -7434,7 +7436,7 @@
           <a:p>
             <a:fld id="{87DD66F1-7FC0-403D-82FE-3DDCE4AD2CCB}" type="datetimeFigureOut">
               <a:rPr lang="en-US" smtClean="0"/>
-              <a:t>9/11/2021</a:t>
+              <a:t>9/13/2021</a:t>
             </a:fld>
             <a:endParaRPr lang="en-US" dirty="0"/>
           </a:p>
@@ -7645,7 +7647,7 @@
           <a:p>
             <a:fld id="{87DD66F1-7FC0-403D-82FE-3DDCE4AD2CCB}" type="datetimeFigureOut">
               <a:rPr lang="en-US" smtClean="0"/>
-              <a:t>9/11/2021</a:t>
+              <a:t>9/13/2021</a:t>
             </a:fld>
             <a:endParaRPr lang="en-US" dirty="0"/>
           </a:p>
@@ -8679,7 +8681,7 @@
           <a:p>
             <a:fld id="{87DD66F1-7FC0-403D-82FE-3DDCE4AD2CCB}" type="datetimeFigureOut">
               <a:rPr lang="en-US" smtClean="0"/>
-              <a:t>9/11/2021</a:t>
+              <a:t>9/13/2021</a:t>
             </a:fld>
             <a:endParaRPr lang="en-US" dirty="0"/>
           </a:p>
@@ -8951,7 +8953,7 @@
           <a:p>
             <a:fld id="{87DD66F1-7FC0-403D-82FE-3DDCE4AD2CCB}" type="datetimeFigureOut">
               <a:rPr lang="en-US" smtClean="0"/>
-              <a:t>9/11/2021</a:t>
+              <a:t>9/13/2021</a:t>
             </a:fld>
             <a:endParaRPr lang="en-US" dirty="0"/>
           </a:p>
@@ -9361,7 +9363,7 @@
           <a:p>
             <a:fld id="{87DD66F1-7FC0-403D-82FE-3DDCE4AD2CCB}" type="datetimeFigureOut">
               <a:rPr lang="en-US" smtClean="0"/>
-              <a:t>9/11/2021</a:t>
+              <a:t>9/13/2021</a:t>
             </a:fld>
             <a:endParaRPr lang="en-US" dirty="0"/>
           </a:p>
@@ -9488,7 +9490,7 @@
           <a:p>
             <a:fld id="{87DD66F1-7FC0-403D-82FE-3DDCE4AD2CCB}" type="datetimeFigureOut">
               <a:rPr lang="en-US" smtClean="0"/>
-              <a:t>9/11/2021</a:t>
+              <a:t>9/13/2021</a:t>
             </a:fld>
             <a:endParaRPr lang="en-US" dirty="0"/>
           </a:p>
@@ -9583,7 +9585,7 @@
           <a:p>
             <a:fld id="{87DD66F1-7FC0-403D-82FE-3DDCE4AD2CCB}" type="datetimeFigureOut">
               <a:rPr lang="en-US" smtClean="0"/>
-              <a:t>9/11/2021</a:t>
+              <a:t>9/13/2021</a:t>
             </a:fld>
             <a:endParaRPr lang="en-US" dirty="0"/>
           </a:p>
@@ -10664,7 +10666,7 @@
           <a:p>
             <a:fld id="{87DD66F1-7FC0-403D-82FE-3DDCE4AD2CCB}" type="datetimeFigureOut">
               <a:rPr lang="en-US" smtClean="0"/>
-              <a:t>9/11/2021</a:t>
+              <a:t>9/13/2021</a:t>
             </a:fld>
             <a:endParaRPr lang="en-US" dirty="0"/>
           </a:p>
@@ -11772,7 +11774,7 @@
           <a:p>
             <a:fld id="{87DD66F1-7FC0-403D-82FE-3DDCE4AD2CCB}" type="datetimeFigureOut">
               <a:rPr lang="en-US" smtClean="0"/>
-              <a:t>9/11/2021</a:t>
+              <a:t>9/13/2021</a:t>
             </a:fld>
             <a:endParaRPr lang="en-US" dirty="0"/>
           </a:p>
@@ -12769,7 +12771,7 @@
           <a:p>
             <a:fld id="{87DD66F1-7FC0-403D-82FE-3DDCE4AD2CCB}" type="datetimeFigureOut">
               <a:rPr lang="en-US" smtClean="0"/>
-              <a:t>9/11/2021</a:t>
+              <a:t>9/13/2021</a:t>
             </a:fld>
             <a:endParaRPr lang="en-US" dirty="0"/>
           </a:p>
@@ -13420,6 +13422,150 @@
             <p:ph type="title"/>
           </p:nvPr>
         </p:nvSpPr>
+        <p:spPr>
+          <a:xfrm>
+            <a:off x="1198231" y="1708728"/>
+            <a:ext cx="3865134" cy="1156855"/>
+          </a:xfrm>
+        </p:spPr>
+        <p:txBody>
+          <a:bodyPr>
+            <a:normAutofit fontScale="90000"/>
+          </a:bodyPr>
+          <a:lstStyle/>
+          <a:p>
+            <a:r>
+              <a:rPr lang="en-US" dirty="0" smtClean="0">
+                <a:latin typeface="Arial" panose="020B0604020202020204" pitchFamily="34" charset="0"/>
+                <a:cs typeface="Arial" panose="020B0604020202020204" pitchFamily="34" charset="0"/>
+              </a:rPr>
+              <a:t>What is ORM and how it works?</a:t>
+            </a:r>
+            <a:endParaRPr lang="en-US" dirty="0">
+              <a:latin typeface="Arial" panose="020B0604020202020204" pitchFamily="34" charset="0"/>
+              <a:cs typeface="Arial" panose="020B0604020202020204" pitchFamily="34" charset="0"/>
+            </a:endParaRPr>
+          </a:p>
+        </p:txBody>
+      </p:sp>
+      <p:pic>
+        <p:nvPicPr>
+          <p:cNvPr id="5" name="Picture Placeholder 4"/>
+          <p:cNvPicPr>
+            <a:picLocks noGrp="1" noChangeAspect="1"/>
+          </p:cNvPicPr>
+          <p:nvPr>
+            <p:ph type="pic" idx="1"/>
+          </p:nvPr>
+        </p:nvPicPr>
+        <p:blipFill>
+          <a:blip r:embed="rId2">
+            <a:extLst>
+              <a:ext uri="{28A0092B-C50C-407E-A947-70E740481C1C}">
+                <a14:useLocalDpi xmlns:a14="http://schemas.microsoft.com/office/drawing/2010/main" val="0"/>
+              </a:ext>
+            </a:extLst>
+          </a:blip>
+          <a:stretch>
+            <a:fillRect/>
+          </a:stretch>
+        </p:blipFill>
+        <p:spPr>
+          <a:xfrm>
+            <a:off x="6070040" y="1823937"/>
+            <a:ext cx="5651790" cy="3233476"/>
+          </a:xfrm>
+        </p:spPr>
+      </p:pic>
+      <p:sp>
+        <p:nvSpPr>
+          <p:cNvPr id="4" name="Text Placeholder 3"/>
+          <p:cNvSpPr>
+            <a:spLocks noGrp="1"/>
+          </p:cNvSpPr>
+          <p:nvPr>
+            <p:ph type="body" sz="half" idx="2"/>
+          </p:nvPr>
+        </p:nvSpPr>
+        <p:spPr>
+          <a:xfrm>
+            <a:off x="1198231" y="2946400"/>
+            <a:ext cx="3859212" cy="2701636"/>
+          </a:xfrm>
+        </p:spPr>
+        <p:txBody>
+          <a:bodyPr>
+            <a:normAutofit/>
+          </a:bodyPr>
+          <a:lstStyle/>
+          <a:p>
+            <a:r>
+              <a:rPr lang="en-US" sz="1800" dirty="0" smtClean="0">
+                <a:solidFill>
+                  <a:schemeClr val="bg1"/>
+                </a:solidFill>
+                <a:latin typeface="Arial" panose="020B0604020202020204" pitchFamily="34" charset="0"/>
+                <a:cs typeface="Arial" panose="020B0604020202020204" pitchFamily="34" charset="0"/>
+              </a:rPr>
+              <a:t>ORM stands from Object Relational Mapper and is a library that automates the transfer of data between database tables into objects and vice versa.</a:t>
+            </a:r>
+            <a:endParaRPr lang="en-US" sz="1800" dirty="0">
+              <a:solidFill>
+                <a:schemeClr val="bg1"/>
+              </a:solidFill>
+              <a:latin typeface="Arial" panose="020B0604020202020204" pitchFamily="34" charset="0"/>
+              <a:cs typeface="Arial" panose="020B0604020202020204" pitchFamily="34" charset="0"/>
+            </a:endParaRPr>
+          </a:p>
+        </p:txBody>
+      </p:sp>
+    </p:spTree>
+    <p:extLst>
+      <p:ext uri="{BB962C8B-B14F-4D97-AF65-F5344CB8AC3E}">
+        <p14:creationId xmlns:p14="http://schemas.microsoft.com/office/powerpoint/2010/main" val="3976096915"/>
+      </p:ext>
+    </p:extLst>
+  </p:cSld>
+  <p:clrMapOvr>
+    <a:masterClrMapping/>
+  </p:clrMapOvr>
+  <p:timing>
+    <p:tnLst>
+      <p:par>
+        <p:cTn id="1" dur="indefinite" restart="never" nodeType="tmRoot"/>
+      </p:par>
+    </p:tnLst>
+  </p:timing>
+</p:sld>
+</file>
+
+<file path=ppt/slides/slide11.xml><?xml version="1.0" encoding="utf-8"?>
+<p:sld xmlns:a="http://schemas.openxmlformats.org/drawingml/2006/main" xmlns:r="http://schemas.openxmlformats.org/officeDocument/2006/relationships" xmlns:p="http://schemas.openxmlformats.org/presentationml/2006/main">
+  <p:cSld>
+    <p:spTree>
+      <p:nvGrpSpPr>
+        <p:cNvPr id="1" name=""/>
+        <p:cNvGrpSpPr/>
+        <p:nvPr/>
+      </p:nvGrpSpPr>
+      <p:grpSpPr>
+        <a:xfrm>
+          <a:off x="0" y="0"/>
+          <a:ext cx="0" cy="0"/>
+          <a:chOff x="0" y="0"/>
+          <a:chExt cx="0" cy="0"/>
+        </a:xfrm>
+      </p:grpSpPr>
+      <p:sp>
+        <p:nvSpPr>
+          <p:cNvPr id="2" name="Title 1"/>
+          <p:cNvSpPr>
+            <a:spLocks noGrp="1"/>
+          </p:cNvSpPr>
+          <p:nvPr>
+            <p:ph type="title"/>
+          </p:nvPr>
+        </p:nvSpPr>
         <p:spPr/>
         <p:txBody>
           <a:bodyPr/>
@@ -13826,7 +13972,7 @@
 </p:sld>
 </file>
 
-<file path=ppt/slides/slide11.xml><?xml version="1.0" encoding="utf-8"?>
+<file path=ppt/slides/slide12.xml><?xml version="1.0" encoding="utf-8"?>
 <p:sld xmlns:a="http://schemas.openxmlformats.org/drawingml/2006/main" xmlns:r="http://schemas.openxmlformats.org/officeDocument/2006/relationships" xmlns:p="http://schemas.openxmlformats.org/presentationml/2006/main">
   <p:cSld>
     <p:spTree>
@@ -13977,7 +14123,7 @@
 </p:sld>
 </file>
 
-<file path=ppt/slides/slide12.xml><?xml version="1.0" encoding="utf-8"?>
+<file path=ppt/slides/slide13.xml><?xml version="1.0" encoding="utf-8"?>
 <p:sld xmlns:a="http://schemas.openxmlformats.org/drawingml/2006/main" xmlns:r="http://schemas.openxmlformats.org/officeDocument/2006/relationships" xmlns:p="http://schemas.openxmlformats.org/presentationml/2006/main">
   <p:cSld>
     <p:spTree>
@@ -14179,7 +14325,7 @@
 </p:sld>
 </file>
 
-<file path=ppt/slides/slide13.xml><?xml version="1.0" encoding="utf-8"?>
+<file path=ppt/slides/slide14.xml><?xml version="1.0" encoding="utf-8"?>
 <p:sld xmlns:a="http://schemas.openxmlformats.org/drawingml/2006/main" xmlns:r="http://schemas.openxmlformats.org/officeDocument/2006/relationships" xmlns:p="http://schemas.openxmlformats.org/presentationml/2006/main">
   <p:cSld>
     <p:spTree>
@@ -14366,7 +14512,7 @@
 </p:sld>
 </file>
 
-<file path=ppt/slides/slide14.xml><?xml version="1.0" encoding="utf-8"?>
+<file path=ppt/slides/slide15.xml><?xml version="1.0" encoding="utf-8"?>
 <p:sld xmlns:a="http://schemas.openxmlformats.org/drawingml/2006/main" xmlns:r="http://schemas.openxmlformats.org/officeDocument/2006/relationships" xmlns:p="http://schemas.openxmlformats.org/presentationml/2006/main">
   <p:cSld>
     <p:spTree>
@@ -14614,7 +14760,7 @@
 </p:sld>
 </file>
 
-<file path=ppt/slides/slide15.xml><?xml version="1.0" encoding="utf-8"?>
+<file path=ppt/slides/slide16.xml><?xml version="1.0" encoding="utf-8"?>
 <p:sld xmlns:a="http://schemas.openxmlformats.org/drawingml/2006/main" xmlns:r="http://schemas.openxmlformats.org/officeDocument/2006/relationships" xmlns:p="http://schemas.openxmlformats.org/presentationml/2006/main">
   <p:cSld>
     <p:spTree>
@@ -14794,7 +14940,7 @@
 </p:sld>
 </file>
 
-<file path=ppt/slides/slide16.xml><?xml version="1.0" encoding="utf-8"?>
+<file path=ppt/slides/slide17.xml><?xml version="1.0" encoding="utf-8"?>
 <p:sld xmlns:a="http://schemas.openxmlformats.org/drawingml/2006/main" xmlns:r="http://schemas.openxmlformats.org/officeDocument/2006/relationships" xmlns:p="http://schemas.openxmlformats.org/presentationml/2006/main">
   <p:cSld>
     <p:spTree>
@@ -14882,7 +15028,7 @@
 </p:sld>
 </file>
 
-<file path=ppt/slides/slide17.xml><?xml version="1.0" encoding="utf-8"?>
+<file path=ppt/slides/slide18.xml><?xml version="1.0" encoding="utf-8"?>
 <p:sld xmlns:a="http://schemas.openxmlformats.org/drawingml/2006/main" xmlns:r="http://schemas.openxmlformats.org/officeDocument/2006/relationships" xmlns:p="http://schemas.openxmlformats.org/presentationml/2006/main">
   <p:cSld>
     <p:spTree>
@@ -15042,7 +15188,7 @@
 </p:sld>
 </file>
 
-<file path=ppt/slides/slide18.xml><?xml version="1.0" encoding="utf-8"?>
+<file path=ppt/slides/slide19.xml><?xml version="1.0" encoding="utf-8"?>
 <p:sld xmlns:a="http://schemas.openxmlformats.org/drawingml/2006/main" xmlns:r="http://schemas.openxmlformats.org/officeDocument/2006/relationships" xmlns:p="http://schemas.openxmlformats.org/presentationml/2006/main">
   <p:cSld>
     <p:spTree>
@@ -15140,11 +15286,324 @@
           <a:lstStyle/>
           <a:p>
             <a:r>
+              <a:rPr lang="en-US" dirty="0" smtClean="0"/>
+              <a:t>Table of Contents</a:t>
+            </a:r>
+            <a:endParaRPr lang="en-US" dirty="0"/>
+          </a:p>
+        </p:txBody>
+      </p:sp>
+      <p:sp>
+        <p:nvSpPr>
+          <p:cNvPr id="7" name="Content Placeholder 3"/>
+          <p:cNvSpPr>
+            <a:spLocks noGrp="1"/>
+          </p:cNvSpPr>
+          <p:nvPr>
+            <p:ph sz="half" idx="2"/>
+          </p:nvPr>
+        </p:nvSpPr>
+        <p:spPr>
+          <a:xfrm>
+            <a:off x="710502" y="2438400"/>
+            <a:ext cx="4535753" cy="4054763"/>
+          </a:xfrm>
+        </p:spPr>
+        <p:txBody>
+          <a:bodyPr>
+            <a:normAutofit fontScale="92500" lnSpcReduction="10000"/>
+          </a:bodyPr>
+          <a:lstStyle/>
+          <a:p>
+            <a:r>
+              <a:rPr lang="en-US" sz="1600" dirty="0" smtClean="0">
+                <a:latin typeface="Arial" panose="020B0604020202020204" pitchFamily="34" charset="0"/>
+                <a:cs typeface="Arial" panose="020B0604020202020204" pitchFamily="34" charset="0"/>
+              </a:rPr>
+              <a:t>The Rise of Internet and Storage systems</a:t>
+            </a:r>
+          </a:p>
+          <a:p>
+            <a:r>
+              <a:rPr lang="en-US" sz="1600" dirty="0" smtClean="0">
+                <a:latin typeface="Arial" panose="020B0604020202020204" pitchFamily="34" charset="0"/>
+                <a:cs typeface="Arial" panose="020B0604020202020204" pitchFamily="34" charset="0"/>
+              </a:rPr>
+              <a:t>SQL vs NoSQL databases</a:t>
+            </a:r>
+          </a:p>
+          <a:p>
+            <a:r>
+              <a:rPr lang="en-US" sz="1600" dirty="0" smtClean="0">
+                <a:latin typeface="Arial" panose="020B0604020202020204" pitchFamily="34" charset="0"/>
+                <a:cs typeface="Arial" panose="020B0604020202020204" pitchFamily="34" charset="0"/>
+              </a:rPr>
+              <a:t>MS SQL (overview)</a:t>
+            </a:r>
+          </a:p>
+          <a:p>
+            <a:r>
+              <a:rPr lang="en-US" sz="1600" dirty="0">
+                <a:latin typeface="Arial" panose="020B0604020202020204" pitchFamily="34" charset="0"/>
+                <a:cs typeface="Arial" panose="020B0604020202020204" pitchFamily="34" charset="0"/>
+              </a:rPr>
+              <a:t>ADO.NET (overview</a:t>
+            </a:r>
+            <a:r>
+              <a:rPr lang="en-US" sz="1600" dirty="0" smtClean="0">
+                <a:latin typeface="Arial" panose="020B0604020202020204" pitchFamily="34" charset="0"/>
+                <a:cs typeface="Arial" panose="020B0604020202020204" pitchFamily="34" charset="0"/>
+              </a:rPr>
+              <a:t>)</a:t>
+            </a:r>
+            <a:endParaRPr lang="en-US" sz="1600" dirty="0" smtClean="0">
+              <a:latin typeface="Arial" panose="020B0604020202020204" pitchFamily="34" charset="0"/>
+              <a:cs typeface="Arial" panose="020B0604020202020204" pitchFamily="34" charset="0"/>
+            </a:endParaRPr>
+          </a:p>
+          <a:p>
+            <a:r>
+              <a:rPr lang="en-US" sz="1600" dirty="0" smtClean="0">
+                <a:latin typeface="Arial" panose="020B0604020202020204" pitchFamily="34" charset="0"/>
+                <a:cs typeface="Arial" panose="020B0604020202020204" pitchFamily="34" charset="0"/>
+              </a:rPr>
+              <a:t>What </a:t>
+            </a:r>
+            <a:r>
+              <a:rPr lang="en-US" sz="1600" dirty="0">
+                <a:latin typeface="Arial" panose="020B0604020202020204" pitchFamily="34" charset="0"/>
+                <a:cs typeface="Arial" panose="020B0604020202020204" pitchFamily="34" charset="0"/>
+              </a:rPr>
+              <a:t>is ORM and how it works</a:t>
+            </a:r>
+            <a:r>
+              <a:rPr lang="en-US" sz="1600" dirty="0" smtClean="0">
+                <a:latin typeface="Arial" panose="020B0604020202020204" pitchFamily="34" charset="0"/>
+                <a:cs typeface="Arial" panose="020B0604020202020204" pitchFamily="34" charset="0"/>
+              </a:rPr>
+              <a:t>?</a:t>
+            </a:r>
+          </a:p>
+          <a:p>
+            <a:r>
+              <a:rPr lang="en-US" sz="1600" dirty="0">
+                <a:latin typeface="Arial" panose="020B0604020202020204" pitchFamily="34" charset="0"/>
+                <a:cs typeface="Arial" panose="020B0604020202020204" pitchFamily="34" charset="0"/>
+              </a:rPr>
+              <a:t>The benefits from ORM systems?</a:t>
+            </a:r>
+          </a:p>
+          <a:p>
+            <a:r>
+              <a:rPr lang="en-US" sz="1600" dirty="0">
+                <a:latin typeface="Arial" panose="020B0604020202020204" pitchFamily="34" charset="0"/>
+                <a:cs typeface="Arial" panose="020B0604020202020204" pitchFamily="34" charset="0"/>
+              </a:rPr>
+              <a:t>Entity Framework </a:t>
+            </a:r>
+            <a:r>
+              <a:rPr lang="en-US" sz="1600" dirty="0" smtClean="0">
+                <a:latin typeface="Arial" panose="020B0604020202020204" pitchFamily="34" charset="0"/>
+                <a:cs typeface="Arial" panose="020B0604020202020204" pitchFamily="34" charset="0"/>
+              </a:rPr>
+              <a:t>Core</a:t>
+            </a:r>
+          </a:p>
+          <a:p>
+            <a:r>
+              <a:rPr lang="en-US" sz="1600" dirty="0">
+                <a:latin typeface="Arial" panose="020B0604020202020204" pitchFamily="34" charset="0"/>
+                <a:cs typeface="Arial" panose="020B0604020202020204" pitchFamily="34" charset="0"/>
+              </a:rPr>
+              <a:t>The Model (code first approach</a:t>
+            </a:r>
+            <a:r>
+              <a:rPr lang="en-US" sz="1600" dirty="0" smtClean="0">
+                <a:latin typeface="Arial" panose="020B0604020202020204" pitchFamily="34" charset="0"/>
+                <a:cs typeface="Arial" panose="020B0604020202020204" pitchFamily="34" charset="0"/>
+              </a:rPr>
+              <a:t>)</a:t>
+            </a:r>
+          </a:p>
+          <a:p>
+            <a:r>
+              <a:rPr lang="en-US" sz="1600" dirty="0">
+                <a:latin typeface="Arial" panose="020B0604020202020204" pitchFamily="34" charset="0"/>
+                <a:cs typeface="Arial" panose="020B0604020202020204" pitchFamily="34" charset="0"/>
+              </a:rPr>
+              <a:t>The Model (database first approach</a:t>
+            </a:r>
+            <a:r>
+              <a:rPr lang="en-US" sz="1600" dirty="0" smtClean="0">
+                <a:latin typeface="Arial" panose="020B0604020202020204" pitchFamily="34" charset="0"/>
+                <a:cs typeface="Arial" panose="020B0604020202020204" pitchFamily="34" charset="0"/>
+              </a:rPr>
+              <a:t>)</a:t>
+            </a:r>
+          </a:p>
+          <a:p>
+            <a:r>
+              <a:rPr lang="en-US" sz="1600" dirty="0">
+                <a:latin typeface="Arial" panose="020B0604020202020204" pitchFamily="34" charset="0"/>
+                <a:cs typeface="Arial" panose="020B0604020202020204" pitchFamily="34" charset="0"/>
+              </a:rPr>
+              <a:t>What is LINQ and how we use it in EF </a:t>
+            </a:r>
+            <a:r>
+              <a:rPr lang="en-US" sz="1600" dirty="0" smtClean="0">
+                <a:latin typeface="Arial" panose="020B0604020202020204" pitchFamily="34" charset="0"/>
+                <a:cs typeface="Arial" panose="020B0604020202020204" pitchFamily="34" charset="0"/>
+              </a:rPr>
+              <a:t>Core?</a:t>
+            </a:r>
+          </a:p>
+          <a:p>
+            <a:r>
+              <a:rPr lang="en-US" sz="1600" dirty="0">
+                <a:latin typeface="Arial" panose="020B0604020202020204" pitchFamily="34" charset="0"/>
+                <a:cs typeface="Arial" panose="020B0604020202020204" pitchFamily="34" charset="0"/>
+              </a:rPr>
+              <a:t>Entity </a:t>
+            </a:r>
+            <a:r>
+              <a:rPr lang="en-US" sz="1600" dirty="0" smtClean="0">
+                <a:latin typeface="Arial" panose="020B0604020202020204" pitchFamily="34" charset="0"/>
+                <a:cs typeface="Arial" panose="020B0604020202020204" pitchFamily="34" charset="0"/>
+              </a:rPr>
+              <a:t>Relations</a:t>
+            </a:r>
+          </a:p>
+          <a:p>
+            <a:r>
+              <a:rPr lang="en-US" sz="1600" dirty="0">
+                <a:latin typeface="Arial" panose="020B0604020202020204" pitchFamily="34" charset="0"/>
+                <a:cs typeface="Arial" panose="020B0604020202020204" pitchFamily="34" charset="0"/>
+              </a:rPr>
+              <a:t>How to include EF Core in our C# </a:t>
+            </a:r>
+            <a:r>
+              <a:rPr lang="en-US" sz="1600" dirty="0" smtClean="0">
+                <a:latin typeface="Arial" panose="020B0604020202020204" pitchFamily="34" charset="0"/>
+                <a:cs typeface="Arial" panose="020B0604020202020204" pitchFamily="34" charset="0"/>
+              </a:rPr>
+              <a:t>project?</a:t>
+            </a:r>
+            <a:endParaRPr lang="en-US" sz="1600" dirty="0">
+              <a:latin typeface="Arial" panose="020B0604020202020204" pitchFamily="34" charset="0"/>
+              <a:cs typeface="Arial" panose="020B0604020202020204" pitchFamily="34" charset="0"/>
+            </a:endParaRPr>
+          </a:p>
+          <a:p>
+            <a:pPr marL="0" indent="0">
+              <a:buNone/>
+            </a:pPr>
+            <a:endParaRPr lang="en-US" sz="1600" dirty="0">
+              <a:latin typeface="Arial" panose="020B0604020202020204" pitchFamily="34" charset="0"/>
+              <a:cs typeface="Arial" panose="020B0604020202020204" pitchFamily="34" charset="0"/>
+            </a:endParaRPr>
+          </a:p>
+          <a:p>
+            <a:endParaRPr lang="en-US" sz="1600" dirty="0">
+              <a:latin typeface="Arial" panose="020B0604020202020204" pitchFamily="34" charset="0"/>
+              <a:cs typeface="Arial" panose="020B0604020202020204" pitchFamily="34" charset="0"/>
+            </a:endParaRPr>
+          </a:p>
+          <a:p>
+            <a:endParaRPr lang="en-US" sz="1600" dirty="0">
+              <a:latin typeface="Arial" panose="020B0604020202020204" pitchFamily="34" charset="0"/>
+              <a:cs typeface="Arial" panose="020B0604020202020204" pitchFamily="34" charset="0"/>
+            </a:endParaRPr>
+          </a:p>
+          <a:p>
+            <a:endParaRPr lang="en-US" dirty="0">
+              <a:latin typeface="Arial" panose="020B0604020202020204" pitchFamily="34" charset="0"/>
+              <a:cs typeface="Arial" panose="020B0604020202020204" pitchFamily="34" charset="0"/>
+            </a:endParaRPr>
+          </a:p>
+          <a:p>
+            <a:endParaRPr lang="en-US" dirty="0">
+              <a:latin typeface="Arial" panose="020B0604020202020204" pitchFamily="34" charset="0"/>
+              <a:cs typeface="Arial" panose="020B0604020202020204" pitchFamily="34" charset="0"/>
+            </a:endParaRPr>
+          </a:p>
+          <a:p>
+            <a:endParaRPr lang="en-US" dirty="0" smtClean="0">
+              <a:latin typeface="Arial" panose="020B0604020202020204" pitchFamily="34" charset="0"/>
+              <a:cs typeface="Arial" panose="020B0604020202020204" pitchFamily="34" charset="0"/>
+            </a:endParaRPr>
+          </a:p>
+          <a:p>
+            <a:endParaRPr lang="en-US" dirty="0" smtClean="0">
+              <a:latin typeface="Arial" panose="020B0604020202020204" pitchFamily="34" charset="0"/>
+              <a:cs typeface="Arial" panose="020B0604020202020204" pitchFamily="34" charset="0"/>
+            </a:endParaRPr>
+          </a:p>
+          <a:p>
+            <a:endParaRPr lang="en-US" dirty="0" smtClean="0"/>
+          </a:p>
+          <a:p>
+            <a:endParaRPr lang="en-US" dirty="0"/>
+          </a:p>
+        </p:txBody>
+      </p:sp>
+    </p:spTree>
+    <p:extLst>
+      <p:ext uri="{BB962C8B-B14F-4D97-AF65-F5344CB8AC3E}">
+        <p14:creationId xmlns:p14="http://schemas.microsoft.com/office/powerpoint/2010/main" val="4154506407"/>
+      </p:ext>
+    </p:extLst>
+  </p:cSld>
+  <p:clrMapOvr>
+    <a:masterClrMapping/>
+  </p:clrMapOvr>
+</p:sld>
+</file>
+
+<file path=ppt/slides/slide3.xml><?xml version="1.0" encoding="utf-8"?>
+<p:sld xmlns:a="http://schemas.openxmlformats.org/drawingml/2006/main" xmlns:r="http://schemas.openxmlformats.org/officeDocument/2006/relationships" xmlns:p="http://schemas.openxmlformats.org/presentationml/2006/main">
+  <p:cSld>
+    <p:spTree>
+      <p:nvGrpSpPr>
+        <p:cNvPr id="1" name=""/>
+        <p:cNvGrpSpPr/>
+        <p:nvPr/>
+      </p:nvGrpSpPr>
+      <p:grpSpPr>
+        <a:xfrm>
+          <a:off x="0" y="0"/>
+          <a:ext cx="0" cy="0"/>
+          <a:chOff x="0" y="0"/>
+          <a:chExt cx="0" cy="0"/>
+        </a:xfrm>
+      </p:grpSpPr>
+      <p:sp>
+        <p:nvSpPr>
+          <p:cNvPr id="2" name="Title 1"/>
+          <p:cNvSpPr>
+            <a:spLocks noGrp="1"/>
+          </p:cNvSpPr>
+          <p:nvPr>
+            <p:ph type="title"/>
+          </p:nvPr>
+        </p:nvSpPr>
+        <p:spPr/>
+        <p:txBody>
+          <a:bodyPr/>
+          <a:lstStyle/>
+          <a:p>
+            <a:r>
               <a:rPr lang="en-US" sz="3200" dirty="0" smtClean="0">
                 <a:latin typeface="Arial" panose="020B0604020202020204" pitchFamily="34" charset="0"/>
                 <a:cs typeface="Arial" panose="020B0604020202020204" pitchFamily="34" charset="0"/>
               </a:rPr>
-              <a:t>The rise of Internet and storage systems! </a:t>
+              <a:t>The rise of Internet and storage </a:t>
+            </a:r>
+            <a:r>
+              <a:rPr lang="en-US" sz="3200" dirty="0" smtClean="0">
+                <a:latin typeface="Arial" panose="020B0604020202020204" pitchFamily="34" charset="0"/>
+                <a:cs typeface="Arial" panose="020B0604020202020204" pitchFamily="34" charset="0"/>
+              </a:rPr>
+              <a:t>systems</a:t>
             </a:r>
             <a:endParaRPr lang="en-US" sz="3200" dirty="0">
               <a:latin typeface="Arial" panose="020B0604020202020204" pitchFamily="34" charset="0"/>
@@ -15202,7 +15661,7 @@
 </p:sld>
 </file>
 
-<file path=ppt/slides/slide3.xml><?xml version="1.0" encoding="utf-8"?>
+<file path=ppt/slides/slide4.xml><?xml version="1.0" encoding="utf-8"?>
 <p:sld xmlns:a="http://schemas.openxmlformats.org/drawingml/2006/main" xmlns:r="http://schemas.openxmlformats.org/officeDocument/2006/relationships" xmlns:p="http://schemas.openxmlformats.org/presentationml/2006/main">
   <p:cSld>
     <p:spTree>
@@ -15344,7 +15803,7 @@
 </p:sld>
 </file>
 
-<file path=ppt/slides/slide4.xml><?xml version="1.0" encoding="utf-8"?>
+<file path=ppt/slides/slide5.xml><?xml version="1.0" encoding="utf-8"?>
 <p:sld xmlns:a="http://schemas.openxmlformats.org/drawingml/2006/main" xmlns:r="http://schemas.openxmlformats.org/officeDocument/2006/relationships" xmlns:p="http://schemas.openxmlformats.org/presentationml/2006/main">
   <p:cSld>
     <p:spTree>
@@ -15625,7 +16084,7 @@
 </p:sld>
 </file>
 
-<file path=ppt/slides/slide5.xml><?xml version="1.0" encoding="utf-8"?>
+<file path=ppt/slides/slide6.xml><?xml version="1.0" encoding="utf-8"?>
 <p:sld xmlns:a="http://schemas.openxmlformats.org/drawingml/2006/main" xmlns:r="http://schemas.openxmlformats.org/officeDocument/2006/relationships" xmlns:p="http://schemas.openxmlformats.org/presentationml/2006/main">
   <p:cSld>
     <p:spTree>
@@ -15814,7 +16273,7 @@
 </p:sld>
 </file>
 
-<file path=ppt/slides/slide6.xml><?xml version="1.0" encoding="utf-8"?>
+<file path=ppt/slides/slide7.xml><?xml version="1.0" encoding="utf-8"?>
 <p:sld xmlns:a="http://schemas.openxmlformats.org/drawingml/2006/main" xmlns:r="http://schemas.openxmlformats.org/officeDocument/2006/relationships" xmlns:p="http://schemas.openxmlformats.org/presentationml/2006/main">
   <p:cSld>
     <p:spTree>
@@ -15949,7 +16408,7 @@
 </p:sld>
 </file>
 
-<file path=ppt/slides/slide7.xml><?xml version="1.0" encoding="utf-8"?>
+<file path=ppt/slides/slide8.xml><?xml version="1.0" encoding="utf-8"?>
 <p:sld xmlns:a="http://schemas.openxmlformats.org/drawingml/2006/main" xmlns:r="http://schemas.openxmlformats.org/officeDocument/2006/relationships" xmlns:p="http://schemas.openxmlformats.org/presentationml/2006/main">
   <p:cSld>
     <p:spTree>
@@ -16045,7 +16504,7 @@
 </p:sld>
 </file>
 
-<file path=ppt/slides/slide8.xml><?xml version="1.0" encoding="utf-8"?>
+<file path=ppt/slides/slide9.xml><?xml version="1.0" encoding="utf-8"?>
 <p:sld xmlns:a="http://schemas.openxmlformats.org/drawingml/2006/main" xmlns:r="http://schemas.openxmlformats.org/officeDocument/2006/relationships" xmlns:p="http://schemas.openxmlformats.org/presentationml/2006/main">
   <p:cSld>
     <p:spTree>
@@ -16214,150 +16673,6 @@
     <p:extLst>
       <p:ext uri="{BB962C8B-B14F-4D97-AF65-F5344CB8AC3E}">
         <p14:creationId xmlns:p14="http://schemas.microsoft.com/office/powerpoint/2010/main" val="9675751"/>
-      </p:ext>
-    </p:extLst>
-  </p:cSld>
-  <p:clrMapOvr>
-    <a:masterClrMapping/>
-  </p:clrMapOvr>
-  <p:timing>
-    <p:tnLst>
-      <p:par>
-        <p:cTn id="1" dur="indefinite" restart="never" nodeType="tmRoot"/>
-      </p:par>
-    </p:tnLst>
-  </p:timing>
-</p:sld>
-</file>
-
-<file path=ppt/slides/slide9.xml><?xml version="1.0" encoding="utf-8"?>
-<p:sld xmlns:a="http://schemas.openxmlformats.org/drawingml/2006/main" xmlns:r="http://schemas.openxmlformats.org/officeDocument/2006/relationships" xmlns:p="http://schemas.openxmlformats.org/presentationml/2006/main">
-  <p:cSld>
-    <p:spTree>
-      <p:nvGrpSpPr>
-        <p:cNvPr id="1" name=""/>
-        <p:cNvGrpSpPr/>
-        <p:nvPr/>
-      </p:nvGrpSpPr>
-      <p:grpSpPr>
-        <a:xfrm>
-          <a:off x="0" y="0"/>
-          <a:ext cx="0" cy="0"/>
-          <a:chOff x="0" y="0"/>
-          <a:chExt cx="0" cy="0"/>
-        </a:xfrm>
-      </p:grpSpPr>
-      <p:sp>
-        <p:nvSpPr>
-          <p:cNvPr id="2" name="Title 1"/>
-          <p:cNvSpPr>
-            <a:spLocks noGrp="1"/>
-          </p:cNvSpPr>
-          <p:nvPr>
-            <p:ph type="title"/>
-          </p:nvPr>
-        </p:nvSpPr>
-        <p:spPr>
-          <a:xfrm>
-            <a:off x="1198231" y="1708728"/>
-            <a:ext cx="3865134" cy="1156855"/>
-          </a:xfrm>
-        </p:spPr>
-        <p:txBody>
-          <a:bodyPr>
-            <a:normAutofit fontScale="90000"/>
-          </a:bodyPr>
-          <a:lstStyle/>
-          <a:p>
-            <a:r>
-              <a:rPr lang="en-US" dirty="0" smtClean="0">
-                <a:latin typeface="Arial" panose="020B0604020202020204" pitchFamily="34" charset="0"/>
-                <a:cs typeface="Arial" panose="020B0604020202020204" pitchFamily="34" charset="0"/>
-              </a:rPr>
-              <a:t>What is ORM and how it works?</a:t>
-            </a:r>
-            <a:endParaRPr lang="en-US" dirty="0">
-              <a:latin typeface="Arial" panose="020B0604020202020204" pitchFamily="34" charset="0"/>
-              <a:cs typeface="Arial" panose="020B0604020202020204" pitchFamily="34" charset="0"/>
-            </a:endParaRPr>
-          </a:p>
-        </p:txBody>
-      </p:sp>
-      <p:pic>
-        <p:nvPicPr>
-          <p:cNvPr id="5" name="Picture Placeholder 4"/>
-          <p:cNvPicPr>
-            <a:picLocks noGrp="1" noChangeAspect="1"/>
-          </p:cNvPicPr>
-          <p:nvPr>
-            <p:ph type="pic" idx="1"/>
-          </p:nvPr>
-        </p:nvPicPr>
-        <p:blipFill>
-          <a:blip r:embed="rId2">
-            <a:extLst>
-              <a:ext uri="{28A0092B-C50C-407E-A947-70E740481C1C}">
-                <a14:useLocalDpi xmlns:a14="http://schemas.microsoft.com/office/drawing/2010/main" val="0"/>
-              </a:ext>
-            </a:extLst>
-          </a:blip>
-          <a:stretch>
-            <a:fillRect/>
-          </a:stretch>
-        </p:blipFill>
-        <p:spPr>
-          <a:xfrm>
-            <a:off x="6070040" y="1823937"/>
-            <a:ext cx="5651790" cy="3233476"/>
-          </a:xfrm>
-        </p:spPr>
-      </p:pic>
-      <p:sp>
-        <p:nvSpPr>
-          <p:cNvPr id="4" name="Text Placeholder 3"/>
-          <p:cNvSpPr>
-            <a:spLocks noGrp="1"/>
-          </p:cNvSpPr>
-          <p:nvPr>
-            <p:ph type="body" sz="half" idx="2"/>
-          </p:nvPr>
-        </p:nvSpPr>
-        <p:spPr>
-          <a:xfrm>
-            <a:off x="1198231" y="2946400"/>
-            <a:ext cx="3859212" cy="2701636"/>
-          </a:xfrm>
-        </p:spPr>
-        <p:txBody>
-          <a:bodyPr>
-            <a:normAutofit/>
-          </a:bodyPr>
-          <a:lstStyle/>
-          <a:p>
-            <a:r>
-              <a:rPr lang="en-US" sz="1800" dirty="0" smtClean="0">
-                <a:solidFill>
-                  <a:schemeClr val="bg1"/>
-                </a:solidFill>
-                <a:latin typeface="Arial" panose="020B0604020202020204" pitchFamily="34" charset="0"/>
-                <a:cs typeface="Arial" panose="020B0604020202020204" pitchFamily="34" charset="0"/>
-              </a:rPr>
-              <a:t>ORM stands from Object Relational Mapper and is a library that automates the transfer of data between database tables into objects and vice versa.</a:t>
-            </a:r>
-            <a:endParaRPr lang="en-US" sz="1800" dirty="0">
-              <a:solidFill>
-                <a:schemeClr val="bg1"/>
-              </a:solidFill>
-              <a:latin typeface="Arial" panose="020B0604020202020204" pitchFamily="34" charset="0"/>
-              <a:cs typeface="Arial" panose="020B0604020202020204" pitchFamily="34" charset="0"/>
-            </a:endParaRPr>
-          </a:p>
-        </p:txBody>
-      </p:sp>
-    </p:spTree>
-    <p:extLst>
-      <p:ext uri="{BB962C8B-B14F-4D97-AF65-F5344CB8AC3E}">
-        <p14:creationId xmlns:p14="http://schemas.microsoft.com/office/powerpoint/2010/main" val="3976096915"/>
       </p:ext>
     </p:extLst>
   </p:cSld>

</xml_diff>